<commit_message>
Added a short introduction to R script, multiple linear regression example.
</commit_message>
<xml_diff>
--- a/slides/prezentacija.pptx
+++ b/slides/prezentacija.pptx
@@ -46,8 +46,9 @@
     <p:sldId id="311" r:id="rId40"/>
     <p:sldId id="312" r:id="rId41"/>
     <p:sldId id="300" r:id="rId42"/>
-    <p:sldId id="313" r:id="rId43"/>
+    <p:sldId id="315" r:id="rId43"/>
     <p:sldId id="314" r:id="rId44"/>
+    <p:sldId id="313" r:id="rId45"/>
   </p:sldIdLst>
   <p:sldSz cx="12192000" cy="6858000"/>
   <p:notesSz cx="6858000" cy="9144000"/>
@@ -294,7 +295,7 @@
           <a:p>
             <a:fld id="{6B41F776-2985-48C1-9143-45E81A31457D}" type="datetimeFigureOut">
               <a:rPr lang="sl-SI" smtClean="0"/>
-              <a:t>24. 05. 2019</a:t>
+              <a:t>26. 05. 2019</a:t>
             </a:fld>
             <a:endParaRPr lang="sl-SI"/>
           </a:p>
@@ -462,7 +463,7 @@
           <a:p>
             <a:fld id="{6B41F776-2985-48C1-9143-45E81A31457D}" type="datetimeFigureOut">
               <a:rPr lang="sl-SI" smtClean="0"/>
-              <a:t>24. 05. 2019</a:t>
+              <a:t>26. 05. 2019</a:t>
             </a:fld>
             <a:endParaRPr lang="sl-SI"/>
           </a:p>
@@ -640,7 +641,7 @@
           <a:p>
             <a:fld id="{6B41F776-2985-48C1-9143-45E81A31457D}" type="datetimeFigureOut">
               <a:rPr lang="sl-SI" smtClean="0"/>
-              <a:t>24. 05. 2019</a:t>
+              <a:t>26. 05. 2019</a:t>
             </a:fld>
             <a:endParaRPr lang="sl-SI"/>
           </a:p>
@@ -915,7 +916,7 @@
           <a:p>
             <a:fld id="{6B41F776-2985-48C1-9143-45E81A31457D}" type="datetimeFigureOut">
               <a:rPr lang="sl-SI" smtClean="0"/>
-              <a:t>24. 05. 2019</a:t>
+              <a:t>26. 05. 2019</a:t>
             </a:fld>
             <a:endParaRPr lang="sl-SI"/>
           </a:p>
@@ -1144,7 +1145,7 @@
           <a:p>
             <a:fld id="{6B41F776-2985-48C1-9143-45E81A31457D}" type="datetimeFigureOut">
               <a:rPr lang="sl-SI" smtClean="0"/>
-              <a:t>24. 05. 2019</a:t>
+              <a:t>26. 05. 2019</a:t>
             </a:fld>
             <a:endParaRPr lang="sl-SI"/>
           </a:p>
@@ -1508,7 +1509,7 @@
           <a:p>
             <a:fld id="{6B41F776-2985-48C1-9143-45E81A31457D}" type="datetimeFigureOut">
               <a:rPr lang="sl-SI" smtClean="0"/>
-              <a:t>24. 05. 2019</a:t>
+              <a:t>26. 05. 2019</a:t>
             </a:fld>
             <a:endParaRPr lang="sl-SI"/>
           </a:p>
@@ -1625,7 +1626,7 @@
           <a:p>
             <a:fld id="{6B41F776-2985-48C1-9143-45E81A31457D}" type="datetimeFigureOut">
               <a:rPr lang="sl-SI" smtClean="0"/>
-              <a:t>24. 05. 2019</a:t>
+              <a:t>26. 05. 2019</a:t>
             </a:fld>
             <a:endParaRPr lang="sl-SI"/>
           </a:p>
@@ -1720,7 +1721,7 @@
           <a:p>
             <a:fld id="{6B41F776-2985-48C1-9143-45E81A31457D}" type="datetimeFigureOut">
               <a:rPr lang="sl-SI" smtClean="0"/>
-              <a:t>24. 05. 2019</a:t>
+              <a:t>26. 05. 2019</a:t>
             </a:fld>
             <a:endParaRPr lang="sl-SI"/>
           </a:p>
@@ -1995,7 +1996,7 @@
           <a:p>
             <a:fld id="{6B41F776-2985-48C1-9143-45E81A31457D}" type="datetimeFigureOut">
               <a:rPr lang="sl-SI" smtClean="0"/>
-              <a:t>24. 05. 2019</a:t>
+              <a:t>26. 05. 2019</a:t>
             </a:fld>
             <a:endParaRPr lang="sl-SI"/>
           </a:p>
@@ -2247,7 +2248,7 @@
           <a:p>
             <a:fld id="{6B41F776-2985-48C1-9143-45E81A31457D}" type="datetimeFigureOut">
               <a:rPr lang="sl-SI" smtClean="0"/>
-              <a:t>24. 05. 2019</a:t>
+              <a:t>26. 05. 2019</a:t>
             </a:fld>
             <a:endParaRPr lang="sl-SI"/>
           </a:p>
@@ -2458,7 +2459,7 @@
           <a:p>
             <a:fld id="{6B41F776-2985-48C1-9143-45E81A31457D}" type="datetimeFigureOut">
               <a:rPr lang="sl-SI" smtClean="0"/>
-              <a:t>24. 05. 2019</a:t>
+              <a:t>26. 05. 2019</a:t>
             </a:fld>
             <a:endParaRPr lang="sl-SI"/>
           </a:p>
@@ -16516,7 +16517,7 @@
               <a:buNone/>
             </a:pPr>
             <a:r>
-              <a:rPr lang="en-US" sz="1800">
+              <a:rPr lang="en-US" sz="1800" dirty="0">
                 <a:latin typeface="Courier New" panose="02070309020205020404" pitchFamily="49" charset="0"/>
                 <a:cs typeface="Courier New" panose="02070309020205020404" pitchFamily="49" charset="0"/>
               </a:rPr>
@@ -16527,7 +16528,7 @@
             <a:pPr marL="0" indent="0">
               <a:buNone/>
             </a:pPr>
-            <a:endParaRPr lang="en-US" sz="1800">
+            <a:endParaRPr lang="en-US" sz="1800" dirty="0">
               <a:latin typeface="Courier New" panose="02070309020205020404" pitchFamily="49" charset="0"/>
               <a:cs typeface="Courier New" panose="02070309020205020404" pitchFamily="49" charset="0"/>
             </a:endParaRPr>
@@ -16537,14 +16538,14 @@
               <a:buNone/>
             </a:pPr>
             <a:r>
-              <a:rPr lang="en-US" sz="1800">
+              <a:rPr lang="en-US" sz="1800" dirty="0">
                 <a:latin typeface="Courier New" panose="02070309020205020404" pitchFamily="49" charset="0"/>
                 <a:cs typeface="Courier New" panose="02070309020205020404" pitchFamily="49" charset="0"/>
               </a:rPr>
               <a:t>real b</a:t>
             </a:r>
             <a:r>
-              <a:rPr lang="en-GB" sz="1800">
+              <a:rPr lang="en-GB" sz="1800" dirty="0">
                 <a:latin typeface="Courier New" panose="02070309020205020404" pitchFamily="49" charset="0"/>
                 <a:cs typeface="Courier New" panose="02070309020205020404" pitchFamily="49" charset="0"/>
               </a:rPr>
@@ -16555,7 +16556,7 @@
             <a:pPr marL="0" indent="0">
               <a:buNone/>
             </a:pPr>
-            <a:endParaRPr lang="en-GB" sz="1800">
+            <a:endParaRPr lang="en-GB" sz="1800" dirty="0">
               <a:latin typeface="Courier New" panose="02070309020205020404" pitchFamily="49" charset="0"/>
               <a:cs typeface="Courier New" panose="02070309020205020404" pitchFamily="49" charset="0"/>
             </a:endParaRPr>
@@ -16565,7 +16566,7 @@
               <a:buNone/>
             </a:pPr>
             <a:r>
-              <a:rPr lang="en-GB" sz="1800">
+              <a:rPr lang="en-GB" sz="1800" dirty="0">
                 <a:latin typeface="Courier New" panose="02070309020205020404" pitchFamily="49" charset="0"/>
                 <a:cs typeface="Courier New" panose="02070309020205020404" pitchFamily="49" charset="0"/>
               </a:rPr>
@@ -16576,7 +16577,7 @@
             <a:pPr marL="0" indent="0">
               <a:buNone/>
             </a:pPr>
-            <a:endParaRPr lang="en-GB" sz="1800">
+            <a:endParaRPr lang="en-GB" sz="1800" dirty="0">
               <a:latin typeface="Courier New" panose="02070309020205020404" pitchFamily="49" charset="0"/>
               <a:cs typeface="Courier New" panose="02070309020205020404" pitchFamily="49" charset="0"/>
             </a:endParaRPr>
@@ -16586,7 +16587,7 @@
               <a:buNone/>
             </a:pPr>
             <a:r>
-              <a:rPr lang="en-GB" sz="1800">
+              <a:rPr lang="en-GB" sz="1800" dirty="0">
                 <a:latin typeface="Courier New" panose="02070309020205020404" pitchFamily="49" charset="0"/>
                 <a:cs typeface="Courier New" panose="02070309020205020404" pitchFamily="49" charset="0"/>
               </a:rPr>
@@ -16597,7 +16598,7 @@
             <a:pPr marL="0" indent="0">
               <a:buNone/>
             </a:pPr>
-            <a:endParaRPr lang="en-GB" sz="1800">
+            <a:endParaRPr lang="en-GB" sz="1800" dirty="0">
               <a:latin typeface="Courier New" panose="02070309020205020404" pitchFamily="49" charset="0"/>
               <a:cs typeface="Courier New" panose="02070309020205020404" pitchFamily="49" charset="0"/>
             </a:endParaRPr>
@@ -16606,34 +16607,57 @@
             <a:pPr marL="0" indent="0">
               <a:buNone/>
             </a:pPr>
-            <a:r>
-              <a:rPr lang="en-GB" sz="1800">
-                <a:latin typeface="Courier New" panose="02070309020205020404" pitchFamily="49" charset="0"/>
-                <a:cs typeface="Courier New" panose="02070309020205020404" pitchFamily="49" charset="0"/>
-              </a:rPr>
-              <a:t>real&lt;lower=0&gt; sigma;</a:t>
-            </a:r>
+            <a:endParaRPr lang="en-GB" sz="1800" dirty="0">
+              <a:latin typeface="Courier New" panose="02070309020205020404" pitchFamily="49" charset="0"/>
+              <a:cs typeface="Courier New" panose="02070309020205020404" pitchFamily="49" charset="0"/>
+            </a:endParaRPr>
           </a:p>
           <a:p>
             <a:pPr marL="0" indent="0">
               <a:buNone/>
             </a:pPr>
             <a:r>
-              <a:rPr lang="en-GB" sz="1800">
+              <a:rPr lang="en-GB" sz="1800" dirty="0">
                 <a:latin typeface="Courier New" panose="02070309020205020404" pitchFamily="49" charset="0"/>
                 <a:cs typeface="Courier New" panose="02070309020205020404" pitchFamily="49" charset="0"/>
               </a:rPr>
-              <a:t>real&lt;lower=0,upper=1&gt; </a:t>
-            </a:r>
-            <a:r>
-              <a:rPr lang="en-GB" sz="1800" err="1">
+              <a:t>real&lt;lower=0&gt; sigma;</a:t>
+            </a:r>
+          </a:p>
+          <a:p>
+            <a:pPr marL="0" indent="0">
+              <a:buNone/>
+            </a:pPr>
+            <a:r>
+              <a:rPr lang="en-GB" sz="1800" dirty="0">
                 <a:latin typeface="Courier New" panose="02070309020205020404" pitchFamily="49" charset="0"/>
                 <a:cs typeface="Courier New" panose="02070309020205020404" pitchFamily="49" charset="0"/>
               </a:rPr>
+              <a:t>real&lt;lower=</a:t>
+            </a:r>
+            <a:r>
+              <a:rPr lang="en-GB" sz="1800" dirty="0" err="1">
+                <a:latin typeface="Courier New" panose="02070309020205020404" pitchFamily="49" charset="0"/>
+                <a:cs typeface="Courier New" panose="02070309020205020404" pitchFamily="49" charset="0"/>
+              </a:rPr>
+              <a:t>0,upper</a:t>
+            </a:r>
+            <a:r>
+              <a:rPr lang="en-GB" sz="1800" dirty="0">
+                <a:latin typeface="Courier New" panose="02070309020205020404" pitchFamily="49" charset="0"/>
+                <a:cs typeface="Courier New" panose="02070309020205020404" pitchFamily="49" charset="0"/>
+              </a:rPr>
+              <a:t>=1&gt; </a:t>
+            </a:r>
+            <a:r>
+              <a:rPr lang="en-GB" sz="1800" dirty="0" err="1">
+                <a:latin typeface="Courier New" panose="02070309020205020404" pitchFamily="49" charset="0"/>
+                <a:cs typeface="Courier New" panose="02070309020205020404" pitchFamily="49" charset="0"/>
+              </a:rPr>
               <a:t>success_rate</a:t>
             </a:r>
             <a:r>
-              <a:rPr lang="en-GB" sz="1800">
+              <a:rPr lang="en-GB" sz="1800" dirty="0">
                 <a:latin typeface="Courier New" panose="02070309020205020404" pitchFamily="49" charset="0"/>
                 <a:cs typeface="Courier New" panose="02070309020205020404" pitchFamily="49" charset="0"/>
               </a:rPr>
@@ -18967,7 +18991,7 @@
               <a:rPr lang="en-US" sz="3600" b="1" dirty="0" err="1">
                 <a:latin typeface="Titillium Web" panose="00000500000000000000" pitchFamily="2" charset="-18"/>
               </a:rPr>
-              <a:t>TODO</a:t>
+              <a:t>Izjemno</a:t>
             </a:r>
             <a:r>
               <a:rPr lang="en-US" sz="3600" b="1" dirty="0">
@@ -18979,7 +19003,7 @@
               <a:rPr lang="en-US" sz="3600" b="1" dirty="0" err="1">
                 <a:latin typeface="Titillium Web" panose="00000500000000000000" pitchFamily="2" charset="-18"/>
               </a:rPr>
-              <a:t>OPIS</a:t>
+              <a:t>kratek</a:t>
             </a:r>
             <a:r>
               <a:rPr lang="en-US" sz="3600" b="1" dirty="0">
@@ -18991,19 +19015,13 @@
               <a:rPr lang="en-US" sz="3600" b="1" dirty="0" err="1">
                 <a:latin typeface="Titillium Web" panose="00000500000000000000" pitchFamily="2" charset="-18"/>
               </a:rPr>
-              <a:t>PROBLEMOV</a:t>
+              <a:t>uvod</a:t>
             </a:r>
             <a:r>
               <a:rPr lang="en-US" sz="3600" b="1" dirty="0">
                 <a:latin typeface="Titillium Web" panose="00000500000000000000" pitchFamily="2" charset="-18"/>
               </a:rPr>
-              <a:t> TER </a:t>
-            </a:r>
-            <a:r>
-              <a:rPr lang="en-US" sz="3600" b="1" dirty="0" err="1">
-                <a:latin typeface="Titillium Web" panose="00000500000000000000" pitchFamily="2" charset="-18"/>
-              </a:rPr>
-              <a:t>NAMIGI</a:t>
+              <a:t> v R</a:t>
             </a:r>
             <a:endParaRPr lang="LID4096" sz="3600" dirty="0"/>
           </a:p>
@@ -19037,21 +19055,26 @@
           </a:bodyPr>
           <a:lstStyle/>
           <a:p>
-            <a:pPr marL="342900" indent="-342900">
-              <a:buFont typeface="+mj-lt"/>
-              <a:buAutoNum type="arabicPeriod"/>
+            <a:pPr marL="0" indent="0">
+              <a:buNone/>
             </a:pPr>
             <a:r>
+              <a:rPr lang="en-US" sz="1800" b="1" dirty="0" err="1">
+                <a:latin typeface="Titillium Web" panose="00000500000000000000" pitchFamily="2" charset="0"/>
+              </a:rPr>
+              <a:t>Prvi</a:t>
+            </a:r>
+            <a:r>
               <a:rPr lang="en-US" sz="1800" b="1" dirty="0">
                 <a:latin typeface="Titillium Web" panose="00000500000000000000" pitchFamily="2" charset="0"/>
               </a:rPr>
-              <a:t>Bernoulli-beta </a:t>
+              <a:t> primer </a:t>
             </a:r>
             <a:r>
               <a:rPr lang="en-US" sz="1800" b="1" dirty="0" err="1">
                 <a:latin typeface="Titillium Web" panose="00000500000000000000" pitchFamily="2" charset="0"/>
               </a:rPr>
-              <a:t>meti</a:t>
+              <a:t>naredimo</a:t>
             </a:r>
             <a:r>
               <a:rPr lang="en-US" sz="1800" b="1" dirty="0">
@@ -19063,219 +19086,259 @@
               <a:rPr lang="en-US" sz="1800" b="1" dirty="0" err="1">
                 <a:latin typeface="Titillium Web" panose="00000500000000000000" pitchFamily="2" charset="0"/>
               </a:rPr>
-              <a:t>na</a:t>
+              <a:t>skupaj</a:t>
             </a:r>
             <a:r>
               <a:rPr lang="en-US" sz="1800" b="1" dirty="0">
                 <a:latin typeface="Titillium Web" panose="00000500000000000000" pitchFamily="2" charset="0"/>
               </a:rPr>
-              <a:t> </a:t>
+              <a:t>, </a:t>
             </a:r>
             <a:r>
               <a:rPr lang="en-US" sz="1800" b="1" dirty="0" err="1">
                 <a:latin typeface="Titillium Web" panose="00000500000000000000" pitchFamily="2" charset="0"/>
               </a:rPr>
-              <a:t>koš</a:t>
+              <a:t>pokažem</a:t>
+            </a:r>
+            <a:r>
+              <a:rPr lang="en-US" sz="1800" b="1" dirty="0">
+                <a:latin typeface="Titillium Web" panose="00000500000000000000" pitchFamily="2" charset="0"/>
+              </a:rPr>
+              <a:t>:</a:t>
+            </a:r>
+          </a:p>
+          <a:p>
+            <a:pPr marL="0" indent="0">
+              <a:buNone/>
+            </a:pPr>
+            <a:r>
+              <a:rPr lang="en-US" sz="1800" b="1" dirty="0">
+                <a:latin typeface="Titillium Web" panose="00000500000000000000" pitchFamily="2" charset="0"/>
+              </a:rPr>
+              <a:t>	</a:t>
+            </a:r>
+            <a:r>
+              <a:rPr lang="en-US" sz="1800" b="1" dirty="0" err="1">
+                <a:latin typeface="Titillium Web" panose="00000500000000000000" pitchFamily="2" charset="0"/>
+              </a:rPr>
+              <a:t>kako</a:t>
+            </a:r>
+            <a:r>
+              <a:rPr lang="en-US" sz="1800" b="1" dirty="0">
+                <a:latin typeface="Titillium Web" panose="00000500000000000000" pitchFamily="2" charset="0"/>
+              </a:rPr>
+              <a:t> </a:t>
+            </a:r>
+            <a:r>
+              <a:rPr lang="en-US" sz="1800" b="1" dirty="0" err="1">
+                <a:latin typeface="Titillium Web" panose="00000500000000000000" pitchFamily="2" charset="0"/>
+              </a:rPr>
+              <a:t>poganjati</a:t>
+            </a:r>
+            <a:r>
+              <a:rPr lang="en-US" sz="1800" b="1" dirty="0">
+                <a:latin typeface="Titillium Web" panose="00000500000000000000" pitchFamily="2" charset="0"/>
+              </a:rPr>
+              <a:t> </a:t>
+            </a:r>
+            <a:r>
+              <a:rPr lang="en-US" sz="1800" b="1" dirty="0" err="1">
+                <a:latin typeface="Titillium Web" panose="00000500000000000000" pitchFamily="2" charset="0"/>
+              </a:rPr>
+              <a:t>pripravljene</a:t>
+            </a:r>
+            <a:r>
+              <a:rPr lang="en-US" sz="1800" b="1" dirty="0">
+                <a:latin typeface="Titillium Web" panose="00000500000000000000" pitchFamily="2" charset="0"/>
+              </a:rPr>
+              <a:t> R </a:t>
+            </a:r>
+            <a:r>
+              <a:rPr lang="en-US" sz="1800" b="1" dirty="0" err="1">
+                <a:latin typeface="Titillium Web" panose="00000500000000000000" pitchFamily="2" charset="0"/>
+              </a:rPr>
+              <a:t>skripte</a:t>
+            </a:r>
+            <a:r>
+              <a:rPr lang="en-US" sz="1800" b="1" dirty="0">
+                <a:latin typeface="Titillium Web" panose="00000500000000000000" pitchFamily="2" charset="0"/>
+              </a:rPr>
+              <a:t> (</a:t>
+            </a:r>
+            <a:r>
+              <a:rPr lang="en-US" sz="1800" b="1" dirty="0" err="1">
+                <a:latin typeface="Titillium Web" panose="00000500000000000000" pitchFamily="2" charset="0"/>
+              </a:rPr>
+              <a:t>razložim</a:t>
+            </a:r>
+            <a:r>
+              <a:rPr lang="en-US" sz="1800" b="1" dirty="0">
+                <a:latin typeface="Titillium Web" panose="00000500000000000000" pitchFamily="2" charset="0"/>
+              </a:rPr>
+              <a:t> </a:t>
+            </a:r>
+            <a:r>
+              <a:rPr lang="en-US" sz="1800" b="1" dirty="0" err="1">
+                <a:latin typeface="Titillium Web" panose="00000500000000000000" pitchFamily="2" charset="0"/>
+              </a:rPr>
+              <a:t>kodo</a:t>
+            </a:r>
+            <a:r>
+              <a:rPr lang="en-US" sz="1800" b="1" dirty="0">
+                <a:latin typeface="Titillium Web" panose="00000500000000000000" pitchFamily="2" charset="0"/>
+              </a:rPr>
+              <a:t> </a:t>
+            </a:r>
+          </a:p>
+          <a:p>
+            <a:pPr marL="0" indent="0">
+              <a:buNone/>
+            </a:pPr>
+            <a:r>
+              <a:rPr lang="en-US" sz="1800" b="1" dirty="0">
+                <a:latin typeface="Titillium Web" panose="00000500000000000000" pitchFamily="2" charset="0"/>
+              </a:rPr>
+              <a:t>	</a:t>
+            </a:r>
+            <a:r>
+              <a:rPr lang="en-US" sz="1800" b="1" dirty="0" err="1">
+                <a:latin typeface="Titillium Web" panose="00000500000000000000" pitchFamily="2" charset="0"/>
+              </a:rPr>
+              <a:t>kako</a:t>
+            </a:r>
+            <a:r>
+              <a:rPr lang="en-US" sz="1800" b="1" dirty="0">
+                <a:latin typeface="Titillium Web" panose="00000500000000000000" pitchFamily="2" charset="0"/>
+              </a:rPr>
+              <a:t> </a:t>
+            </a:r>
+            <a:r>
+              <a:rPr lang="en-US" sz="1800" b="1" dirty="0" err="1">
+                <a:latin typeface="Titillium Web" panose="00000500000000000000" pitchFamily="2" charset="0"/>
+              </a:rPr>
+              <a:t>pisati</a:t>
+            </a:r>
+            <a:r>
+              <a:rPr lang="en-US" sz="1800" b="1" dirty="0">
+                <a:latin typeface="Titillium Web" panose="00000500000000000000" pitchFamily="2" charset="0"/>
+              </a:rPr>
+              <a:t> </a:t>
+            </a:r>
+            <a:r>
+              <a:rPr lang="en-US" sz="1800" b="1" dirty="0" err="1">
+                <a:latin typeface="Titillium Web" panose="00000500000000000000" pitchFamily="2" charset="0"/>
+              </a:rPr>
+              <a:t>modele</a:t>
+            </a:r>
+            <a:r>
+              <a:rPr lang="en-US" sz="1800" b="1" dirty="0">
+                <a:latin typeface="Titillium Web" panose="00000500000000000000" pitchFamily="2" charset="0"/>
+              </a:rPr>
+              <a:t>,</a:t>
+            </a:r>
+          </a:p>
+          <a:p>
+            <a:pPr marL="0" indent="0">
+              <a:buNone/>
+            </a:pPr>
+            <a:r>
+              <a:rPr lang="en-US" sz="1800" b="1" dirty="0">
+                <a:latin typeface="Titillium Web" panose="00000500000000000000" pitchFamily="2" charset="0"/>
+              </a:rPr>
+              <a:t>	</a:t>
+            </a:r>
+            <a:r>
+              <a:rPr lang="en-US" sz="1800" b="1" dirty="0" err="1">
+                <a:latin typeface="Titillium Web" panose="00000500000000000000" pitchFamily="2" charset="0"/>
+              </a:rPr>
+              <a:t>kako</a:t>
+            </a:r>
+            <a:r>
+              <a:rPr lang="en-US" sz="1800" b="1" dirty="0">
+                <a:latin typeface="Titillium Web" panose="00000500000000000000" pitchFamily="2" charset="0"/>
+              </a:rPr>
+              <a:t> </a:t>
+            </a:r>
+            <a:r>
+              <a:rPr lang="en-US" sz="1800" b="1" dirty="0" err="1">
+                <a:latin typeface="Titillium Web" panose="00000500000000000000" pitchFamily="2" charset="0"/>
+              </a:rPr>
+              <a:t>diagnosticirati</a:t>
+            </a:r>
+            <a:r>
+              <a:rPr lang="en-US" sz="1800" b="1" dirty="0">
+                <a:latin typeface="Titillium Web" panose="00000500000000000000" pitchFamily="2" charset="0"/>
+              </a:rPr>
+              <a:t> </a:t>
+            </a:r>
+            <a:r>
+              <a:rPr lang="en-US" sz="1800" b="1" dirty="0" err="1">
+                <a:latin typeface="Titillium Web" panose="00000500000000000000" pitchFamily="2" charset="0"/>
+              </a:rPr>
+              <a:t>rezultate</a:t>
+            </a:r>
+            <a:r>
+              <a:rPr lang="en-US" sz="1800" b="1" dirty="0">
+                <a:latin typeface="Titillium Web" panose="00000500000000000000" pitchFamily="2" charset="0"/>
+              </a:rPr>
+              <a:t> in </a:t>
+            </a:r>
+            <a:r>
+              <a:rPr lang="en-US" sz="1800" b="1" dirty="0" err="1">
+                <a:latin typeface="Titillium Web" panose="00000500000000000000" pitchFamily="2" charset="0"/>
+              </a:rPr>
+              <a:t>ekstrahirati</a:t>
+            </a:r>
+            <a:r>
+              <a:rPr lang="en-US" sz="1800" b="1" dirty="0">
+                <a:latin typeface="Titillium Web" panose="00000500000000000000" pitchFamily="2" charset="0"/>
+              </a:rPr>
+              <a:t> </a:t>
+            </a:r>
+            <a:r>
+              <a:rPr lang="en-US" sz="1800" b="1" dirty="0" err="1">
+                <a:latin typeface="Titillium Web" panose="00000500000000000000" pitchFamily="2" charset="0"/>
+              </a:rPr>
+              <a:t>vrednosti</a:t>
+            </a:r>
+            <a:r>
+              <a:rPr lang="en-US" sz="1800" b="1" dirty="0">
+                <a:latin typeface="Titillium Web" panose="00000500000000000000" pitchFamily="2" charset="0"/>
+              </a:rPr>
+              <a:t> </a:t>
+            </a:r>
+            <a:r>
+              <a:rPr lang="en-US" sz="1800" b="1" dirty="0" err="1">
+                <a:latin typeface="Titillium Web" panose="00000500000000000000" pitchFamily="2" charset="0"/>
+              </a:rPr>
+              <a:t>parametrov</a:t>
             </a:r>
             <a:endParaRPr lang="en-US" sz="1800" b="1" dirty="0">
               <a:latin typeface="Titillium Web" panose="00000500000000000000" pitchFamily="2" charset="0"/>
             </a:endParaRPr>
           </a:p>
           <a:p>
-            <a:pPr marL="342900" indent="-342900">
-              <a:buFont typeface="+mj-lt"/>
-              <a:buAutoNum type="arabicPeriod"/>
+            <a:pPr marL="0" indent="0">
+              <a:buNone/>
             </a:pPr>
             <a:endParaRPr lang="en-US" sz="1800" b="1" dirty="0">
               <a:latin typeface="Titillium Web" panose="00000500000000000000" pitchFamily="2" charset="0"/>
             </a:endParaRPr>
           </a:p>
           <a:p>
-            <a:pPr marL="342900" indent="-342900">
-              <a:buFont typeface="+mj-lt"/>
-              <a:buAutoNum type="arabicPeriod"/>
-            </a:pPr>
-            <a:r>
-              <a:rPr lang="en-US" sz="1800" b="1" dirty="0">
-                <a:latin typeface="Titillium Web" panose="00000500000000000000" pitchFamily="2" charset="0"/>
-              </a:rPr>
-              <a:t>Normal – temperature 1980-2010 vs 2010+</a:t>
-            </a:r>
-          </a:p>
-          <a:p>
-            <a:pPr marL="342900" indent="-342900">
-              <a:buFont typeface="+mj-lt"/>
-              <a:buAutoNum type="arabicPeriod"/>
+            <a:pPr marL="0" indent="0">
+              <a:buNone/>
             </a:pPr>
             <a:endParaRPr lang="en-US" sz="1800" b="1" dirty="0">
               <a:latin typeface="Titillium Web" panose="00000500000000000000" pitchFamily="2" charset="0"/>
             </a:endParaRPr>
           </a:p>
           <a:p>
-            <a:pPr marL="342900" indent="-342900">
+            <a:pPr marL="800100" lvl="1" indent="-342900">
               <a:buFont typeface="+mj-lt"/>
               <a:buAutoNum type="arabicPeriod"/>
             </a:pPr>
-            <a:r>
-              <a:rPr lang="en-US" sz="1800" b="1" dirty="0">
-                <a:latin typeface="Titillium Web" panose="00000500000000000000" pitchFamily="2" charset="0"/>
-              </a:rPr>
-              <a:t>Linear normal regression – </a:t>
-            </a:r>
-            <a:r>
-              <a:rPr lang="en-US" sz="1800" b="1" dirty="0" err="1">
-                <a:latin typeface="Titillium Web" panose="00000500000000000000" pitchFamily="2" charset="0"/>
-              </a:rPr>
-              <a:t>rast</a:t>
-            </a:r>
-            <a:r>
-              <a:rPr lang="en-US" sz="1800" b="1" dirty="0">
-                <a:latin typeface="Titillium Web" panose="00000500000000000000" pitchFamily="2" charset="0"/>
-              </a:rPr>
-              <a:t> temperature od 1900 </a:t>
-            </a:r>
-            <a:r>
-              <a:rPr lang="en-US" sz="1800" b="1" dirty="0" err="1">
-                <a:latin typeface="Titillium Web" panose="00000500000000000000" pitchFamily="2" charset="0"/>
-              </a:rPr>
-              <a:t>naprej</a:t>
-            </a:r>
-            <a:endParaRPr lang="en-US" sz="1800" b="1" dirty="0">
-              <a:latin typeface="Titillium Web" panose="00000500000000000000" pitchFamily="2" charset="0"/>
-            </a:endParaRPr>
-          </a:p>
-          <a:p>
-            <a:pPr marL="342900" indent="-342900">
-              <a:buFont typeface="+mj-lt"/>
-              <a:buAutoNum type="arabicPeriod"/>
-            </a:pPr>
-            <a:endParaRPr lang="en-US" sz="1800" b="1" dirty="0">
-              <a:latin typeface="Titillium Web" panose="00000500000000000000" pitchFamily="2" charset="0"/>
-            </a:endParaRPr>
-          </a:p>
-          <a:p>
-            <a:pPr marL="342900" indent="-342900">
-              <a:buFont typeface="+mj-lt"/>
-              <a:buAutoNum type="arabicPeriod"/>
-            </a:pPr>
-            <a:r>
-              <a:rPr lang="en-US" sz="1800" b="1" dirty="0">
-                <a:latin typeface="Titillium Web" panose="00000500000000000000" pitchFamily="2" charset="0"/>
-              </a:rPr>
-              <a:t>Multiple linear normal regression</a:t>
-            </a:r>
-          </a:p>
-          <a:p>
-            <a:pPr marL="342900" indent="-342900">
-              <a:buFont typeface="+mj-lt"/>
-              <a:buAutoNum type="arabicPeriod"/>
-            </a:pPr>
-            <a:endParaRPr lang="en-US" sz="1800" b="1" dirty="0">
-              <a:latin typeface="Titillium Web" panose="00000500000000000000" pitchFamily="2" charset="0"/>
-            </a:endParaRPr>
-          </a:p>
-          <a:p>
-            <a:pPr marL="342900" indent="-342900">
-              <a:buFont typeface="+mj-lt"/>
-              <a:buAutoNum type="arabicPeriod"/>
-            </a:pPr>
-            <a:r>
-              <a:rPr lang="en-US" sz="1800" b="1" dirty="0">
-                <a:latin typeface="Titillium Web" panose="00000500000000000000" pitchFamily="2" charset="0"/>
-              </a:rPr>
-              <a:t>?Beta regression – met </a:t>
-            </a:r>
-            <a:r>
-              <a:rPr lang="en-US" sz="1800" b="1" dirty="0" err="1">
-                <a:latin typeface="Titillium Web" panose="00000500000000000000" pitchFamily="2" charset="0"/>
-              </a:rPr>
-              <a:t>na</a:t>
-            </a:r>
-            <a:r>
-              <a:rPr lang="en-US" sz="1800" b="1" dirty="0">
-                <a:latin typeface="Titillium Web" panose="00000500000000000000" pitchFamily="2" charset="0"/>
-              </a:rPr>
-              <a:t> </a:t>
-            </a:r>
-            <a:r>
-              <a:rPr lang="en-US" sz="1800" b="1" dirty="0" err="1">
-                <a:latin typeface="Titillium Web" panose="00000500000000000000" pitchFamily="2" charset="0"/>
-              </a:rPr>
-              <a:t>koš</a:t>
-            </a:r>
-            <a:r>
-              <a:rPr lang="en-US" sz="1800" b="1" dirty="0">
-                <a:latin typeface="Titillium Web" panose="00000500000000000000" pitchFamily="2" charset="0"/>
-              </a:rPr>
-              <a:t> + </a:t>
-            </a:r>
-            <a:r>
-              <a:rPr lang="en-US" sz="1800" b="1" dirty="0" err="1">
-                <a:latin typeface="Titillium Web" panose="00000500000000000000" pitchFamily="2" charset="0"/>
-              </a:rPr>
-              <a:t>časovna</a:t>
-            </a:r>
-            <a:r>
-              <a:rPr lang="en-US" sz="1800" b="1" dirty="0">
-                <a:latin typeface="Titillium Web" panose="00000500000000000000" pitchFamily="2" charset="0"/>
-              </a:rPr>
-              <a:t> </a:t>
-            </a:r>
-            <a:r>
-              <a:rPr lang="en-US" sz="1800" b="1" dirty="0" err="1">
-                <a:latin typeface="Titillium Web" panose="00000500000000000000" pitchFamily="2" charset="0"/>
-              </a:rPr>
-              <a:t>komponenta</a:t>
-            </a:r>
-            <a:endParaRPr lang="en-US" sz="1800" b="1" dirty="0">
-              <a:latin typeface="Titillium Web" panose="00000500000000000000" pitchFamily="2" charset="0"/>
-            </a:endParaRPr>
-          </a:p>
-          <a:p>
-            <a:pPr marL="342900" indent="-342900">
-              <a:buFont typeface="+mj-lt"/>
-              <a:buAutoNum type="arabicPeriod"/>
-            </a:pPr>
-            <a:endParaRPr lang="en-US" sz="1800" b="1" dirty="0">
-              <a:latin typeface="Titillium Web" panose="00000500000000000000" pitchFamily="2" charset="0"/>
-            </a:endParaRPr>
-          </a:p>
-          <a:p>
-            <a:pPr marL="342900" indent="-342900">
-              <a:buFont typeface="+mj-lt"/>
-              <a:buAutoNum type="arabicPeriod"/>
-            </a:pPr>
-            <a:r>
-              <a:rPr lang="en-US" sz="1800" b="1" dirty="0">
-                <a:latin typeface="Titillium Web" panose="00000500000000000000" pitchFamily="2" charset="0"/>
-              </a:rPr>
-              <a:t>?Elections modelling</a:t>
-            </a:r>
-          </a:p>
-          <a:p>
-            <a:pPr marL="342900" indent="-342900">
-              <a:buFont typeface="+mj-lt"/>
-              <a:buAutoNum type="arabicPeriod"/>
-            </a:pPr>
-            <a:endParaRPr lang="en-US" sz="1800" b="1" dirty="0">
-              <a:latin typeface="Titillium Web" panose="00000500000000000000" pitchFamily="2" charset="0"/>
-            </a:endParaRPr>
-          </a:p>
-          <a:p>
-            <a:pPr marL="342900" indent="-342900">
-              <a:buFont typeface="+mj-lt"/>
-              <a:buAutoNum type="arabicPeriod"/>
-            </a:pPr>
-            <a:endParaRPr lang="en-US" sz="1800" b="1" dirty="0">
-              <a:latin typeface="Titillium Web" panose="00000500000000000000" pitchFamily="2" charset="0"/>
-            </a:endParaRPr>
-          </a:p>
-          <a:p>
-            <a:pPr marL="342900" indent="-342900">
-              <a:buFont typeface="+mj-lt"/>
-              <a:buAutoNum type="arabicPeriod"/>
-            </a:pPr>
-            <a:endParaRPr lang="en-US" sz="1400" dirty="0">
+            <a:endParaRPr lang="en-US" sz="1000" dirty="0">
               <a:latin typeface="Titillium Web" panose="00000500000000000000" pitchFamily="2" charset="0"/>
             </a:endParaRPr>
           </a:p>
@@ -19290,7 +19353,7 @@
     </p:spTree>
     <p:extLst>
       <p:ext uri="{BB962C8B-B14F-4D97-AF65-F5344CB8AC3E}">
-        <p14:creationId xmlns:p14="http://schemas.microsoft.com/office/powerpoint/2010/main" val="2337928870"/>
+        <p14:creationId xmlns:p14="http://schemas.microsoft.com/office/powerpoint/2010/main" val="858001317"/>
       </p:ext>
     </p:extLst>
   </p:cSld>
@@ -19344,7 +19407,13 @@
               <a:rPr lang="en-US" sz="3600" b="1" dirty="0" err="1">
                 <a:latin typeface="Titillium Web" panose="00000500000000000000" pitchFamily="2" charset="-18"/>
               </a:rPr>
-              <a:t>TODO</a:t>
+              <a:t>Uvodni</a:t>
+            </a:r>
+            <a:r>
+              <a:rPr lang="en-US" sz="3600" b="1" dirty="0">
+                <a:latin typeface="Titillium Web" panose="00000500000000000000" pitchFamily="2" charset="-18"/>
+              </a:rPr>
+              <a:t> primer</a:t>
             </a:r>
             <a:endParaRPr lang="LID4096" sz="3600" dirty="0"/>
           </a:p>
@@ -19677,6 +19746,317 @@
     <p:extLst>
       <p:ext uri="{BB962C8B-B14F-4D97-AF65-F5344CB8AC3E}">
         <p14:creationId xmlns:p14="http://schemas.microsoft.com/office/powerpoint/2010/main" val="2211003054"/>
+      </p:ext>
+    </p:extLst>
+  </p:cSld>
+  <p:clrMapOvr>
+    <a:masterClrMapping/>
+  </p:clrMapOvr>
+</p:sld>
+</file>
+
+<file path=ppt/slides/slide44.xml><?xml version="1.0" encoding="utf-8"?>
+<p:sld xmlns:a="http://schemas.openxmlformats.org/drawingml/2006/main" xmlns:r="http://schemas.openxmlformats.org/officeDocument/2006/relationships" xmlns:p="http://schemas.openxmlformats.org/presentationml/2006/main">
+  <p:cSld>
+    <p:spTree>
+      <p:nvGrpSpPr>
+        <p:cNvPr id="1" name=""/>
+        <p:cNvGrpSpPr/>
+        <p:nvPr/>
+      </p:nvGrpSpPr>
+      <p:grpSpPr>
+        <a:xfrm>
+          <a:off x="0" y="0"/>
+          <a:ext cx="0" cy="0"/>
+          <a:chOff x="0" y="0"/>
+          <a:chExt cx="0" cy="0"/>
+        </a:xfrm>
+      </p:grpSpPr>
+      <p:sp>
+        <p:nvSpPr>
+          <p:cNvPr id="5" name="Title 4">
+            <a:extLst>
+              <a:ext uri="{FF2B5EF4-FFF2-40B4-BE49-F238E27FC236}">
+                <a16:creationId xmlns:a16="http://schemas.microsoft.com/office/drawing/2014/main" id="{A519C6CC-6F4C-4DD7-B31D-9857C9BFE024}"/>
+              </a:ext>
+            </a:extLst>
+          </p:cNvPr>
+          <p:cNvSpPr>
+            <a:spLocks noGrp="1"/>
+          </p:cNvSpPr>
+          <p:nvPr>
+            <p:ph type="title"/>
+          </p:nvPr>
+        </p:nvSpPr>
+        <p:spPr/>
+        <p:txBody>
+          <a:bodyPr>
+            <a:normAutofit/>
+          </a:bodyPr>
+          <a:lstStyle/>
+          <a:p>
+            <a:r>
+              <a:rPr lang="en-US" sz="3600" b="1" dirty="0" err="1">
+                <a:latin typeface="Titillium Web" panose="00000500000000000000" pitchFamily="2" charset="-18"/>
+              </a:rPr>
+              <a:t>TODO</a:t>
+            </a:r>
+            <a:r>
+              <a:rPr lang="en-US" sz="3600" b="1" dirty="0">
+                <a:latin typeface="Titillium Web" panose="00000500000000000000" pitchFamily="2" charset="-18"/>
+              </a:rPr>
+              <a:t> </a:t>
+            </a:r>
+            <a:r>
+              <a:rPr lang="en-US" sz="3600" b="1" dirty="0" err="1">
+                <a:latin typeface="Titillium Web" panose="00000500000000000000" pitchFamily="2" charset="-18"/>
+              </a:rPr>
+              <a:t>OPIS</a:t>
+            </a:r>
+            <a:r>
+              <a:rPr lang="en-US" sz="3600" b="1" dirty="0">
+                <a:latin typeface="Titillium Web" panose="00000500000000000000" pitchFamily="2" charset="-18"/>
+              </a:rPr>
+              <a:t> </a:t>
+            </a:r>
+            <a:r>
+              <a:rPr lang="en-US" sz="3600" b="1" dirty="0" err="1">
+                <a:latin typeface="Titillium Web" panose="00000500000000000000" pitchFamily="2" charset="-18"/>
+              </a:rPr>
+              <a:t>PROBLEMOV</a:t>
+            </a:r>
+            <a:r>
+              <a:rPr lang="en-US" sz="3600" b="1" dirty="0">
+                <a:latin typeface="Titillium Web" panose="00000500000000000000" pitchFamily="2" charset="-18"/>
+              </a:rPr>
+              <a:t> TER </a:t>
+            </a:r>
+            <a:r>
+              <a:rPr lang="en-US" sz="3600" b="1" dirty="0" err="1">
+                <a:latin typeface="Titillium Web" panose="00000500000000000000" pitchFamily="2" charset="-18"/>
+              </a:rPr>
+              <a:t>NAMIGI</a:t>
+            </a:r>
+            <a:endParaRPr lang="LID4096" sz="3600" dirty="0"/>
+          </a:p>
+        </p:txBody>
+      </p:sp>
+      <p:sp>
+        <p:nvSpPr>
+          <p:cNvPr id="2" name="Content Placeholder 1">
+            <a:extLst>
+              <a:ext uri="{FF2B5EF4-FFF2-40B4-BE49-F238E27FC236}">
+                <a16:creationId xmlns:a16="http://schemas.microsoft.com/office/drawing/2014/main" id="{4B5EA119-4747-4D32-9491-BFA819BAF1C9}"/>
+              </a:ext>
+            </a:extLst>
+          </p:cNvPr>
+          <p:cNvSpPr>
+            <a:spLocks noGrp="1"/>
+          </p:cNvSpPr>
+          <p:nvPr>
+            <p:ph sz="half" idx="1"/>
+          </p:nvPr>
+        </p:nvSpPr>
+        <p:spPr>
+          <a:xfrm>
+            <a:off x="838200" y="1825625"/>
+            <a:ext cx="10515600" cy="4351338"/>
+          </a:xfrm>
+        </p:spPr>
+        <p:txBody>
+          <a:bodyPr>
+            <a:normAutofit/>
+          </a:bodyPr>
+          <a:lstStyle/>
+          <a:p>
+            <a:pPr marL="342900" indent="-342900">
+              <a:buFont typeface="+mj-lt"/>
+              <a:buAutoNum type="arabicPeriod"/>
+            </a:pPr>
+            <a:r>
+              <a:rPr lang="en-US" sz="1800" b="1" dirty="0">
+                <a:latin typeface="Titillium Web" panose="00000500000000000000" pitchFamily="2" charset="0"/>
+              </a:rPr>
+              <a:t>Bernoulli-beta </a:t>
+            </a:r>
+            <a:r>
+              <a:rPr lang="en-US" sz="1800" b="1" dirty="0" err="1">
+                <a:latin typeface="Titillium Web" panose="00000500000000000000" pitchFamily="2" charset="0"/>
+              </a:rPr>
+              <a:t>meti</a:t>
+            </a:r>
+            <a:r>
+              <a:rPr lang="en-US" sz="1800" b="1" dirty="0">
+                <a:latin typeface="Titillium Web" panose="00000500000000000000" pitchFamily="2" charset="0"/>
+              </a:rPr>
+              <a:t> </a:t>
+            </a:r>
+            <a:r>
+              <a:rPr lang="en-US" sz="1800" b="1" dirty="0" err="1">
+                <a:latin typeface="Titillium Web" panose="00000500000000000000" pitchFamily="2" charset="0"/>
+              </a:rPr>
+              <a:t>na</a:t>
+            </a:r>
+            <a:r>
+              <a:rPr lang="en-US" sz="1800" b="1" dirty="0">
+                <a:latin typeface="Titillium Web" panose="00000500000000000000" pitchFamily="2" charset="0"/>
+              </a:rPr>
+              <a:t> </a:t>
+            </a:r>
+            <a:r>
+              <a:rPr lang="en-US" sz="1800" b="1" dirty="0" err="1">
+                <a:latin typeface="Titillium Web" panose="00000500000000000000" pitchFamily="2" charset="0"/>
+              </a:rPr>
+              <a:t>koš</a:t>
+            </a:r>
+            <a:endParaRPr lang="en-US" sz="1800" b="1" dirty="0">
+              <a:latin typeface="Titillium Web" panose="00000500000000000000" pitchFamily="2" charset="0"/>
+            </a:endParaRPr>
+          </a:p>
+          <a:p>
+            <a:pPr marL="342900" indent="-342900">
+              <a:buFont typeface="+mj-lt"/>
+              <a:buAutoNum type="arabicPeriod"/>
+            </a:pPr>
+            <a:endParaRPr lang="en-US" sz="1800" b="1" dirty="0">
+              <a:latin typeface="Titillium Web" panose="00000500000000000000" pitchFamily="2" charset="0"/>
+            </a:endParaRPr>
+          </a:p>
+          <a:p>
+            <a:pPr marL="342900" indent="-342900">
+              <a:buFont typeface="+mj-lt"/>
+              <a:buAutoNum type="arabicPeriod"/>
+            </a:pPr>
+            <a:r>
+              <a:rPr lang="en-US" sz="1800" b="1" dirty="0">
+                <a:latin typeface="Titillium Web" panose="00000500000000000000" pitchFamily="2" charset="0"/>
+              </a:rPr>
+              <a:t>Normal – temperature 1980-2010 vs 2010+</a:t>
+            </a:r>
+          </a:p>
+          <a:p>
+            <a:pPr marL="342900" indent="-342900">
+              <a:buFont typeface="+mj-lt"/>
+              <a:buAutoNum type="arabicPeriod"/>
+            </a:pPr>
+            <a:endParaRPr lang="en-US" sz="1800" b="1" dirty="0">
+              <a:latin typeface="Titillium Web" panose="00000500000000000000" pitchFamily="2" charset="0"/>
+            </a:endParaRPr>
+          </a:p>
+          <a:p>
+            <a:pPr marL="342900" indent="-342900">
+              <a:buFont typeface="+mj-lt"/>
+              <a:buAutoNum type="arabicPeriod"/>
+            </a:pPr>
+            <a:r>
+              <a:rPr lang="en-US" sz="1800" b="1" dirty="0">
+                <a:latin typeface="Titillium Web" panose="00000500000000000000" pitchFamily="2" charset="0"/>
+              </a:rPr>
+              <a:t>Linear normal regression – </a:t>
+            </a:r>
+            <a:r>
+              <a:rPr lang="en-US" sz="1800" b="1" dirty="0" err="1">
+                <a:latin typeface="Titillium Web" panose="00000500000000000000" pitchFamily="2" charset="0"/>
+              </a:rPr>
+              <a:t>rast</a:t>
+            </a:r>
+            <a:r>
+              <a:rPr lang="en-US" sz="1800" b="1" dirty="0">
+                <a:latin typeface="Titillium Web" panose="00000500000000000000" pitchFamily="2" charset="0"/>
+              </a:rPr>
+              <a:t> temperature od 1900 </a:t>
+            </a:r>
+            <a:r>
+              <a:rPr lang="en-US" sz="1800" b="1" dirty="0" err="1">
+                <a:latin typeface="Titillium Web" panose="00000500000000000000" pitchFamily="2" charset="0"/>
+              </a:rPr>
+              <a:t>naprej</a:t>
+            </a:r>
+            <a:endParaRPr lang="en-US" sz="1800" b="1" dirty="0">
+              <a:latin typeface="Titillium Web" panose="00000500000000000000" pitchFamily="2" charset="0"/>
+            </a:endParaRPr>
+          </a:p>
+          <a:p>
+            <a:pPr marL="342900" indent="-342900">
+              <a:buFont typeface="+mj-lt"/>
+              <a:buAutoNum type="arabicPeriod"/>
+            </a:pPr>
+            <a:endParaRPr lang="en-US" sz="1800" b="1" dirty="0">
+              <a:latin typeface="Titillium Web" panose="00000500000000000000" pitchFamily="2" charset="0"/>
+            </a:endParaRPr>
+          </a:p>
+          <a:p>
+            <a:pPr marL="342900" indent="-342900">
+              <a:buFont typeface="+mj-lt"/>
+              <a:buAutoNum type="arabicPeriod"/>
+            </a:pPr>
+            <a:r>
+              <a:rPr lang="en-US" sz="1800" b="1" dirty="0">
+                <a:latin typeface="Titillium Web" panose="00000500000000000000" pitchFamily="2" charset="0"/>
+              </a:rPr>
+              <a:t>Multiple linear normal regression</a:t>
+            </a:r>
+          </a:p>
+          <a:p>
+            <a:pPr marL="342900" indent="-342900">
+              <a:buFont typeface="+mj-lt"/>
+              <a:buAutoNum type="arabicPeriod"/>
+            </a:pPr>
+            <a:endParaRPr lang="en-US" sz="1800" b="1" dirty="0">
+              <a:latin typeface="Titillium Web" panose="00000500000000000000" pitchFamily="2" charset="0"/>
+            </a:endParaRPr>
+          </a:p>
+          <a:p>
+            <a:pPr marL="342900" indent="-342900">
+              <a:buFont typeface="+mj-lt"/>
+              <a:buAutoNum type="arabicPeriod"/>
+            </a:pPr>
+            <a:r>
+              <a:rPr lang="en-US" sz="1800" b="1" dirty="0">
+                <a:latin typeface="Titillium Web" panose="00000500000000000000" pitchFamily="2" charset="0"/>
+              </a:rPr>
+              <a:t>?Elections modelling</a:t>
+            </a:r>
+          </a:p>
+          <a:p>
+            <a:pPr marL="342900" indent="-342900">
+              <a:buFont typeface="+mj-lt"/>
+              <a:buAutoNum type="arabicPeriod"/>
+            </a:pPr>
+            <a:endParaRPr lang="en-US" sz="1800" b="1" dirty="0">
+              <a:latin typeface="Titillium Web" panose="00000500000000000000" pitchFamily="2" charset="0"/>
+            </a:endParaRPr>
+          </a:p>
+          <a:p>
+            <a:pPr marL="342900" indent="-342900">
+              <a:buFont typeface="+mj-lt"/>
+              <a:buAutoNum type="arabicPeriod"/>
+            </a:pPr>
+            <a:endParaRPr lang="en-US" sz="1800" b="1" dirty="0">
+              <a:latin typeface="Titillium Web" panose="00000500000000000000" pitchFamily="2" charset="0"/>
+            </a:endParaRPr>
+          </a:p>
+          <a:p>
+            <a:pPr marL="342900" indent="-342900">
+              <a:buFont typeface="+mj-lt"/>
+              <a:buAutoNum type="arabicPeriod"/>
+            </a:pPr>
+            <a:endParaRPr lang="en-US" sz="1400" dirty="0">
+              <a:latin typeface="Titillium Web" panose="00000500000000000000" pitchFamily="2" charset="0"/>
+            </a:endParaRPr>
+          </a:p>
+          <a:p>
+            <a:pPr marL="457200" lvl="1" indent="0">
+              <a:buNone/>
+            </a:pPr>
+            <a:endParaRPr lang="en-US" sz="1400" dirty="0"/>
+          </a:p>
+        </p:txBody>
+      </p:sp>
+    </p:spTree>
+    <p:extLst>
+      <p:ext uri="{BB962C8B-B14F-4D97-AF65-F5344CB8AC3E}">
+        <p14:creationId xmlns:p14="http://schemas.microsoft.com/office/powerpoint/2010/main" val="2337928870"/>
       </p:ext>
     </p:extLst>
   </p:cSld>

</xml_diff>

<commit_message>
Updated materials, minor code tweaks.
</commit_message>
<xml_diff>
--- a/slides/prezentacija.pptx
+++ b/slides/prezentacija.pptx
@@ -301,7 +301,7 @@
           <a:p>
             <a:fld id="{6B41F776-2985-48C1-9143-45E81A31457D}" type="datetimeFigureOut">
               <a:rPr lang="sl-SI" smtClean="0"/>
-              <a:t>29. 05. 2019</a:t>
+              <a:t>30. 05. 2019</a:t>
             </a:fld>
             <a:endParaRPr lang="sl-SI"/>
           </a:p>
@@ -469,7 +469,7 @@
           <a:p>
             <a:fld id="{6B41F776-2985-48C1-9143-45E81A31457D}" type="datetimeFigureOut">
               <a:rPr lang="sl-SI" smtClean="0"/>
-              <a:t>29. 05. 2019</a:t>
+              <a:t>30. 05. 2019</a:t>
             </a:fld>
             <a:endParaRPr lang="sl-SI"/>
           </a:p>
@@ -647,7 +647,7 @@
           <a:p>
             <a:fld id="{6B41F776-2985-48C1-9143-45E81A31457D}" type="datetimeFigureOut">
               <a:rPr lang="sl-SI" smtClean="0"/>
-              <a:t>29. 05. 2019</a:t>
+              <a:t>30. 05. 2019</a:t>
             </a:fld>
             <a:endParaRPr lang="sl-SI"/>
           </a:p>
@@ -922,7 +922,7 @@
           <a:p>
             <a:fld id="{6B41F776-2985-48C1-9143-45E81A31457D}" type="datetimeFigureOut">
               <a:rPr lang="sl-SI" smtClean="0"/>
-              <a:t>29. 05. 2019</a:t>
+              <a:t>30. 05. 2019</a:t>
             </a:fld>
             <a:endParaRPr lang="sl-SI"/>
           </a:p>
@@ -1151,7 +1151,7 @@
           <a:p>
             <a:fld id="{6B41F776-2985-48C1-9143-45E81A31457D}" type="datetimeFigureOut">
               <a:rPr lang="sl-SI" smtClean="0"/>
-              <a:t>29. 05. 2019</a:t>
+              <a:t>30. 05. 2019</a:t>
             </a:fld>
             <a:endParaRPr lang="sl-SI"/>
           </a:p>
@@ -1515,7 +1515,7 @@
           <a:p>
             <a:fld id="{6B41F776-2985-48C1-9143-45E81A31457D}" type="datetimeFigureOut">
               <a:rPr lang="sl-SI" smtClean="0"/>
-              <a:t>29. 05. 2019</a:t>
+              <a:t>30. 05. 2019</a:t>
             </a:fld>
             <a:endParaRPr lang="sl-SI"/>
           </a:p>
@@ -1632,7 +1632,7 @@
           <a:p>
             <a:fld id="{6B41F776-2985-48C1-9143-45E81A31457D}" type="datetimeFigureOut">
               <a:rPr lang="sl-SI" smtClean="0"/>
-              <a:t>29. 05. 2019</a:t>
+              <a:t>30. 05. 2019</a:t>
             </a:fld>
             <a:endParaRPr lang="sl-SI"/>
           </a:p>
@@ -1727,7 +1727,7 @@
           <a:p>
             <a:fld id="{6B41F776-2985-48C1-9143-45E81A31457D}" type="datetimeFigureOut">
               <a:rPr lang="sl-SI" smtClean="0"/>
-              <a:t>29. 05. 2019</a:t>
+              <a:t>30. 05. 2019</a:t>
             </a:fld>
             <a:endParaRPr lang="sl-SI"/>
           </a:p>
@@ -2002,7 +2002,7 @@
           <a:p>
             <a:fld id="{6B41F776-2985-48C1-9143-45E81A31457D}" type="datetimeFigureOut">
               <a:rPr lang="sl-SI" smtClean="0"/>
-              <a:t>29. 05. 2019</a:t>
+              <a:t>30. 05. 2019</a:t>
             </a:fld>
             <a:endParaRPr lang="sl-SI"/>
           </a:p>
@@ -2254,7 +2254,7 @@
           <a:p>
             <a:fld id="{6B41F776-2985-48C1-9143-45E81A31457D}" type="datetimeFigureOut">
               <a:rPr lang="sl-SI" smtClean="0"/>
-              <a:t>29. 05. 2019</a:t>
+              <a:t>30. 05. 2019</a:t>
             </a:fld>
             <a:endParaRPr lang="sl-SI"/>
           </a:p>
@@ -2465,7 +2465,7 @@
           <a:p>
             <a:fld id="{6B41F776-2985-48C1-9143-45E81A31457D}" type="datetimeFigureOut">
               <a:rPr lang="sl-SI" smtClean="0"/>
-              <a:t>29. 05. 2019</a:t>
+              <a:t>30. 05. 2019</a:t>
             </a:fld>
             <a:endParaRPr lang="sl-SI"/>
           </a:p>
@@ -3602,11 +3602,11 @@
               </a:spcAft>
             </a:pPr>
             <a:br>
-              <a:rPr lang="sl-SI" sz="1800">
+              <a:rPr lang="sl-SI" sz="1800" dirty="0">
                 <a:latin typeface="Titillium Web" panose="00000500000000000000" pitchFamily="2" charset="-18"/>
               </a:rPr>
             </a:br>
-            <a:endParaRPr lang="sl-SI" sz="2400">
+            <a:endParaRPr lang="sl-SI" sz="2400" dirty="0">
               <a:latin typeface="Titillium Web" panose="00000500000000000000" pitchFamily="2" charset="-18"/>
             </a:endParaRPr>
           </a:p>
@@ -3619,7 +3619,7 @@
               <a:buChar char="•"/>
             </a:pPr>
             <a:r>
-              <a:rPr lang="en-US" sz="2400" err="1">
+              <a:rPr lang="en-US" sz="2400" dirty="0" err="1">
                 <a:solidFill>
                   <a:srgbClr val="FF0000"/>
                 </a:solidFill>
@@ -3628,7 +3628,7 @@
               <a:t>Porazdelitve</a:t>
             </a:r>
             <a:r>
-              <a:rPr lang="en-US" sz="2400">
+              <a:rPr lang="en-US" sz="2400" dirty="0">
                 <a:solidFill>
                   <a:srgbClr val="FF0000"/>
                 </a:solidFill>
@@ -3637,25 +3637,25 @@
               <a:t> </a:t>
             </a:r>
             <a:r>
-              <a:rPr lang="en-US" sz="2400">
+              <a:rPr lang="en-US" sz="2400" dirty="0">
                 <a:latin typeface="Titillium Web" panose="00000500000000000000" pitchFamily="2" charset="-18"/>
               </a:rPr>
               <a:t>so </a:t>
             </a:r>
             <a:r>
-              <a:rPr lang="en-US" sz="2400" err="1">
+              <a:rPr lang="en-US" sz="2400" dirty="0" err="1">
                 <a:latin typeface="Titillium Web" panose="00000500000000000000" pitchFamily="2" charset="-18"/>
               </a:rPr>
               <a:t>elementarni</a:t>
             </a:r>
             <a:r>
-              <a:rPr lang="en-US" sz="2400">
-                <a:latin typeface="Titillium Web" panose="00000500000000000000" pitchFamily="2" charset="-18"/>
-              </a:rPr>
-              <a:t> </a:t>
-            </a:r>
-            <a:r>
-              <a:rPr lang="en-US" sz="2400" err="1">
+              <a:rPr lang="en-US" sz="2400" dirty="0">
+                <a:latin typeface="Titillium Web" panose="00000500000000000000" pitchFamily="2" charset="-18"/>
+              </a:rPr>
+              <a:t> </a:t>
+            </a:r>
+            <a:r>
+              <a:rPr lang="en-US" sz="2400" dirty="0" err="1">
                 <a:solidFill>
                   <a:srgbClr val="FF0000"/>
                 </a:solidFill>
@@ -3664,7 +3664,7 @@
               <a:t>izrazi</a:t>
             </a:r>
             <a:r>
-              <a:rPr lang="en-US" sz="2400">
+              <a:rPr lang="en-US" sz="2400" dirty="0">
                 <a:solidFill>
                   <a:srgbClr val="FF0000"/>
                 </a:solidFill>
@@ -3673,7 +3673,7 @@
               <a:t> </a:t>
             </a:r>
             <a:r>
-              <a:rPr lang="en-US" sz="2400" err="1">
+              <a:rPr lang="en-US" sz="2400" dirty="0" err="1">
                 <a:solidFill>
                   <a:srgbClr val="FF0000"/>
                 </a:solidFill>
@@ -3682,7 +3682,7 @@
               <a:t>probabilističnega</a:t>
             </a:r>
             <a:r>
-              <a:rPr lang="en-US" sz="2400">
+              <a:rPr lang="en-US" sz="2400" dirty="0">
                 <a:solidFill>
                   <a:srgbClr val="FF0000"/>
                 </a:solidFill>
@@ -3691,7 +3691,7 @@
               <a:t> </a:t>
             </a:r>
             <a:r>
-              <a:rPr lang="en-US" sz="2400" err="1">
+              <a:rPr lang="en-US" sz="2400" dirty="0" err="1">
                 <a:solidFill>
                   <a:srgbClr val="FF0000"/>
                 </a:solidFill>
@@ -3700,7 +3700,7 @@
               <a:t>razmišljanja</a:t>
             </a:r>
             <a:r>
-              <a:rPr lang="en-US" sz="2400">
+              <a:rPr lang="en-US" sz="2400" dirty="0">
                 <a:solidFill>
                   <a:srgbClr val="FF0000"/>
                 </a:solidFill>
@@ -3709,12 +3709,12 @@
               <a:t> </a:t>
             </a:r>
             <a:r>
-              <a:rPr lang="en-US" sz="2400">
+              <a:rPr lang="en-US" sz="2400" dirty="0">
                 <a:latin typeface="Titillium Web" panose="00000500000000000000" pitchFamily="2" charset="-18"/>
               </a:rPr>
               <a:t>in</a:t>
             </a:r>
-            <a:endParaRPr lang="sl-SI" sz="2400">
+            <a:endParaRPr lang="sl-SI" sz="2400" dirty="0">
               <a:latin typeface="Titillium Web" panose="00000500000000000000" pitchFamily="2" charset="-18"/>
             </a:endParaRPr>
           </a:p>
@@ -3727,49 +3727,49 @@
               <a:buChar char="•"/>
             </a:pPr>
             <a:r>
-              <a:rPr lang="en-US" sz="2400" err="1">
+              <a:rPr lang="en-US" sz="2400" dirty="0" err="1">
                 <a:latin typeface="Titillium Web" panose="00000500000000000000" pitchFamily="2" charset="-18"/>
               </a:rPr>
               <a:t>osnovni</a:t>
             </a:r>
             <a:r>
-              <a:rPr lang="en-US" sz="2400">
-                <a:latin typeface="Titillium Web" panose="00000500000000000000" pitchFamily="2" charset="-18"/>
-              </a:rPr>
-              <a:t> </a:t>
-            </a:r>
-            <a:r>
-              <a:rPr lang="en-US" sz="2400" err="1">
+              <a:rPr lang="en-US" sz="2400" dirty="0">
+                <a:latin typeface="Titillium Web" panose="00000500000000000000" pitchFamily="2" charset="-18"/>
+              </a:rPr>
+              <a:t> </a:t>
+            </a:r>
+            <a:r>
+              <a:rPr lang="en-US" sz="2400" dirty="0" err="1">
                 <a:latin typeface="Titillium Web" panose="00000500000000000000" pitchFamily="2" charset="-18"/>
               </a:rPr>
               <a:t>gradniki</a:t>
             </a:r>
             <a:r>
-              <a:rPr lang="en-US" sz="2400">
-                <a:latin typeface="Titillium Web" panose="00000500000000000000" pitchFamily="2" charset="-18"/>
-              </a:rPr>
-              <a:t> </a:t>
-            </a:r>
-            <a:r>
-              <a:rPr lang="en-US" sz="2400" err="1">
+              <a:rPr lang="en-US" sz="2400" dirty="0">
+                <a:latin typeface="Titillium Web" panose="00000500000000000000" pitchFamily="2" charset="-18"/>
+              </a:rPr>
+              <a:t> </a:t>
+            </a:r>
+            <a:r>
+              <a:rPr lang="en-US" sz="2400" dirty="0" err="1">
                 <a:latin typeface="Titillium Web" panose="00000500000000000000" pitchFamily="2" charset="-18"/>
               </a:rPr>
               <a:t>statističnih</a:t>
             </a:r>
             <a:r>
-              <a:rPr lang="en-US" sz="2400">
-                <a:latin typeface="Titillium Web" panose="00000500000000000000" pitchFamily="2" charset="-18"/>
-              </a:rPr>
-              <a:t> </a:t>
-            </a:r>
-            <a:r>
-              <a:rPr lang="en-US" sz="2400" err="1">
+              <a:rPr lang="en-US" sz="2400" dirty="0">
+                <a:latin typeface="Titillium Web" panose="00000500000000000000" pitchFamily="2" charset="-18"/>
+              </a:rPr>
+              <a:t> </a:t>
+            </a:r>
+            <a:r>
+              <a:rPr lang="en-US" sz="2400" dirty="0" err="1">
                 <a:latin typeface="Titillium Web" panose="00000500000000000000" pitchFamily="2" charset="-18"/>
               </a:rPr>
               <a:t>modelov</a:t>
             </a:r>
             <a:r>
-              <a:rPr lang="sl-SI" sz="2400">
+              <a:rPr lang="sl-SI" sz="2400" dirty="0">
                 <a:latin typeface="Titillium Web" panose="00000500000000000000" pitchFamily="2" charset="-18"/>
               </a:rPr>
               <a:t>.</a:t>
@@ -3784,79 +3784,79 @@
               <a:buChar char="•"/>
             </a:pPr>
             <a:r>
-              <a:rPr lang="en-US" sz="2400" err="1">
+              <a:rPr lang="en-US" sz="2400" dirty="0" err="1">
                 <a:latin typeface="Titillium Web" panose="00000500000000000000" pitchFamily="2" charset="-18"/>
               </a:rPr>
               <a:t>Porazdelitve</a:t>
             </a:r>
             <a:r>
-              <a:rPr lang="en-US" sz="2400">
+              <a:rPr lang="en-US" sz="2400" dirty="0">
                 <a:latin typeface="Titillium Web" panose="00000500000000000000" pitchFamily="2" charset="-18"/>
               </a:rPr>
               <a:t> so v </a:t>
             </a:r>
             <a:r>
-              <a:rPr lang="en-US" sz="2400" err="1">
+              <a:rPr lang="en-US" sz="2400" dirty="0" err="1">
                 <a:latin typeface="Titillium Web" panose="00000500000000000000" pitchFamily="2" charset="-18"/>
               </a:rPr>
               <a:t>skladu</a:t>
             </a:r>
             <a:r>
-              <a:rPr lang="en-US" sz="2400">
+              <a:rPr lang="en-US" sz="2400" dirty="0">
                 <a:latin typeface="Titillium Web" panose="00000500000000000000" pitchFamily="2" charset="-18"/>
               </a:rPr>
               <a:t> s </a:t>
             </a:r>
             <a:r>
-              <a:rPr lang="en-US" sz="2400" err="1">
+              <a:rPr lang="en-US" sz="2400" dirty="0" err="1">
                 <a:latin typeface="Titillium Web" panose="00000500000000000000" pitchFamily="2" charset="-18"/>
               </a:rPr>
               <a:t>pravili</a:t>
             </a:r>
             <a:r>
-              <a:rPr lang="en-US" sz="2400">
-                <a:latin typeface="Titillium Web" panose="00000500000000000000" pitchFamily="2" charset="-18"/>
-              </a:rPr>
-              <a:t> </a:t>
-            </a:r>
-            <a:r>
-              <a:rPr lang="en-US" sz="2400" err="1">
+              <a:rPr lang="en-US" sz="2400" dirty="0">
+                <a:latin typeface="Titillium Web" panose="00000500000000000000" pitchFamily="2" charset="-18"/>
+              </a:rPr>
+              <a:t> </a:t>
+            </a:r>
+            <a:r>
+              <a:rPr lang="en-US" sz="2400" dirty="0" err="1">
                 <a:latin typeface="Titillium Web" panose="00000500000000000000" pitchFamily="2" charset="-18"/>
               </a:rPr>
               <a:t>teorije</a:t>
             </a:r>
             <a:r>
-              <a:rPr lang="en-US" sz="2400">
-                <a:latin typeface="Titillium Web" panose="00000500000000000000" pitchFamily="2" charset="-18"/>
-              </a:rPr>
-              <a:t> </a:t>
-            </a:r>
-            <a:r>
-              <a:rPr lang="en-US" sz="2400" err="1">
+              <a:rPr lang="en-US" sz="2400" dirty="0">
+                <a:latin typeface="Titillium Web" panose="00000500000000000000" pitchFamily="2" charset="-18"/>
+              </a:rPr>
+              <a:t> </a:t>
+            </a:r>
+            <a:r>
+              <a:rPr lang="en-US" sz="2400" dirty="0" err="1">
                 <a:latin typeface="Titillium Web" panose="00000500000000000000" pitchFamily="2" charset="-18"/>
               </a:rPr>
               <a:t>verjetnosti</a:t>
             </a:r>
             <a:r>
-              <a:rPr lang="en-US" sz="2400">
+              <a:rPr lang="en-US" sz="2400" dirty="0">
                 <a:latin typeface="Titillium Web" panose="00000500000000000000" pitchFamily="2" charset="-18"/>
               </a:rPr>
               <a:t>, </a:t>
             </a:r>
             <a:r>
-              <a:rPr lang="en-US" sz="2400" err="1">
+              <a:rPr lang="en-US" sz="2400" dirty="0" err="1">
                 <a:latin typeface="Titillium Web" panose="00000500000000000000" pitchFamily="2" charset="-18"/>
               </a:rPr>
               <a:t>zato</a:t>
             </a:r>
             <a:r>
-              <a:rPr lang="en-US" sz="2400">
+              <a:rPr lang="en-US" sz="2400" dirty="0">
                 <a:latin typeface="Titillium Web" panose="00000500000000000000" pitchFamily="2" charset="-18"/>
               </a:rPr>
               <a:t> so </a:t>
             </a:r>
             <a:r>
-              <a:rPr lang="en-US" sz="2400" err="1">
+              <a:rPr lang="en-US" sz="2400" dirty="0" err="1">
                 <a:solidFill>
                   <a:srgbClr val="FF0000"/>
                 </a:solidFill>
@@ -3865,7 +3865,7 @@
               <a:t>konsistentne</a:t>
             </a:r>
             <a:r>
-              <a:rPr lang="en-US" sz="2400">
+              <a:rPr lang="en-US" sz="2400" dirty="0">
                 <a:solidFill>
                   <a:srgbClr val="FF0000"/>
                 </a:solidFill>
@@ -3874,13 +3874,13 @@
               <a:t> </a:t>
             </a:r>
             <a:r>
-              <a:rPr lang="en-US" sz="2400">
+              <a:rPr lang="en-US" sz="2400" dirty="0">
                 <a:latin typeface="Titillium Web" panose="00000500000000000000" pitchFamily="2" charset="-18"/>
               </a:rPr>
               <a:t>in </a:t>
             </a:r>
             <a:r>
-              <a:rPr lang="en-US" sz="2400" err="1">
+              <a:rPr lang="en-US" sz="2400" dirty="0" err="1">
                 <a:solidFill>
                   <a:srgbClr val="FF0000"/>
                 </a:solidFill>
@@ -3889,7 +3889,7 @@
               <a:t>natančne</a:t>
             </a:r>
             <a:r>
-              <a:rPr lang="en-US" sz="2400">
+              <a:rPr lang="en-US" sz="2400" dirty="0">
                 <a:solidFill>
                   <a:srgbClr val="FF0000"/>
                 </a:solidFill>
@@ -3898,30 +3898,30 @@
               <a:t> </a:t>
             </a:r>
             <a:r>
-              <a:rPr lang="en-US" sz="2400" err="1">
+              <a:rPr lang="en-US" sz="2400" dirty="0" err="1">
                 <a:latin typeface="Titillium Web" panose="00000500000000000000" pitchFamily="2" charset="-18"/>
               </a:rPr>
               <a:t>probabilistične</a:t>
             </a:r>
             <a:r>
-              <a:rPr lang="en-US" sz="2400">
-                <a:latin typeface="Titillium Web" panose="00000500000000000000" pitchFamily="2" charset="-18"/>
-              </a:rPr>
-              <a:t> </a:t>
-            </a:r>
-            <a:r>
-              <a:rPr lang="en-US" sz="2400" err="1">
+              <a:rPr lang="en-US" sz="2400" dirty="0">
+                <a:latin typeface="Titillium Web" panose="00000500000000000000" pitchFamily="2" charset="-18"/>
+              </a:rPr>
+              <a:t> </a:t>
+            </a:r>
+            <a:r>
+              <a:rPr lang="en-US" sz="2400" dirty="0" err="1">
                 <a:latin typeface="Titillium Web" panose="00000500000000000000" pitchFamily="2" charset="-18"/>
               </a:rPr>
               <a:t>izjave</a:t>
             </a:r>
             <a:r>
-              <a:rPr lang="en-US" sz="2400">
+              <a:rPr lang="en-US" sz="2400" dirty="0">
                 <a:latin typeface="Titillium Web" panose="00000500000000000000" pitchFamily="2" charset="-18"/>
               </a:rPr>
               <a:t>.</a:t>
             </a:r>
-            <a:endParaRPr lang="sl-SI" sz="2400">
+            <a:endParaRPr lang="sl-SI" sz="2400" dirty="0">
               <a:latin typeface="Titillium Web" panose="00000500000000000000" pitchFamily="2" charset="-18"/>
             </a:endParaRPr>
           </a:p>
@@ -3934,102 +3934,102 @@
               <a:buChar char="•"/>
             </a:pPr>
             <a:r>
-              <a:rPr lang="en-US" sz="2400" err="1">
+              <a:rPr lang="en-US" sz="2400" dirty="0" err="1">
                 <a:latin typeface="Titillium Web" panose="00000500000000000000" pitchFamily="2" charset="-18"/>
               </a:rPr>
               <a:t>Več</a:t>
             </a:r>
             <a:r>
-              <a:rPr lang="en-US" sz="2400">
+              <a:rPr lang="en-US" sz="2400" dirty="0">
+                <a:latin typeface="Titillium Web" panose="00000500000000000000" pitchFamily="2" charset="-18"/>
+              </a:rPr>
+              <a:t> </a:t>
+            </a:r>
+            <a:r>
+              <a:rPr lang="en-US" sz="2400" dirty="0" err="1">
+                <a:latin typeface="Titillium Web" panose="00000500000000000000" pitchFamily="2" charset="-18"/>
+              </a:rPr>
+              <a:t>kot</a:t>
+            </a:r>
+            <a:r>
+              <a:rPr lang="en-US" sz="2400" dirty="0">
+                <a:latin typeface="Titillium Web" panose="00000500000000000000" pitchFamily="2" charset="-18"/>
+              </a:rPr>
+              <a:t> </a:t>
+            </a:r>
+            <a:r>
+              <a:rPr lang="en-US" sz="2400" dirty="0" err="1">
+                <a:latin typeface="Titillium Web" panose="00000500000000000000" pitchFamily="2" charset="-18"/>
+              </a:rPr>
+              <a:t>vemo</a:t>
+            </a:r>
+            <a:r>
+              <a:rPr lang="en-US" sz="2400" dirty="0">
+                <a:latin typeface="Titillium Web" panose="00000500000000000000" pitchFamily="2" charset="-18"/>
+              </a:rPr>
+              <a:t> o </a:t>
+            </a:r>
+            <a:r>
+              <a:rPr lang="en-US" sz="2400" dirty="0" err="1">
+                <a:latin typeface="Titillium Web" panose="00000500000000000000" pitchFamily="2" charset="-18"/>
+              </a:rPr>
+              <a:t>porazdelitvah</a:t>
+            </a:r>
+            <a:r>
+              <a:rPr lang="en-US" sz="2400" dirty="0">
                 <a:latin typeface="Titillium Web" panose="00000500000000000000" pitchFamily="2" charset="-18"/>
               </a:rPr>
               <a:t>, </a:t>
             </a:r>
             <a:r>
-              <a:rPr lang="en-US" sz="2400" err="1">
-                <a:latin typeface="Titillium Web" panose="00000500000000000000" pitchFamily="2" charset="-18"/>
-              </a:rPr>
-              <a:t>kot</a:t>
-            </a:r>
-            <a:r>
-              <a:rPr lang="en-US" sz="2400">
-                <a:latin typeface="Titillium Web" panose="00000500000000000000" pitchFamily="2" charset="-18"/>
-              </a:rPr>
-              <a:t> </a:t>
-            </a:r>
-            <a:r>
-              <a:rPr lang="en-US" sz="2400" err="1">
-                <a:latin typeface="Titillium Web" panose="00000500000000000000" pitchFamily="2" charset="-18"/>
-              </a:rPr>
-              <a:t>vemo</a:t>
-            </a:r>
-            <a:r>
-              <a:rPr lang="en-US" sz="2400">
-                <a:latin typeface="Titillium Web" panose="00000500000000000000" pitchFamily="2" charset="-18"/>
-              </a:rPr>
-              <a:t> o </a:t>
-            </a:r>
-            <a:r>
-              <a:rPr lang="en-US" sz="2400" err="1">
-                <a:latin typeface="Titillium Web" panose="00000500000000000000" pitchFamily="2" charset="-18"/>
-              </a:rPr>
-              <a:t>porazdelitvah</a:t>
-            </a:r>
-            <a:r>
-              <a:rPr lang="en-US" sz="2400">
-                <a:latin typeface="Titillium Web" panose="00000500000000000000" pitchFamily="2" charset="-18"/>
-              </a:rPr>
-              <a:t>, </a:t>
-            </a:r>
-            <a:r>
-              <a:rPr lang="en-US" sz="2400" err="1">
+              <a:rPr lang="en-US" sz="2400" dirty="0" err="1">
                 <a:latin typeface="Titillium Web" panose="00000500000000000000" pitchFamily="2" charset="-18"/>
               </a:rPr>
               <a:t>bolj</a:t>
             </a:r>
             <a:r>
-              <a:rPr lang="en-US" sz="2400">
-                <a:latin typeface="Titillium Web" panose="00000500000000000000" pitchFamily="2" charset="-18"/>
-              </a:rPr>
-              <a:t> </a:t>
-            </a:r>
-            <a:r>
-              <a:rPr lang="en-US" sz="2400" err="1">
+              <a:rPr lang="en-US" sz="2400" dirty="0">
+                <a:latin typeface="Titillium Web" panose="00000500000000000000" pitchFamily="2" charset="-18"/>
+              </a:rPr>
+              <a:t> </a:t>
+            </a:r>
+            <a:r>
+              <a:rPr lang="en-US" sz="2400" dirty="0" err="1">
                 <a:latin typeface="Titillium Web" panose="00000500000000000000" pitchFamily="2" charset="-18"/>
               </a:rPr>
               <a:t>bogato</a:t>
             </a:r>
             <a:r>
-              <a:rPr lang="en-US" sz="2400">
+              <a:rPr lang="en-US" sz="2400" dirty="0">
                 <a:latin typeface="Titillium Web" panose="00000500000000000000" pitchFamily="2" charset="-18"/>
               </a:rPr>
               <a:t> se </a:t>
             </a:r>
             <a:r>
-              <a:rPr lang="en-US" sz="2400" err="1">
+              <a:rPr lang="en-US" sz="2400" dirty="0" err="1">
                 <a:latin typeface="Titillium Web" panose="00000500000000000000" pitchFamily="2" charset="-18"/>
               </a:rPr>
               <a:t>lahko</a:t>
             </a:r>
             <a:r>
-              <a:rPr lang="en-US" sz="2400">
-                <a:latin typeface="Titillium Web" panose="00000500000000000000" pitchFamily="2" charset="-18"/>
-              </a:rPr>
-              <a:t> </a:t>
-            </a:r>
-            <a:r>
-              <a:rPr lang="en-US" sz="2400" err="1">
+              <a:rPr lang="en-US" sz="2400" dirty="0">
+                <a:latin typeface="Titillium Web" panose="00000500000000000000" pitchFamily="2" charset="-18"/>
+              </a:rPr>
+              <a:t> </a:t>
+            </a:r>
+            <a:r>
+              <a:rPr lang="en-US" sz="2400" dirty="0" err="1">
                 <a:latin typeface="Titillium Web" panose="00000500000000000000" pitchFamily="2" charset="-18"/>
               </a:rPr>
               <a:t>izražamo</a:t>
             </a:r>
             <a:r>
-              <a:rPr lang="en-US" sz="2400">
+              <a:rPr lang="en-US" sz="2400" dirty="0">
                 <a:latin typeface="Titillium Web" panose="00000500000000000000" pitchFamily="2" charset="-18"/>
               </a:rPr>
               <a:t>.</a:t>
             </a:r>
-            <a:endParaRPr lang="sl-SI" sz="2400">
+            <a:endParaRPr lang="sl-SI" sz="2400" dirty="0">
               <a:latin typeface="Titillium Web" panose="00000500000000000000" pitchFamily="2" charset="-18"/>
             </a:endParaRPr>
           </a:p>
@@ -4118,37 +4118,31 @@
           <a:lstStyle/>
           <a:p>
             <a:r>
-              <a:rPr lang="en-US" sz="4000" b="1" err="1">
+              <a:rPr lang="en-US" sz="4000" b="1" dirty="0" err="1">
                 <a:latin typeface="Titillium Web" panose="00000500000000000000" pitchFamily="2" charset="-18"/>
               </a:rPr>
               <a:t>Beseda</a:t>
             </a:r>
             <a:r>
-              <a:rPr lang="en-US" sz="4000" b="1">
-                <a:latin typeface="Titillium Web" panose="00000500000000000000" pitchFamily="2" charset="-18"/>
-              </a:rPr>
-              <a:t> </a:t>
-            </a:r>
-            <a:r>
-              <a:rPr lang="en-US" sz="4000" b="1" err="1">
+              <a:rPr lang="en-US" sz="4000" b="1" dirty="0">
+                <a:latin typeface="Titillium Web" panose="00000500000000000000" pitchFamily="2" charset="-18"/>
+              </a:rPr>
+              <a:t> </a:t>
+            </a:r>
+            <a:r>
+              <a:rPr lang="en-US" sz="4000" b="1" dirty="0" err="1">
                 <a:latin typeface="Titillium Web" panose="00000500000000000000" pitchFamily="2" charset="-18"/>
               </a:rPr>
               <a:t>na</a:t>
             </a:r>
             <a:r>
-              <a:rPr lang="en-US" sz="4000" b="1">
-                <a:latin typeface="Titillium Web" panose="00000500000000000000" pitchFamily="2" charset="-18"/>
-              </a:rPr>
-              <a:t> </a:t>
-            </a:r>
-            <a:r>
-              <a:rPr lang="en-US" sz="4000" b="1" err="1">
-                <a:latin typeface="Titillium Web" panose="00000500000000000000" pitchFamily="2" charset="-18"/>
-              </a:rPr>
-              <a:t>dan</a:t>
-            </a:r>
-            <a:r>
-              <a:rPr lang="sl-SI" sz="4000" b="1">
+              <a:rPr lang="en-US" sz="4000" b="1" dirty="0">
+                <a:latin typeface="Titillium Web" panose="00000500000000000000" pitchFamily="2" charset="-18"/>
+              </a:rPr>
+              <a:t> dan </a:t>
+            </a:r>
+            <a:r>
+              <a:rPr lang="sl-SI" sz="4000" b="1" dirty="0">
                 <a:latin typeface="Titillium Web" panose="00000500000000000000" pitchFamily="2" charset="-18"/>
               </a:rPr>
               <a:t>...</a:t>
@@ -7454,73 +7448,73 @@
             </a:lvl1pPr>
           </a:lstStyle>
           <a:p>
-            <a:endParaRPr lang="sl-SI" sz="2800">
+            <a:endParaRPr lang="sl-SI" sz="2800" dirty="0">
               <a:latin typeface="Titillium Web" panose="00000500000000000000" pitchFamily="2" charset="-18"/>
             </a:endParaRPr>
           </a:p>
           <a:p>
             <a:r>
-              <a:rPr lang="en-US" sz="2800">
+              <a:rPr lang="en-US" sz="2800" dirty="0">
                 <a:latin typeface="Titillium Web" panose="00000500000000000000" pitchFamily="2" charset="-18"/>
               </a:rPr>
               <a:t>To so </a:t>
             </a:r>
             <a:r>
-              <a:rPr lang="en-US" sz="2800" err="1">
+              <a:rPr lang="en-US" sz="2800" dirty="0" err="1">
                 <a:latin typeface="Titillium Web" panose="00000500000000000000" pitchFamily="2" charset="-18"/>
               </a:rPr>
               <a:t>izidi</a:t>
             </a:r>
             <a:r>
-              <a:rPr lang="en-US" sz="2800">
+              <a:rPr lang="en-US" sz="2800" dirty="0">
                 <a:latin typeface="Titillium Web" panose="00000500000000000000" pitchFamily="2" charset="-18"/>
               </a:rPr>
               <a:t> 10 </a:t>
             </a:r>
             <a:r>
-              <a:rPr lang="en-US" sz="2800" err="1">
+              <a:rPr lang="en-US" sz="2800" dirty="0" err="1">
                 <a:latin typeface="Titillium Web" panose="00000500000000000000" pitchFamily="2" charset="-18"/>
               </a:rPr>
               <a:t>metov</a:t>
             </a:r>
             <a:r>
-              <a:rPr lang="en-US" sz="2800">
+              <a:rPr lang="en-US" sz="2800" dirty="0">
                 <a:latin typeface="Titillium Web" panose="00000500000000000000" pitchFamily="2" charset="-18"/>
               </a:rPr>
               <a:t> (</a:t>
             </a:r>
             <a:r>
-              <a:rPr lang="en-US" sz="2800" err="1">
+              <a:rPr lang="en-US" sz="2800" dirty="0" err="1">
                 <a:latin typeface="Titillium Web" panose="00000500000000000000" pitchFamily="2" charset="-18"/>
               </a:rPr>
               <a:t>morda</a:t>
             </a:r>
             <a:r>
-              <a:rPr lang="en-US" sz="2800">
-                <a:latin typeface="Titillium Web" panose="00000500000000000000" pitchFamily="2" charset="-18"/>
-              </a:rPr>
-              <a:t> </a:t>
-            </a:r>
-            <a:r>
-              <a:rPr lang="en-US" sz="2800" err="1">
+              <a:rPr lang="en-US" sz="2800" dirty="0">
+                <a:latin typeface="Titillium Web" panose="00000500000000000000" pitchFamily="2" charset="-18"/>
+              </a:rPr>
+              <a:t> </a:t>
+            </a:r>
+            <a:r>
+              <a:rPr lang="en-US" sz="2800" dirty="0" err="1">
                 <a:latin typeface="Titillium Web" panose="00000500000000000000" pitchFamily="2" charset="-18"/>
               </a:rPr>
               <a:t>nepoštenega</a:t>
             </a:r>
             <a:r>
-              <a:rPr lang="en-US" sz="2800">
+              <a:rPr lang="en-US" sz="2800" dirty="0">
                 <a:latin typeface="Titillium Web" panose="00000500000000000000" pitchFamily="2" charset="-18"/>
               </a:rPr>
               <a:t>) </a:t>
             </a:r>
             <a:r>
-              <a:rPr lang="en-US" sz="2800" err="1">
-                <a:latin typeface="Titillium Web" panose="00000500000000000000" pitchFamily="2" charset="-18"/>
-              </a:rPr>
-              <a:t>konvanca</a:t>
-            </a:r>
-            <a:r>
-              <a:rPr lang="sl-SI" sz="2800">
+              <a:rPr lang="en-US" sz="2800" dirty="0" err="1">
+                <a:latin typeface="Titillium Web" panose="00000500000000000000" pitchFamily="2" charset="-18"/>
+              </a:rPr>
+              <a:t>kovanca</a:t>
+            </a:r>
+            <a:r>
+              <a:rPr lang="sl-SI" sz="2800" dirty="0">
                 <a:latin typeface="Titillium Web" panose="00000500000000000000" pitchFamily="2" charset="-18"/>
               </a:rPr>
               <a:t>:</a:t>
@@ -7529,78 +7523,30 @@
           <a:p>
             <a:pPr algn="ctr"/>
             <a:br>
-              <a:rPr lang="sl-SI" sz="1600">
+              <a:rPr lang="sl-SI" sz="1600" dirty="0">
                 <a:latin typeface="Titillium Web" panose="00000500000000000000" pitchFamily="2" charset="-18"/>
               </a:rPr>
             </a:br>
             <a:r>
-              <a:rPr lang="en-US" sz="2800" b="1">
-                <a:latin typeface="Titillium Web" panose="00000500000000000000" pitchFamily="2" charset="-18"/>
-              </a:rPr>
-              <a:t>c  </a:t>
-            </a:r>
-            <a:r>
-              <a:rPr lang="en-US" sz="2800" b="1" err="1">
-                <a:latin typeface="Titillium Web" panose="00000500000000000000" pitchFamily="2" charset="-18"/>
-              </a:rPr>
-              <a:t>c</a:t>
-            </a:r>
-            <a:r>
-              <a:rPr lang="en-US" sz="2800" b="1">
-                <a:latin typeface="Titillium Web" panose="00000500000000000000" pitchFamily="2" charset="-18"/>
-              </a:rPr>
-              <a:t>  g  c  </a:t>
-            </a:r>
-            <a:r>
-              <a:rPr lang="en-US" sz="2800" b="1" err="1">
-                <a:latin typeface="Titillium Web" panose="00000500000000000000" pitchFamily="2" charset="-18"/>
-              </a:rPr>
-              <a:t>c</a:t>
-            </a:r>
-            <a:r>
-              <a:rPr lang="en-US" sz="2800" b="1">
-                <a:latin typeface="Titillium Web" panose="00000500000000000000" pitchFamily="2" charset="-18"/>
-              </a:rPr>
-              <a:t>  g  c  </a:t>
-            </a:r>
-            <a:r>
-              <a:rPr lang="en-US" sz="2800" b="1" err="1">
-                <a:latin typeface="Titillium Web" panose="00000500000000000000" pitchFamily="2" charset="-18"/>
-              </a:rPr>
-              <a:t>c</a:t>
-            </a:r>
-            <a:r>
-              <a:rPr lang="en-US" sz="2800" b="1">
-                <a:latin typeface="Titillium Web" panose="00000500000000000000" pitchFamily="2" charset="-18"/>
-              </a:rPr>
-              <a:t>  </a:t>
-            </a:r>
-            <a:r>
-              <a:rPr lang="en-US" sz="2800" b="1" err="1">
-                <a:latin typeface="Titillium Web" panose="00000500000000000000" pitchFamily="2" charset="-18"/>
-              </a:rPr>
-              <a:t>c</a:t>
-            </a:r>
-            <a:r>
-              <a:rPr lang="en-US" sz="2800" b="1">
-                <a:latin typeface="Titillium Web" panose="00000500000000000000" pitchFamily="2" charset="-18"/>
-              </a:rPr>
-              <a:t>  g</a:t>
-            </a:r>
-            <a:r>
-              <a:rPr lang="sl-SI" sz="2800" b="1">
-                <a:latin typeface="Titillium Web" panose="00000500000000000000" pitchFamily="2" charset="-18"/>
-              </a:rPr>
-              <a:t> </a:t>
-            </a:r>
-            <a:r>
-              <a:rPr lang="en-US" sz="2800" b="1">
-                <a:latin typeface="Titillium Web" panose="00000500000000000000" pitchFamily="2" charset="-18"/>
-              </a:rPr>
-              <a:t> </a:t>
-            </a:r>
-            <a:r>
-              <a:rPr lang="sl-SI" sz="2800">
+              <a:rPr lang="en-US" sz="2800" b="1" dirty="0">
+                <a:latin typeface="Titillium Web" panose="00000500000000000000" pitchFamily="2" charset="-18"/>
+              </a:rPr>
+              <a:t>c  c  g  c  c  g  c  c  c  g</a:t>
+            </a:r>
+            <a:r>
+              <a:rPr lang="sl-SI" sz="2800" b="1" dirty="0">
+                <a:latin typeface="Titillium Web" panose="00000500000000000000" pitchFamily="2" charset="-18"/>
+              </a:rPr>
+              <a:t> </a:t>
+            </a:r>
+            <a:r>
+              <a:rPr lang="en-US" sz="2800" b="1" dirty="0">
+                <a:latin typeface="Titillium Web" panose="00000500000000000000" pitchFamily="2" charset="-18"/>
+              </a:rPr>
+              <a:t> </a:t>
+            </a:r>
+            <a:r>
+              <a:rPr lang="sl-SI" sz="2800" dirty="0">
                 <a:solidFill>
                   <a:srgbClr val="FF0000"/>
                 </a:solidFill>
@@ -7609,7 +7555,7 @@
               <a:t>(?)</a:t>
             </a:r>
             <a:r>
-              <a:rPr lang="sl-SI" sz="2800" b="1">
+              <a:rPr lang="sl-SI" sz="2800" b="1" dirty="0">
                 <a:solidFill>
                   <a:srgbClr val="FF0000"/>
                 </a:solidFill>
@@ -7619,12 +7565,12 @@
             </a:r>
           </a:p>
           <a:p>
-            <a:endParaRPr lang="sl-SI" sz="2800">
+            <a:endParaRPr lang="sl-SI" sz="2800" dirty="0">
               <a:latin typeface="Titillium Web" panose="00000500000000000000" pitchFamily="2" charset="-18"/>
             </a:endParaRPr>
           </a:p>
           <a:p>
-            <a:endParaRPr lang="sl-SI" sz="2800">
+            <a:endParaRPr lang="sl-SI" sz="2800" dirty="0">
               <a:solidFill>
                 <a:srgbClr val="FF0000"/>
               </a:solidFill>
@@ -7633,76 +7579,85 @@
           </a:p>
           <a:p>
             <a:r>
-              <a:rPr lang="sl-SI" sz="2800">
+              <a:rPr lang="sl-SI" sz="2800" dirty="0" err="1">
                 <a:solidFill>
                   <a:srgbClr val="FF0000"/>
                 </a:solidFill>
                 <a:latin typeface="Titillium Web" panose="00000500000000000000" pitchFamily="2" charset="-18"/>
               </a:rPr>
-              <a:t>Q1: </a:t>
-            </a:r>
-            <a:r>
-              <a:rPr lang="en-US" sz="2800">
+              <a:t>Q1</a:t>
+            </a:r>
+            <a:r>
+              <a:rPr lang="sl-SI" sz="2800" dirty="0">
+                <a:solidFill>
+                  <a:srgbClr val="FF0000"/>
+                </a:solidFill>
+                <a:latin typeface="Titillium Web" panose="00000500000000000000" pitchFamily="2" charset="-18"/>
+              </a:rPr>
+              <a:t>: </a:t>
+            </a:r>
+            <a:r>
+              <a:rPr lang="en-US" sz="2800" dirty="0">
                 <a:latin typeface="Titillium Web" panose="00000500000000000000" pitchFamily="2" charset="-18"/>
               </a:rPr>
               <a:t>Je </a:t>
             </a:r>
             <a:r>
-              <a:rPr lang="en-US" sz="2800" err="1">
+              <a:rPr lang="en-US" sz="2800" dirty="0" err="1">
                 <a:latin typeface="Titillium Web" panose="00000500000000000000" pitchFamily="2" charset="-18"/>
               </a:rPr>
               <a:t>enajsti</a:t>
             </a:r>
             <a:r>
-              <a:rPr lang="en-US" sz="2800">
+              <a:rPr lang="en-US" sz="2800" dirty="0">
                 <a:latin typeface="Titillium Web" panose="00000500000000000000" pitchFamily="2" charset="-18"/>
               </a:rPr>
               <a:t> met </a:t>
             </a:r>
             <a:r>
-              <a:rPr lang="en-US" sz="2800" b="1" err="1">
+              <a:rPr lang="en-US" sz="2800" b="1" dirty="0" err="1">
                 <a:latin typeface="Titillium Web" panose="00000500000000000000" pitchFamily="2" charset="-18"/>
               </a:rPr>
               <a:t>c</a:t>
             </a:r>
             <a:r>
-              <a:rPr lang="en-US" sz="2800" err="1">
+              <a:rPr lang="en-US" sz="2800" dirty="0" err="1">
                 <a:latin typeface="Titillium Web" panose="00000500000000000000" pitchFamily="2" charset="-18"/>
               </a:rPr>
               <a:t>ifra</a:t>
             </a:r>
             <a:r>
-              <a:rPr lang="en-US" sz="2800">
-                <a:latin typeface="Titillium Web" panose="00000500000000000000" pitchFamily="2" charset="-18"/>
-              </a:rPr>
-              <a:t> </a:t>
-            </a:r>
-            <a:r>
-              <a:rPr lang="en-US" sz="2800" err="1">
+              <a:rPr lang="en-US" sz="2800" dirty="0">
+                <a:latin typeface="Titillium Web" panose="00000500000000000000" pitchFamily="2" charset="-18"/>
+              </a:rPr>
+              <a:t> </a:t>
+            </a:r>
+            <a:r>
+              <a:rPr lang="en-US" sz="2800" dirty="0" err="1">
                 <a:latin typeface="Titillium Web" panose="00000500000000000000" pitchFamily="2" charset="-18"/>
               </a:rPr>
               <a:t>ali</a:t>
             </a:r>
             <a:r>
-              <a:rPr lang="en-US" sz="2800">
-                <a:latin typeface="Titillium Web" panose="00000500000000000000" pitchFamily="2" charset="-18"/>
-              </a:rPr>
-              <a:t> </a:t>
-            </a:r>
-            <a:r>
-              <a:rPr lang="en-US" sz="2800" b="1" err="1">
+              <a:rPr lang="en-US" sz="2800" dirty="0">
+                <a:latin typeface="Titillium Web" panose="00000500000000000000" pitchFamily="2" charset="-18"/>
+              </a:rPr>
+              <a:t> </a:t>
+            </a:r>
+            <a:r>
+              <a:rPr lang="en-US" sz="2800" b="1" dirty="0" err="1">
                 <a:latin typeface="Titillium Web" panose="00000500000000000000" pitchFamily="2" charset="-18"/>
               </a:rPr>
               <a:t>g</a:t>
             </a:r>
             <a:r>
-              <a:rPr lang="en-US" sz="2800" err="1">
+              <a:rPr lang="en-US" sz="2800" dirty="0" err="1">
                 <a:latin typeface="Titillium Web" panose="00000500000000000000" pitchFamily="2" charset="-18"/>
               </a:rPr>
               <a:t>rb</a:t>
             </a:r>
             <a:r>
-              <a:rPr lang="sl-SI" sz="2800">
+              <a:rPr lang="sl-SI" sz="2800" dirty="0">
                 <a:latin typeface="Titillium Web" panose="00000500000000000000" pitchFamily="2" charset="-18"/>
               </a:rPr>
               <a:t>?</a:t>
@@ -8893,24 +8848,24 @@
           <a:lstStyle/>
           <a:p>
             <a:r>
-              <a:rPr lang="en-US" sz="4000" b="1">
+              <a:rPr lang="en-US" sz="4000" b="1" dirty="0">
                 <a:latin typeface="Titillium Web" panose="00000500000000000000" pitchFamily="2" charset="-18"/>
               </a:rPr>
               <a:t>V </a:t>
             </a:r>
             <a:r>
-              <a:rPr lang="en-US" sz="4000" b="1" err="1">
+              <a:rPr lang="en-US" sz="4000" b="1" dirty="0" err="1">
                 <a:latin typeface="Titillium Web" panose="00000500000000000000" pitchFamily="2" charset="-18"/>
               </a:rPr>
               <a:t>razmislek</a:t>
             </a:r>
             <a:r>
-              <a:rPr lang="en-US" sz="4000" b="1">
-                <a:latin typeface="Titillium Web" panose="00000500000000000000" pitchFamily="2" charset="-18"/>
-              </a:rPr>
-              <a:t>…</a:t>
-            </a:r>
-            <a:endParaRPr lang="sl-SI" sz="4000" b="1">
+              <a:rPr lang="en-US" sz="4000" b="1" dirty="0">
+                <a:latin typeface="Titillium Web" panose="00000500000000000000" pitchFamily="2" charset="-18"/>
+              </a:rPr>
+              <a:t> …</a:t>
+            </a:r>
+            <a:endParaRPr lang="sl-SI" sz="4000" b="1" dirty="0">
               <a:latin typeface="Titillium Web" panose="00000500000000000000" pitchFamily="2" charset="-18"/>
             </a:endParaRPr>
           </a:p>
@@ -8958,95 +8913,83 @@
           </a:lstStyle>
           <a:p>
             <a:r>
-              <a:rPr lang="en-US" sz="2000" b="1" err="1">
+              <a:rPr lang="en-US" sz="2000" b="1" dirty="0" err="1">
                 <a:latin typeface="Titillium Web" panose="00000500000000000000" pitchFamily="2" charset="-18"/>
               </a:rPr>
               <a:t>Verjetnost</a:t>
             </a:r>
             <a:r>
-              <a:rPr lang="en-US" sz="2000" b="1">
+              <a:rPr lang="en-US" sz="2000" b="1" dirty="0">
                 <a:latin typeface="Titillium Web" panose="00000500000000000000" pitchFamily="2" charset="-18"/>
               </a:rPr>
               <a:t> je </a:t>
             </a:r>
             <a:r>
-              <a:rPr lang="en-US" sz="2000" b="1" err="1">
+              <a:rPr lang="en-US" sz="2000" b="1" dirty="0" err="1">
                 <a:latin typeface="Titillium Web" panose="00000500000000000000" pitchFamily="2" charset="-18"/>
               </a:rPr>
               <a:t>koherenten</a:t>
             </a:r>
             <a:r>
-              <a:rPr lang="en-US" sz="2000" b="1">
+              <a:rPr lang="en-US" sz="2000" b="1" dirty="0">
                 <a:latin typeface="Titillium Web" panose="00000500000000000000" pitchFamily="2" charset="-18"/>
               </a:rPr>
               <a:t> in </a:t>
             </a:r>
             <a:r>
-              <a:rPr lang="en-US" sz="2000" b="1" err="1">
+              <a:rPr lang="en-US" sz="2000" b="1" dirty="0" err="1">
                 <a:latin typeface="Titillium Web" panose="00000500000000000000" pitchFamily="2" charset="-18"/>
               </a:rPr>
               <a:t>natančen</a:t>
             </a:r>
             <a:r>
-              <a:rPr lang="en-US" sz="2000" b="1">
-                <a:latin typeface="Titillium Web" panose="00000500000000000000" pitchFamily="2" charset="-18"/>
-              </a:rPr>
-              <a:t> </a:t>
-            </a:r>
-            <a:r>
-              <a:rPr lang="en-US" sz="2000" b="1" err="1">
+              <a:rPr lang="en-US" sz="2000" b="1" dirty="0">
+                <a:latin typeface="Titillium Web" panose="00000500000000000000" pitchFamily="2" charset="-18"/>
+              </a:rPr>
+              <a:t> </a:t>
+            </a:r>
+            <a:r>
+              <a:rPr lang="en-US" sz="2000" b="1" dirty="0" err="1">
                 <a:latin typeface="Titillium Web" panose="00000500000000000000" pitchFamily="2" charset="-18"/>
               </a:rPr>
               <a:t>jezik</a:t>
             </a:r>
             <a:r>
-              <a:rPr lang="en-US" sz="2000" b="1">
-                <a:latin typeface="Titillium Web" panose="00000500000000000000" pitchFamily="2" charset="-18"/>
-              </a:rPr>
-              <a:t> </a:t>
-            </a:r>
-            <a:r>
-              <a:rPr lang="en-US" sz="2000" b="1" err="1">
-                <a:latin typeface="Titillium Web" panose="00000500000000000000" pitchFamily="2" charset="-18"/>
-              </a:rPr>
-              <a:t>za</a:t>
-            </a:r>
-            <a:r>
-              <a:rPr lang="en-US" sz="2000" b="1">
-                <a:latin typeface="Titillium Web" panose="00000500000000000000" pitchFamily="2" charset="-18"/>
-              </a:rPr>
-              <a:t> </a:t>
-            </a:r>
-            <a:r>
-              <a:rPr lang="en-US" sz="2000" b="1" err="1">
+              <a:rPr lang="en-US" sz="2000" b="1" dirty="0">
+                <a:latin typeface="Titillium Web" panose="00000500000000000000" pitchFamily="2" charset="-18"/>
+              </a:rPr>
+              <a:t> za </a:t>
+            </a:r>
+            <a:r>
+              <a:rPr lang="en-US" sz="2000" b="1" dirty="0" err="1">
                 <a:latin typeface="Titillium Web" panose="00000500000000000000" pitchFamily="2" charset="-18"/>
               </a:rPr>
               <a:t>izražanje</a:t>
             </a:r>
             <a:r>
-              <a:rPr lang="en-US" sz="2000" b="1">
-                <a:latin typeface="Titillium Web" panose="00000500000000000000" pitchFamily="2" charset="-18"/>
-              </a:rPr>
-              <a:t> </a:t>
-            </a:r>
-            <a:r>
-              <a:rPr lang="en-US" sz="2000" b="1" err="1">
+              <a:rPr lang="en-US" sz="2000" b="1" dirty="0">
+                <a:latin typeface="Titillium Web" panose="00000500000000000000" pitchFamily="2" charset="-18"/>
+              </a:rPr>
+              <a:t> </a:t>
+            </a:r>
+            <a:r>
+              <a:rPr lang="en-US" sz="2000" b="1" dirty="0" err="1">
                 <a:latin typeface="Titillium Web" panose="00000500000000000000" pitchFamily="2" charset="-18"/>
               </a:rPr>
               <a:t>negotovosti</a:t>
             </a:r>
             <a:r>
-              <a:rPr lang="en-US" sz="2000" b="1">
+              <a:rPr lang="en-US" sz="2000" b="1" dirty="0">
                 <a:latin typeface="Titillium Web" panose="00000500000000000000" pitchFamily="2" charset="-18"/>
               </a:rPr>
               <a:t>:</a:t>
             </a:r>
-            <a:endParaRPr lang="sl-SI" sz="2000" b="1">
+            <a:endParaRPr lang="sl-SI" sz="2000" b="1" dirty="0">
               <a:latin typeface="Titillium Web" panose="00000500000000000000" pitchFamily="2" charset="-18"/>
             </a:endParaRPr>
           </a:p>
           <a:p>
-            <a:endParaRPr lang="sl-SI" sz="2000">
+            <a:endParaRPr lang="sl-SI" sz="2000" dirty="0">
               <a:latin typeface="Titillium Web" panose="00000500000000000000" pitchFamily="2" charset="-18"/>
             </a:endParaRPr>
           </a:p>
@@ -9056,107 +8999,107 @@
               <a:buChar char="•"/>
             </a:pPr>
             <a:r>
-              <a:rPr lang="en-US" sz="2000" err="1">
+              <a:rPr lang="en-US" sz="2000" dirty="0" err="1">
                 <a:latin typeface="Titillium Web" panose="00000500000000000000" pitchFamily="2" charset="-18"/>
               </a:rPr>
               <a:t>Če</a:t>
             </a:r>
             <a:r>
-              <a:rPr lang="en-US" sz="2000">
+              <a:rPr lang="en-US" sz="2000" dirty="0">
                 <a:latin typeface="Titillium Web" panose="00000500000000000000" pitchFamily="2" charset="-18"/>
               </a:rPr>
               <a:t> ne </a:t>
             </a:r>
             <a:r>
-              <a:rPr lang="en-US" sz="2000" err="1">
+              <a:rPr lang="en-US" sz="2000" dirty="0" err="1">
                 <a:latin typeface="Titillium Web" panose="00000500000000000000" pitchFamily="2" charset="-18"/>
               </a:rPr>
               <a:t>sledimo</a:t>
             </a:r>
             <a:r>
-              <a:rPr lang="en-US" sz="2000">
-                <a:latin typeface="Titillium Web" panose="00000500000000000000" pitchFamily="2" charset="-18"/>
-              </a:rPr>
-              <a:t> </a:t>
-            </a:r>
-            <a:r>
-              <a:rPr lang="en-US" sz="2000" err="1">
+              <a:rPr lang="en-US" sz="2000" dirty="0">
+                <a:latin typeface="Titillium Web" panose="00000500000000000000" pitchFamily="2" charset="-18"/>
+              </a:rPr>
+              <a:t> </a:t>
+            </a:r>
+            <a:r>
+              <a:rPr lang="en-US" sz="2000" dirty="0" err="1">
                 <a:latin typeface="Titillium Web" panose="00000500000000000000" pitchFamily="2" charset="-18"/>
               </a:rPr>
               <a:t>zakonom</a:t>
             </a:r>
             <a:r>
-              <a:rPr lang="en-US" sz="2000">
-                <a:latin typeface="Titillium Web" panose="00000500000000000000" pitchFamily="2" charset="-18"/>
-              </a:rPr>
-              <a:t> </a:t>
-            </a:r>
-            <a:r>
-              <a:rPr lang="en-US" sz="2000" err="1">
+              <a:rPr lang="en-US" sz="2000" dirty="0">
+                <a:latin typeface="Titillium Web" panose="00000500000000000000" pitchFamily="2" charset="-18"/>
+              </a:rPr>
+              <a:t> </a:t>
+            </a:r>
+            <a:r>
+              <a:rPr lang="en-US" sz="2000" dirty="0" err="1">
                 <a:latin typeface="Titillium Web" panose="00000500000000000000" pitchFamily="2" charset="-18"/>
               </a:rPr>
               <a:t>verjetnosti</a:t>
             </a:r>
             <a:r>
-              <a:rPr lang="en-US" sz="2000">
+              <a:rPr lang="en-US" sz="2000" dirty="0">
                 <a:latin typeface="Titillium Web" panose="00000500000000000000" pitchFamily="2" charset="-18"/>
               </a:rPr>
               <a:t>, </a:t>
             </a:r>
             <a:r>
-              <a:rPr lang="en-US" sz="2000" err="1">
+              <a:rPr lang="en-US" sz="2000" dirty="0" err="1">
                 <a:latin typeface="Titillium Web" panose="00000500000000000000" pitchFamily="2" charset="-18"/>
               </a:rPr>
               <a:t>nas</a:t>
             </a:r>
             <a:r>
-              <a:rPr lang="en-US" sz="2000">
-                <a:latin typeface="Titillium Web" panose="00000500000000000000" pitchFamily="2" charset="-18"/>
-              </a:rPr>
-              <a:t> </a:t>
-            </a:r>
-            <a:r>
-              <a:rPr lang="en-US" sz="2000" err="1">
+              <a:rPr lang="en-US" sz="2000" dirty="0">
+                <a:latin typeface="Titillium Web" panose="00000500000000000000" pitchFamily="2" charset="-18"/>
+              </a:rPr>
+              <a:t> </a:t>
+            </a:r>
+            <a:r>
+              <a:rPr lang="en-US" sz="2000" dirty="0" err="1">
                 <a:latin typeface="Titillium Web" panose="00000500000000000000" pitchFamily="2" charset="-18"/>
               </a:rPr>
               <a:t>nihče</a:t>
             </a:r>
             <a:r>
-              <a:rPr lang="en-US" sz="2000">
+              <a:rPr lang="en-US" sz="2000" dirty="0">
                 <a:latin typeface="Titillium Web" panose="00000500000000000000" pitchFamily="2" charset="-18"/>
               </a:rPr>
               <a:t> ne </a:t>
             </a:r>
             <a:r>
-              <a:rPr lang="en-US" sz="2000" err="1">
+              <a:rPr lang="en-US" sz="2000" dirty="0" err="1">
                 <a:latin typeface="Titillium Web" panose="00000500000000000000" pitchFamily="2" charset="-18"/>
               </a:rPr>
               <a:t>bo</a:t>
             </a:r>
             <a:r>
-              <a:rPr lang="en-US" sz="2000">
-                <a:latin typeface="Titillium Web" panose="00000500000000000000" pitchFamily="2" charset="-18"/>
-              </a:rPr>
-              <a:t> </a:t>
-            </a:r>
-            <a:r>
-              <a:rPr lang="en-US" sz="2000" err="1">
+              <a:rPr lang="en-US" sz="2000" dirty="0">
+                <a:latin typeface="Titillium Web" panose="00000500000000000000" pitchFamily="2" charset="-18"/>
+              </a:rPr>
+              <a:t> </a:t>
+            </a:r>
+            <a:r>
+              <a:rPr lang="en-US" sz="2000" dirty="0" err="1">
                 <a:latin typeface="Titillium Web" panose="00000500000000000000" pitchFamily="2" charset="-18"/>
               </a:rPr>
               <a:t>razumel</a:t>
             </a:r>
             <a:r>
-              <a:rPr lang="en-US" sz="2000">
+              <a:rPr lang="en-US" sz="2000" dirty="0">
                 <a:latin typeface="Titillium Web" panose="00000500000000000000" pitchFamily="2" charset="-18"/>
               </a:rPr>
               <a:t>!</a:t>
             </a:r>
             <a:br>
-              <a:rPr lang="sl-SI" sz="2000">
+              <a:rPr lang="sl-SI" sz="2000" dirty="0">
                 <a:latin typeface="Titillium Web" panose="00000500000000000000" pitchFamily="2" charset="-18"/>
               </a:rPr>
             </a:br>
-            <a:endParaRPr lang="sl-SI" sz="2000">
+            <a:endParaRPr lang="sl-SI" sz="2000" dirty="0">
               <a:latin typeface="Titillium Web" panose="00000500000000000000" pitchFamily="2" charset="-18"/>
             </a:endParaRPr>
           </a:p>
@@ -9166,119 +9109,119 @@
               <a:buChar char="•"/>
             </a:pPr>
             <a:r>
-              <a:rPr lang="en-US" sz="2000" err="1">
+              <a:rPr lang="en-US" sz="2000" dirty="0" err="1">
                 <a:latin typeface="Titillium Web" panose="00000500000000000000" pitchFamily="2" charset="-18"/>
               </a:rPr>
               <a:t>Sicer</a:t>
             </a:r>
             <a:r>
-              <a:rPr lang="en-US" sz="2000">
+              <a:rPr lang="en-US" sz="2000" dirty="0">
                 <a:latin typeface="Titillium Web" panose="00000500000000000000" pitchFamily="2" charset="-18"/>
               </a:rPr>
               <a:t> pa so </a:t>
             </a:r>
             <a:r>
-              <a:rPr lang="en-US" sz="2000" err="1">
+              <a:rPr lang="en-US" sz="2000" dirty="0" err="1">
                 <a:latin typeface="Titillium Web" panose="00000500000000000000" pitchFamily="2" charset="-18"/>
               </a:rPr>
               <a:t>probabilistične</a:t>
             </a:r>
             <a:r>
-              <a:rPr lang="en-US" sz="2000">
-                <a:latin typeface="Titillium Web" panose="00000500000000000000" pitchFamily="2" charset="-18"/>
-              </a:rPr>
-              <a:t> </a:t>
-            </a:r>
-            <a:r>
-              <a:rPr lang="en-US" sz="2000" err="1">
+              <a:rPr lang="en-US" sz="2000" dirty="0">
+                <a:latin typeface="Titillium Web" panose="00000500000000000000" pitchFamily="2" charset="-18"/>
+              </a:rPr>
+              <a:t> </a:t>
+            </a:r>
+            <a:r>
+              <a:rPr lang="en-US" sz="2000" dirty="0" err="1">
                 <a:latin typeface="Titillium Web" panose="00000500000000000000" pitchFamily="2" charset="-18"/>
               </a:rPr>
               <a:t>izjave</a:t>
             </a:r>
             <a:r>
-              <a:rPr lang="en-US" sz="2000">
-                <a:latin typeface="Titillium Web" panose="00000500000000000000" pitchFamily="2" charset="-18"/>
-              </a:rPr>
-              <a:t> </a:t>
-            </a:r>
-            <a:r>
-              <a:rPr lang="en-US" sz="2000" err="1">
+              <a:rPr lang="en-US" sz="2000" dirty="0">
+                <a:latin typeface="Titillium Web" panose="00000500000000000000" pitchFamily="2" charset="-18"/>
+              </a:rPr>
+              <a:t> </a:t>
+            </a:r>
+            <a:r>
+              <a:rPr lang="en-US" sz="2000" dirty="0" err="1">
                 <a:latin typeface="Titillium Web" panose="00000500000000000000" pitchFamily="2" charset="-18"/>
               </a:rPr>
               <a:t>lahko</a:t>
             </a:r>
             <a:r>
-              <a:rPr lang="en-US" sz="2000">
-                <a:latin typeface="Titillium Web" panose="00000500000000000000" pitchFamily="2" charset="-18"/>
-              </a:rPr>
-              <a:t> </a:t>
-            </a:r>
-            <a:r>
-              <a:rPr lang="en-US" sz="2000" err="1">
+              <a:rPr lang="en-US" sz="2000" dirty="0">
+                <a:latin typeface="Titillium Web" panose="00000500000000000000" pitchFamily="2" charset="-18"/>
+              </a:rPr>
+              <a:t> </a:t>
+            </a:r>
+            <a:r>
+              <a:rPr lang="en-US" sz="2000" dirty="0" err="1">
                 <a:latin typeface="Titillium Web" panose="00000500000000000000" pitchFamily="2" charset="-18"/>
               </a:rPr>
               <a:t>subjektivne</a:t>
             </a:r>
             <a:r>
-              <a:rPr lang="en-US" sz="2000">
-                <a:latin typeface="Titillium Web" panose="00000500000000000000" pitchFamily="2" charset="-18"/>
-              </a:rPr>
-              <a:t> </a:t>
-            </a:r>
-            <a:r>
-              <a:rPr lang="en-US" sz="2000" err="1">
+              <a:rPr lang="en-US" sz="2000" dirty="0">
+                <a:latin typeface="Titillium Web" panose="00000500000000000000" pitchFamily="2" charset="-18"/>
+              </a:rPr>
+              <a:t> </a:t>
+            </a:r>
+            <a:r>
+              <a:rPr lang="en-US" sz="2000" dirty="0" err="1">
                 <a:latin typeface="Titillium Web" panose="00000500000000000000" pitchFamily="2" charset="-18"/>
               </a:rPr>
               <a:t>ali</a:t>
             </a:r>
             <a:r>
-              <a:rPr lang="en-US" sz="2000">
-                <a:latin typeface="Titillium Web" panose="00000500000000000000" pitchFamily="2" charset="-18"/>
-              </a:rPr>
-              <a:t> </a:t>
-            </a:r>
-            <a:r>
-              <a:rPr lang="en-US" sz="2000" err="1">
+              <a:rPr lang="en-US" sz="2000" dirty="0">
+                <a:latin typeface="Titillium Web" panose="00000500000000000000" pitchFamily="2" charset="-18"/>
+              </a:rPr>
+              <a:t> </a:t>
+            </a:r>
+            <a:r>
+              <a:rPr lang="en-US" sz="2000" dirty="0" err="1">
                 <a:latin typeface="Titillium Web" panose="00000500000000000000" pitchFamily="2" charset="-18"/>
               </a:rPr>
               <a:t>navidez</a:t>
             </a:r>
             <a:r>
-              <a:rPr lang="en-US" sz="2000">
-                <a:latin typeface="Titillium Web" panose="00000500000000000000" pitchFamily="2" charset="-18"/>
-              </a:rPr>
-              <a:t> </a:t>
-            </a:r>
-            <a:r>
-              <a:rPr lang="en-US" sz="2000" err="1">
+              <a:rPr lang="en-US" sz="2000" dirty="0">
+                <a:latin typeface="Titillium Web" panose="00000500000000000000" pitchFamily="2" charset="-18"/>
+              </a:rPr>
+              <a:t> </a:t>
+            </a:r>
+            <a:r>
+              <a:rPr lang="en-US" sz="2000" dirty="0" err="1">
                 <a:latin typeface="Titillium Web" panose="00000500000000000000" pitchFamily="2" charset="-18"/>
               </a:rPr>
               <a:t>popolnoma</a:t>
             </a:r>
             <a:r>
-              <a:rPr lang="en-US" sz="2000">
-                <a:latin typeface="Titillium Web" panose="00000500000000000000" pitchFamily="2" charset="-18"/>
-              </a:rPr>
-              <a:t> </a:t>
-            </a:r>
-            <a:r>
-              <a:rPr lang="en-US" sz="2000" err="1">
+              <a:rPr lang="en-US" sz="2000" dirty="0">
+                <a:latin typeface="Titillium Web" panose="00000500000000000000" pitchFamily="2" charset="-18"/>
+              </a:rPr>
+              <a:t> </a:t>
+            </a:r>
+            <a:r>
+              <a:rPr lang="en-US" sz="2000" dirty="0" err="1">
                 <a:latin typeface="Titillium Web" panose="00000500000000000000" pitchFamily="2" charset="-18"/>
               </a:rPr>
               <a:t>nesmiselne</a:t>
             </a:r>
             <a:r>
-              <a:rPr lang="en-US" sz="2000">
+              <a:rPr lang="en-US" sz="2000" dirty="0">
                 <a:latin typeface="Titillium Web" panose="00000500000000000000" pitchFamily="2" charset="-18"/>
               </a:rPr>
               <a:t>.</a:t>
             </a:r>
             <a:br>
-              <a:rPr lang="sl-SI" sz="2000">
+              <a:rPr lang="sl-SI" sz="2000" dirty="0">
                 <a:latin typeface="Titillium Web" panose="00000500000000000000" pitchFamily="2" charset="-18"/>
               </a:rPr>
             </a:br>
-            <a:endParaRPr lang="sl-SI" sz="2000">
+            <a:endParaRPr lang="sl-SI" sz="2000" dirty="0">
               <a:latin typeface="Titillium Web" panose="00000500000000000000" pitchFamily="2" charset="-18"/>
             </a:endParaRPr>
           </a:p>
@@ -9288,379 +9231,355 @@
               <a:buChar char="•"/>
             </a:pPr>
             <a:r>
-              <a:rPr lang="en-US" sz="2000" err="1">
+              <a:rPr lang="en-US" sz="2000" dirty="0" err="1">
                 <a:latin typeface="Titillium Web" panose="00000500000000000000" pitchFamily="2" charset="-18"/>
               </a:rPr>
               <a:t>Precej</a:t>
             </a:r>
             <a:r>
-              <a:rPr lang="en-US" sz="2000">
-                <a:latin typeface="Titillium Web" panose="00000500000000000000" pitchFamily="2" charset="-18"/>
-              </a:rPr>
-              <a:t> </a:t>
-            </a:r>
-            <a:r>
-              <a:rPr lang="en-US" sz="2000" err="1">
+              <a:rPr lang="en-US" sz="2000" dirty="0">
+                <a:latin typeface="Titillium Web" panose="00000500000000000000" pitchFamily="2" charset="-18"/>
+              </a:rPr>
+              <a:t> </a:t>
+            </a:r>
+            <a:r>
+              <a:rPr lang="en-US" sz="2000" dirty="0" err="1">
                 <a:latin typeface="Titillium Web" panose="00000500000000000000" pitchFamily="2" charset="-18"/>
               </a:rPr>
               <a:t>naravno</a:t>
             </a:r>
             <a:r>
-              <a:rPr lang="en-US" sz="2000">
-                <a:latin typeface="Titillium Web" panose="00000500000000000000" pitchFamily="2" charset="-18"/>
-              </a:rPr>
-              <a:t> </a:t>
-            </a:r>
-            <a:r>
-              <a:rPr lang="en-US" sz="2000" err="1">
+              <a:rPr lang="en-US" sz="2000" dirty="0">
+                <a:latin typeface="Titillium Web" panose="00000500000000000000" pitchFamily="2" charset="-18"/>
+              </a:rPr>
+              <a:t> </a:t>
+            </a:r>
+            <a:r>
+              <a:rPr lang="en-US" sz="2000" dirty="0" err="1">
                 <a:latin typeface="Titillium Web" panose="00000500000000000000" pitchFamily="2" charset="-18"/>
               </a:rPr>
               <a:t>nam</a:t>
             </a:r>
             <a:r>
-              <a:rPr lang="en-US" sz="2000">
+              <a:rPr lang="en-US" sz="2000" dirty="0">
                 <a:latin typeface="Titillium Web" panose="00000500000000000000" pitchFamily="2" charset="-18"/>
               </a:rPr>
               <a:t> je, da </a:t>
             </a:r>
             <a:r>
-              <a:rPr lang="en-US" sz="2000" err="1">
+              <a:rPr lang="en-US" sz="2000" dirty="0" err="1">
                 <a:latin typeface="Titillium Web" panose="00000500000000000000" pitchFamily="2" charset="-18"/>
               </a:rPr>
               <a:t>imamo</a:t>
             </a:r>
             <a:r>
-              <a:rPr lang="en-US" sz="2000">
-                <a:latin typeface="Titillium Web" panose="00000500000000000000" pitchFamily="2" charset="-18"/>
-              </a:rPr>
-              <a:t> </a:t>
-            </a:r>
-            <a:r>
-              <a:rPr lang="en-US" sz="2000" err="1">
+              <a:rPr lang="en-US" sz="2000" dirty="0">
+                <a:latin typeface="Titillium Web" panose="00000500000000000000" pitchFamily="2" charset="-18"/>
+              </a:rPr>
+              <a:t> </a:t>
+            </a:r>
+            <a:r>
+              <a:rPr lang="en-US" sz="2000" dirty="0" err="1">
                 <a:latin typeface="Titillium Web" panose="00000500000000000000" pitchFamily="2" charset="-18"/>
               </a:rPr>
               <a:t>verjetnostno</a:t>
             </a:r>
             <a:r>
-              <a:rPr lang="en-US" sz="2000">
-                <a:latin typeface="Titillium Web" panose="00000500000000000000" pitchFamily="2" charset="-18"/>
-              </a:rPr>
-              <a:t> </a:t>
-            </a:r>
-            <a:r>
-              <a:rPr lang="en-US" sz="2000" err="1">
+              <a:rPr lang="en-US" sz="2000" dirty="0">
+                <a:latin typeface="Titillium Web" panose="00000500000000000000" pitchFamily="2" charset="-18"/>
+              </a:rPr>
+              <a:t> </a:t>
+            </a:r>
+            <a:r>
+              <a:rPr lang="en-US" sz="2000" dirty="0" err="1">
                 <a:latin typeface="Titillium Web" panose="00000500000000000000" pitchFamily="2" charset="-18"/>
               </a:rPr>
               <a:t>mnenje</a:t>
             </a:r>
             <a:r>
-              <a:rPr lang="en-US" sz="2000">
+              <a:rPr lang="en-US" sz="2000" dirty="0">
                 <a:latin typeface="Titillium Web" panose="00000500000000000000" pitchFamily="2" charset="-18"/>
               </a:rPr>
               <a:t> o </a:t>
             </a:r>
             <a:r>
-              <a:rPr lang="en-US" sz="2000" err="1">
+              <a:rPr lang="en-US" sz="2000" dirty="0" err="1">
                 <a:latin typeface="Titillium Web" panose="00000500000000000000" pitchFamily="2" charset="-18"/>
               </a:rPr>
               <a:t>stvareh</a:t>
             </a:r>
             <a:r>
-              <a:rPr lang="en-US" sz="2000">
+              <a:rPr lang="en-US" sz="2000" dirty="0">
                 <a:latin typeface="Titillium Web" panose="00000500000000000000" pitchFamily="2" charset="-18"/>
               </a:rPr>
               <a:t>, </a:t>
             </a:r>
             <a:r>
-              <a:rPr lang="en-US" sz="2000" err="1">
+              <a:rPr lang="en-US" sz="2000" dirty="0" err="1">
                 <a:latin typeface="Titillium Web" panose="00000500000000000000" pitchFamily="2" charset="-18"/>
               </a:rPr>
               <a:t>ki</a:t>
             </a:r>
             <a:r>
-              <a:rPr lang="en-US" sz="2000">
-                <a:latin typeface="Titillium Web" panose="00000500000000000000" pitchFamily="2" charset="-18"/>
-              </a:rPr>
-              <a:t> </a:t>
-            </a:r>
-            <a:r>
-              <a:rPr lang="en-US" sz="2000" err="1">
+              <a:rPr lang="en-US" sz="2000" dirty="0">
+                <a:latin typeface="Titillium Web" panose="00000500000000000000" pitchFamily="2" charset="-18"/>
+              </a:rPr>
+              <a:t> </a:t>
+            </a:r>
+            <a:r>
+              <a:rPr lang="en-US" sz="2000" dirty="0" err="1">
                 <a:latin typeface="Titillium Web" panose="00000500000000000000" pitchFamily="2" charset="-18"/>
               </a:rPr>
               <a:t>niso</a:t>
             </a:r>
             <a:r>
-              <a:rPr lang="en-US" sz="2000">
-                <a:latin typeface="Titillium Web" panose="00000500000000000000" pitchFamily="2" charset="-18"/>
-              </a:rPr>
-              <a:t> </a:t>
-            </a:r>
-            <a:r>
-              <a:rPr lang="en-US" sz="2000" err="1">
+              <a:rPr lang="en-US" sz="2000" dirty="0">
+                <a:latin typeface="Titillium Web" panose="00000500000000000000" pitchFamily="2" charset="-18"/>
+              </a:rPr>
+              <a:t> </a:t>
+            </a:r>
+            <a:r>
+              <a:rPr lang="en-US" sz="2000" dirty="0" err="1">
                 <a:latin typeface="Titillium Web" panose="00000500000000000000" pitchFamily="2" charset="-18"/>
               </a:rPr>
               <a:t>naključne</a:t>
             </a:r>
             <a:r>
-              <a:rPr lang="sl-SI" sz="2000">
+              <a:rPr lang="sl-SI" sz="2000" dirty="0">
                 <a:latin typeface="Titillium Web" panose="00000500000000000000" pitchFamily="2" charset="-18"/>
               </a:rPr>
               <a:t>.</a:t>
             </a:r>
             <a:r>
-              <a:rPr lang="en-US" sz="2000">
-                <a:latin typeface="Titillium Web" panose="00000500000000000000" pitchFamily="2" charset="-18"/>
-              </a:rPr>
-              <a:t> </a:t>
-            </a:r>
-            <a:r>
-              <a:rPr lang="en-US" sz="2000" err="1">
+              <a:rPr lang="en-US" sz="2000" dirty="0">
+                <a:latin typeface="Titillium Web" panose="00000500000000000000" pitchFamily="2" charset="-18"/>
+              </a:rPr>
+              <a:t> </a:t>
+            </a:r>
+            <a:r>
+              <a:rPr lang="en-US" sz="2000" dirty="0" err="1">
                 <a:latin typeface="Titillium Web" panose="00000500000000000000" pitchFamily="2" charset="-18"/>
               </a:rPr>
               <a:t>Naključje</a:t>
             </a:r>
             <a:r>
-              <a:rPr lang="en-US" sz="2000">
+              <a:rPr lang="en-US" sz="2000" dirty="0">
                 <a:latin typeface="Titillium Web" panose="00000500000000000000" pitchFamily="2" charset="-18"/>
               </a:rPr>
               <a:t> je </a:t>
             </a:r>
             <a:r>
-              <a:rPr lang="en-US" sz="2000" err="1">
+              <a:rPr lang="en-US" sz="2000" dirty="0" err="1">
                 <a:latin typeface="Titillium Web" panose="00000500000000000000" pitchFamily="2" charset="-18"/>
               </a:rPr>
               <a:t>samo</a:t>
             </a:r>
             <a:r>
-              <a:rPr lang="en-US" sz="2000">
-                <a:latin typeface="Titillium Web" panose="00000500000000000000" pitchFamily="2" charset="-18"/>
-              </a:rPr>
-              <a:t> </a:t>
-            </a:r>
-            <a:r>
-              <a:rPr lang="en-US" sz="2000" err="1">
+              <a:rPr lang="en-US" sz="2000" dirty="0">
+                <a:latin typeface="Titillium Web" panose="00000500000000000000" pitchFamily="2" charset="-18"/>
+              </a:rPr>
+              <a:t> </a:t>
+            </a:r>
+            <a:r>
+              <a:rPr lang="en-US" sz="2000" dirty="0" err="1">
                 <a:latin typeface="Titillium Web" panose="00000500000000000000" pitchFamily="2" charset="-18"/>
               </a:rPr>
               <a:t>eden</a:t>
             </a:r>
             <a:r>
-              <a:rPr lang="en-US" sz="2000">
-                <a:latin typeface="Titillium Web" panose="00000500000000000000" pitchFamily="2" charset="-18"/>
-              </a:rPr>
-              <a:t> </a:t>
-            </a:r>
-            <a:r>
-              <a:rPr lang="en-US" sz="2000" err="1">
+              <a:rPr lang="en-US" sz="2000" dirty="0">
+                <a:latin typeface="Titillium Web" panose="00000500000000000000" pitchFamily="2" charset="-18"/>
+              </a:rPr>
+              <a:t> </a:t>
+            </a:r>
+            <a:r>
+              <a:rPr lang="en-US" sz="2000" dirty="0" err="1">
                 <a:latin typeface="Titillium Web" panose="00000500000000000000" pitchFamily="2" charset="-18"/>
               </a:rPr>
               <a:t>izmed</a:t>
             </a:r>
             <a:r>
-              <a:rPr lang="en-US" sz="2000">
-                <a:latin typeface="Titillium Web" panose="00000500000000000000" pitchFamily="2" charset="-18"/>
-              </a:rPr>
-              <a:t> </a:t>
-            </a:r>
-            <a:r>
-              <a:rPr lang="en-US" sz="2000" err="1">
+              <a:rPr lang="en-US" sz="2000" dirty="0">
+                <a:latin typeface="Titillium Web" panose="00000500000000000000" pitchFamily="2" charset="-18"/>
+              </a:rPr>
+              <a:t> </a:t>
+            </a:r>
+            <a:r>
+              <a:rPr lang="en-US" sz="2000" dirty="0" err="1">
                 <a:latin typeface="Titillium Web" panose="00000500000000000000" pitchFamily="2" charset="-18"/>
               </a:rPr>
               <a:t>virov</a:t>
             </a:r>
             <a:r>
-              <a:rPr lang="en-US" sz="2000">
-                <a:latin typeface="Titillium Web" panose="00000500000000000000" pitchFamily="2" charset="-18"/>
-              </a:rPr>
-              <a:t> </a:t>
-            </a:r>
-            <a:r>
-              <a:rPr lang="en-US" sz="2000" err="1">
+              <a:rPr lang="en-US" sz="2000" dirty="0">
+                <a:latin typeface="Titillium Web" panose="00000500000000000000" pitchFamily="2" charset="-18"/>
+              </a:rPr>
+              <a:t> </a:t>
+            </a:r>
+            <a:r>
+              <a:rPr lang="en-US" sz="2000" dirty="0" err="1">
                 <a:latin typeface="Titillium Web" panose="00000500000000000000" pitchFamily="2" charset="-18"/>
               </a:rPr>
               <a:t>negotovosti</a:t>
             </a:r>
             <a:r>
-              <a:rPr lang="en-US" sz="2000">
+              <a:rPr lang="en-US" sz="2000" dirty="0">
                 <a:latin typeface="Titillium Web" panose="00000500000000000000" pitchFamily="2" charset="-18"/>
               </a:rPr>
               <a:t> (in ne </a:t>
             </a:r>
             <a:r>
-              <a:rPr lang="en-US" sz="2000" err="1">
+              <a:rPr lang="en-US" sz="2000" dirty="0" err="1">
                 <a:latin typeface="Titillium Web" panose="00000500000000000000" pitchFamily="2" charset="-18"/>
               </a:rPr>
               <a:t>preveč</a:t>
             </a:r>
             <a:r>
-              <a:rPr lang="en-US" sz="2000">
-                <a:latin typeface="Titillium Web" panose="00000500000000000000" pitchFamily="2" charset="-18"/>
-              </a:rPr>
-              <a:t> </a:t>
-            </a:r>
-            <a:r>
-              <a:rPr lang="en-US" sz="2000" err="1">
-                <a:latin typeface="Titillium Web" panose="00000500000000000000" pitchFamily="2" charset="-18"/>
-              </a:rPr>
-              <a:t>pogost</a:t>
-            </a:r>
-            <a:r>
-              <a:rPr lang="en-US" sz="2000">
-                <a:latin typeface="Titillium Web" panose="00000500000000000000" pitchFamily="2" charset="-18"/>
-              </a:rPr>
-              <a:t>).</a:t>
-            </a:r>
-            <a:r>
-              <a:rPr lang="sl-SI" sz="2000">
-                <a:latin typeface="Titillium Web" panose="00000500000000000000" pitchFamily="2" charset="-18"/>
-              </a:rPr>
-              <a:t> </a:t>
-            </a:r>
-          </a:p>
-          <a:p>
-            <a:endParaRPr lang="sl-SI" sz="2000">
+              <a:rPr lang="en-US" sz="2000" dirty="0">
+                <a:latin typeface="Titillium Web" panose="00000500000000000000" pitchFamily="2" charset="-18"/>
+              </a:rPr>
+              <a:t> pogost).</a:t>
+            </a:r>
+            <a:r>
+              <a:rPr lang="sl-SI" sz="2000" dirty="0">
+                <a:latin typeface="Titillium Web" panose="00000500000000000000" pitchFamily="2" charset="-18"/>
+              </a:rPr>
+              <a:t> </a:t>
+            </a:r>
+          </a:p>
+          <a:p>
+            <a:endParaRPr lang="sl-SI" sz="2000" dirty="0">
               <a:latin typeface="Titillium Web" panose="00000500000000000000" pitchFamily="2" charset="-18"/>
             </a:endParaRPr>
           </a:p>
           <a:p>
             <a:r>
-              <a:rPr lang="en-US" sz="2000" err="1">
+              <a:rPr lang="en-US" sz="2000" dirty="0" err="1">
                 <a:latin typeface="Titillium Web" panose="00000500000000000000" pitchFamily="2" charset="-18"/>
               </a:rPr>
               <a:t>Uporaba</a:t>
             </a:r>
             <a:r>
-              <a:rPr lang="en-US" sz="2000">
-                <a:latin typeface="Titillium Web" panose="00000500000000000000" pitchFamily="2" charset="-18"/>
-              </a:rPr>
-              <a:t> </a:t>
-            </a:r>
-            <a:r>
-              <a:rPr lang="en-US" sz="2000" err="1">
+              <a:rPr lang="en-US" sz="2000" dirty="0">
+                <a:latin typeface="Titillium Web" panose="00000500000000000000" pitchFamily="2" charset="-18"/>
+              </a:rPr>
+              <a:t> </a:t>
+            </a:r>
+            <a:r>
+              <a:rPr lang="en-US" sz="2000" dirty="0" err="1">
                 <a:latin typeface="Titillium Web" panose="00000500000000000000" pitchFamily="2" charset="-18"/>
               </a:rPr>
               <a:t>verjetnosti</a:t>
             </a:r>
             <a:r>
-              <a:rPr lang="en-US" sz="2000">
-                <a:latin typeface="Titillium Web" panose="00000500000000000000" pitchFamily="2" charset="-18"/>
-              </a:rPr>
-              <a:t> </a:t>
-            </a:r>
-            <a:r>
-              <a:rPr lang="en-US" sz="2000" err="1">
-                <a:latin typeface="Titillium Web" panose="00000500000000000000" pitchFamily="2" charset="-18"/>
-              </a:rPr>
-              <a:t>za</a:t>
-            </a:r>
-            <a:r>
-              <a:rPr lang="en-US" sz="2000">
-                <a:latin typeface="Titillium Web" panose="00000500000000000000" pitchFamily="2" charset="-18"/>
-              </a:rPr>
-              <a:t> </a:t>
-            </a:r>
-            <a:r>
-              <a:rPr lang="en-US" sz="2000" err="1">
+              <a:rPr lang="en-US" sz="2000" dirty="0">
+                <a:latin typeface="Titillium Web" panose="00000500000000000000" pitchFamily="2" charset="-18"/>
+              </a:rPr>
+              <a:t> za </a:t>
+            </a:r>
+            <a:r>
+              <a:rPr lang="en-US" sz="2000" dirty="0" err="1">
                 <a:latin typeface="Titillium Web" panose="00000500000000000000" pitchFamily="2" charset="-18"/>
               </a:rPr>
               <a:t>izražanje</a:t>
             </a:r>
             <a:r>
-              <a:rPr lang="en-US" sz="2000">
-                <a:latin typeface="Titillium Web" panose="00000500000000000000" pitchFamily="2" charset="-18"/>
-              </a:rPr>
-              <a:t> </a:t>
-            </a:r>
-            <a:r>
-              <a:rPr lang="en-US" sz="2000" err="1">
+              <a:rPr lang="en-US" sz="2000" dirty="0">
+                <a:latin typeface="Titillium Web" panose="00000500000000000000" pitchFamily="2" charset="-18"/>
+              </a:rPr>
+              <a:t> </a:t>
+            </a:r>
+            <a:r>
+              <a:rPr lang="en-US" sz="2000" dirty="0" err="1">
                 <a:latin typeface="Titillium Web" panose="00000500000000000000" pitchFamily="2" charset="-18"/>
               </a:rPr>
               <a:t>negotovosti</a:t>
             </a:r>
             <a:r>
-              <a:rPr lang="en-US" sz="2000">
+              <a:rPr lang="en-US" sz="2000" dirty="0">
                 <a:latin typeface="Titillium Web" panose="00000500000000000000" pitchFamily="2" charset="-18"/>
               </a:rPr>
               <a:t> je </a:t>
             </a:r>
             <a:r>
-              <a:rPr lang="en-US" sz="2000" err="1">
+              <a:rPr lang="en-US" sz="2000" dirty="0" err="1">
                 <a:latin typeface="Titillium Web" panose="00000500000000000000" pitchFamily="2" charset="-18"/>
               </a:rPr>
               <a:t>bistvo</a:t>
             </a:r>
             <a:r>
-              <a:rPr lang="en-US" sz="2000">
-                <a:latin typeface="Titillium Web" panose="00000500000000000000" pitchFamily="2" charset="-18"/>
-              </a:rPr>
-              <a:t> </a:t>
-            </a:r>
-            <a:r>
-              <a:rPr lang="en-US" sz="2000" err="1">
+              <a:rPr lang="en-US" sz="2000" dirty="0">
+                <a:latin typeface="Titillium Web" panose="00000500000000000000" pitchFamily="2" charset="-18"/>
+              </a:rPr>
+              <a:t> </a:t>
+            </a:r>
+            <a:r>
+              <a:rPr lang="en-US" sz="2000" dirty="0" err="1">
                 <a:latin typeface="Titillium Web" panose="00000500000000000000" pitchFamily="2" charset="-18"/>
               </a:rPr>
               <a:t>bayesovskega</a:t>
             </a:r>
             <a:r>
-              <a:rPr lang="en-US" sz="2000">
-                <a:latin typeface="Titillium Web" panose="00000500000000000000" pitchFamily="2" charset="-18"/>
-              </a:rPr>
-              <a:t> </a:t>
-            </a:r>
-            <a:r>
-              <a:rPr lang="en-US" sz="2000" err="1">
+              <a:rPr lang="en-US" sz="2000" dirty="0">
+                <a:latin typeface="Titillium Web" panose="00000500000000000000" pitchFamily="2" charset="-18"/>
+              </a:rPr>
+              <a:t> </a:t>
+            </a:r>
+            <a:r>
+              <a:rPr lang="en-US" sz="2000" dirty="0" err="1">
                 <a:latin typeface="Titillium Web" panose="00000500000000000000" pitchFamily="2" charset="-18"/>
               </a:rPr>
               <a:t>pogleda</a:t>
             </a:r>
             <a:r>
-              <a:rPr lang="en-US" sz="2000">
-                <a:latin typeface="Titillium Web" panose="00000500000000000000" pitchFamily="2" charset="-18"/>
-              </a:rPr>
-              <a:t> </a:t>
-            </a:r>
-            <a:r>
-              <a:rPr lang="en-US" sz="2000" err="1">
+              <a:rPr lang="en-US" sz="2000" dirty="0">
+                <a:latin typeface="Titillium Web" panose="00000500000000000000" pitchFamily="2" charset="-18"/>
+              </a:rPr>
+              <a:t> </a:t>
+            </a:r>
+            <a:r>
+              <a:rPr lang="en-US" sz="2000" dirty="0" err="1">
                 <a:latin typeface="Titillium Web" panose="00000500000000000000" pitchFamily="2" charset="-18"/>
               </a:rPr>
               <a:t>na</a:t>
             </a:r>
             <a:r>
-              <a:rPr lang="en-US" sz="2000">
-                <a:latin typeface="Titillium Web" panose="00000500000000000000" pitchFamily="2" charset="-18"/>
-              </a:rPr>
-              <a:t> </a:t>
-            </a:r>
-            <a:r>
-              <a:rPr lang="en-US" sz="2000" err="1">
-                <a:latin typeface="Titillium Web" panose="00000500000000000000" pitchFamily="2" charset="-18"/>
-              </a:rPr>
-              <a:t>statistišno</a:t>
-            </a:r>
-            <a:r>
-              <a:rPr lang="en-US" sz="2000">
-                <a:latin typeface="Titillium Web" panose="00000500000000000000" pitchFamily="2" charset="-18"/>
-              </a:rPr>
-              <a:t> </a:t>
-            </a:r>
-            <a:r>
-              <a:rPr lang="en-US" sz="2000" err="1">
+              <a:rPr lang="en-US" sz="2000" dirty="0">
+                <a:latin typeface="Titillium Web" panose="00000500000000000000" pitchFamily="2" charset="-18"/>
+              </a:rPr>
+              <a:t> </a:t>
+            </a:r>
+            <a:r>
+              <a:rPr lang="en-US" sz="2000" dirty="0" err="1">
+                <a:latin typeface="Titillium Web" panose="00000500000000000000" pitchFamily="2" charset="-18"/>
+              </a:rPr>
+              <a:t>statistično</a:t>
+            </a:r>
+            <a:r>
+              <a:rPr lang="en-US" sz="2000" dirty="0">
+                <a:latin typeface="Titillium Web" panose="00000500000000000000" pitchFamily="2" charset="-18"/>
+              </a:rPr>
+              <a:t> </a:t>
+            </a:r>
+            <a:r>
+              <a:rPr lang="en-US" sz="2000" dirty="0" err="1">
                 <a:latin typeface="Titillium Web" panose="00000500000000000000" pitchFamily="2" charset="-18"/>
               </a:rPr>
               <a:t>sklepanje</a:t>
             </a:r>
             <a:r>
-              <a:rPr lang="en-US" sz="2000">
+              <a:rPr lang="en-US" sz="2000" dirty="0">
                 <a:latin typeface="Titillium Web" panose="00000500000000000000" pitchFamily="2" charset="-18"/>
               </a:rPr>
               <a:t>!</a:t>
             </a:r>
-            <a:endParaRPr lang="sl-SI" sz="2000">
+            <a:endParaRPr lang="sl-SI" sz="2000" dirty="0">
               <a:latin typeface="Titillium Web" panose="00000500000000000000" pitchFamily="2" charset="-18"/>
             </a:endParaRPr>
           </a:p>
           <a:p>
             <a:r>
-              <a:rPr lang="sl-SI" sz="2000">
+              <a:rPr lang="sl-SI" sz="2000" dirty="0">
                 <a:latin typeface="Titillium Web" panose="00000500000000000000" pitchFamily="2" charset="-18"/>
               </a:rPr>
               <a:t> </a:t>
@@ -11355,145 +11274,145 @@
               </a:spcAft>
             </a:pPr>
             <a:r>
-              <a:rPr lang="en-US" sz="2000" err="1">
+              <a:rPr lang="en-US" sz="2000" dirty="0" err="1">
                 <a:latin typeface="Titillium Web" panose="00000500000000000000" pitchFamily="2" charset="-18"/>
               </a:rPr>
               <a:t>Pri</a:t>
             </a:r>
             <a:r>
-              <a:rPr lang="en-US" sz="2000">
-                <a:latin typeface="Titillium Web" panose="00000500000000000000" pitchFamily="2" charset="-18"/>
-              </a:rPr>
-              <a:t> </a:t>
-            </a:r>
-            <a:r>
-              <a:rPr lang="en-US" sz="2000" err="1">
+              <a:rPr lang="en-US" sz="2000" dirty="0">
+                <a:latin typeface="Titillium Web" panose="00000500000000000000" pitchFamily="2" charset="-18"/>
+              </a:rPr>
+              <a:t> </a:t>
+            </a:r>
+            <a:r>
+              <a:rPr lang="en-US" sz="2000" dirty="0" err="1">
                 <a:latin typeface="Titillium Web" panose="00000500000000000000" pitchFamily="2" charset="-18"/>
               </a:rPr>
               <a:t>vseh</a:t>
             </a:r>
             <a:r>
-              <a:rPr lang="en-US" sz="2000">
-                <a:latin typeface="Titillium Web" panose="00000500000000000000" pitchFamily="2" charset="-18"/>
-              </a:rPr>
-              <a:t> the </a:t>
-            </a:r>
-            <a:r>
-              <a:rPr lang="en-US" sz="2000" err="1">
+              <a:rPr lang="en-US" sz="2000" dirty="0">
+                <a:latin typeface="Titillium Web" panose="00000500000000000000" pitchFamily="2" charset="-18"/>
+              </a:rPr>
+              <a:t> </a:t>
+            </a:r>
+            <a:r>
+              <a:rPr lang="en-US" sz="2000" dirty="0" err="1">
+                <a:latin typeface="Titillium Web" panose="00000500000000000000" pitchFamily="2" charset="-18"/>
+              </a:rPr>
+              <a:t>teh</a:t>
+            </a:r>
+            <a:r>
+              <a:rPr lang="en-US" sz="2000" dirty="0">
+                <a:latin typeface="Titillium Web" panose="00000500000000000000" pitchFamily="2" charset="-18"/>
+              </a:rPr>
+              <a:t> </a:t>
+            </a:r>
+            <a:r>
+              <a:rPr lang="en-US" sz="2000" dirty="0" err="1">
                 <a:latin typeface="Titillium Web" panose="00000500000000000000" pitchFamily="2" charset="-18"/>
               </a:rPr>
               <a:t>predpostavkah</a:t>
             </a:r>
             <a:r>
-              <a:rPr lang="en-US" sz="2000">
+              <a:rPr lang="en-US" sz="2000" dirty="0">
                 <a:latin typeface="Titillium Web" panose="00000500000000000000" pitchFamily="2" charset="-18"/>
               </a:rPr>
               <a:t> in </a:t>
             </a:r>
             <a:r>
-              <a:rPr lang="en-US" sz="2000" err="1">
+              <a:rPr lang="en-US" sz="2000" dirty="0" err="1">
                 <a:latin typeface="Titillium Web" panose="00000500000000000000" pitchFamily="2" charset="-18"/>
               </a:rPr>
               <a:t>upoštevajoč</a:t>
             </a:r>
             <a:r>
-              <a:rPr lang="en-US" sz="2000">
-                <a:latin typeface="Titillium Web" panose="00000500000000000000" pitchFamily="2" charset="-18"/>
-              </a:rPr>
-              <a:t> </a:t>
-            </a:r>
-            <a:r>
-              <a:rPr lang="en-US" sz="2000" err="1">
+              <a:rPr lang="en-US" sz="2000" dirty="0">
+                <a:latin typeface="Titillium Web" panose="00000500000000000000" pitchFamily="2" charset="-18"/>
+              </a:rPr>
+              <a:t> </a:t>
+            </a:r>
+            <a:r>
+              <a:rPr lang="en-US" sz="2000" dirty="0" err="1">
                 <a:latin typeface="Titillium Web" panose="00000500000000000000" pitchFamily="2" charset="-18"/>
               </a:rPr>
               <a:t>zakone</a:t>
             </a:r>
             <a:r>
-              <a:rPr lang="en-US" sz="2000">
-                <a:latin typeface="Titillium Web" panose="00000500000000000000" pitchFamily="2" charset="-18"/>
-              </a:rPr>
-              <a:t> </a:t>
-            </a:r>
-            <a:r>
-              <a:rPr lang="en-US" sz="2000" err="1">
+              <a:rPr lang="en-US" sz="2000" dirty="0">
+                <a:latin typeface="Titillium Web" panose="00000500000000000000" pitchFamily="2" charset="-18"/>
+              </a:rPr>
+              <a:t> </a:t>
+            </a:r>
+            <a:r>
+              <a:rPr lang="en-US" sz="2000" dirty="0" err="1">
                 <a:latin typeface="Titillium Web" panose="00000500000000000000" pitchFamily="2" charset="-18"/>
               </a:rPr>
               <a:t>verjetnosti</a:t>
             </a:r>
             <a:r>
-              <a:rPr lang="en-US" sz="2000">
+              <a:rPr lang="en-US" sz="2000" dirty="0">
                 <a:latin typeface="Titillium Web" panose="00000500000000000000" pitchFamily="2" charset="-18"/>
               </a:rPr>
               <a:t>, </a:t>
             </a:r>
             <a:r>
-              <a:rPr lang="en-US" sz="2000" err="1">
+              <a:rPr lang="en-US" sz="2000" dirty="0" err="1">
                 <a:latin typeface="Titillium Web" panose="00000500000000000000" pitchFamily="2" charset="-18"/>
               </a:rPr>
               <a:t>kakšno</a:t>
             </a:r>
             <a:r>
-              <a:rPr lang="en-US" sz="2000">
-                <a:latin typeface="Titillium Web" panose="00000500000000000000" pitchFamily="2" charset="-18"/>
-              </a:rPr>
-              <a:t> </a:t>
-            </a:r>
-            <a:r>
-              <a:rPr lang="en-US" sz="2000" err="1">
-                <a:latin typeface="Titillium Web" panose="00000500000000000000" pitchFamily="2" charset="-18"/>
-              </a:rPr>
-              <a:t>mora</a:t>
-            </a:r>
-            <a:r>
-              <a:rPr lang="en-US" sz="2000">
-                <a:latin typeface="Titillium Web" panose="00000500000000000000" pitchFamily="2" charset="-18"/>
-              </a:rPr>
-              <a:t> </a:t>
-            </a:r>
-            <a:r>
-              <a:rPr lang="en-US" sz="2000" err="1">
+              <a:rPr lang="en-US" sz="2000" dirty="0">
+                <a:latin typeface="Titillium Web" panose="00000500000000000000" pitchFamily="2" charset="-18"/>
+              </a:rPr>
+              <a:t> mora </a:t>
+            </a:r>
+            <a:r>
+              <a:rPr lang="en-US" sz="2000" dirty="0" err="1">
                 <a:latin typeface="Titillium Web" panose="00000500000000000000" pitchFamily="2" charset="-18"/>
               </a:rPr>
               <a:t>biti</a:t>
             </a:r>
             <a:r>
-              <a:rPr lang="en-US" sz="2000">
-                <a:latin typeface="Titillium Web" panose="00000500000000000000" pitchFamily="2" charset="-18"/>
-              </a:rPr>
-              <a:t> </a:t>
-            </a:r>
-            <a:r>
-              <a:rPr lang="en-US" sz="2000" err="1">
+              <a:rPr lang="en-US" sz="2000" dirty="0">
+                <a:latin typeface="Titillium Web" panose="00000500000000000000" pitchFamily="2" charset="-18"/>
+              </a:rPr>
+              <a:t> </a:t>
+            </a:r>
+            <a:r>
+              <a:rPr lang="en-US" sz="2000" dirty="0" err="1">
                 <a:latin typeface="Titillium Web" panose="00000500000000000000" pitchFamily="2" charset="-18"/>
               </a:rPr>
               <a:t>moje</a:t>
             </a:r>
             <a:r>
-              <a:rPr lang="en-US" sz="2000">
-                <a:latin typeface="Titillium Web" panose="00000500000000000000" pitchFamily="2" charset="-18"/>
-              </a:rPr>
-              <a:t> </a:t>
-            </a:r>
-            <a:r>
-              <a:rPr lang="en-US" sz="2000" err="1">
+              <a:rPr lang="en-US" sz="2000" dirty="0">
+                <a:latin typeface="Titillium Web" panose="00000500000000000000" pitchFamily="2" charset="-18"/>
+              </a:rPr>
+              <a:t> </a:t>
+            </a:r>
+            <a:r>
+              <a:rPr lang="en-US" sz="2000" dirty="0" err="1">
                 <a:latin typeface="Titillium Web" panose="00000500000000000000" pitchFamily="2" charset="-18"/>
               </a:rPr>
               <a:t>mnenje</a:t>
             </a:r>
             <a:r>
-              <a:rPr lang="en-US" sz="2000">
+              <a:rPr lang="en-US" sz="2000" dirty="0">
                 <a:latin typeface="Titillium Web" panose="00000500000000000000" pitchFamily="2" charset="-18"/>
               </a:rPr>
               <a:t> o</a:t>
             </a:r>
             <a:r>
-              <a:rPr lang="sl-SI" sz="2000">
-                <a:latin typeface="Titillium Web" panose="00000500000000000000" pitchFamily="2" charset="-18"/>
-              </a:rPr>
-              <a:t> </a:t>
-            </a:r>
-            <a:r>
-              <a:rPr lang="el-GR" sz="2000">
+              <a:rPr lang="sl-SI" sz="2000" dirty="0">
+                <a:latin typeface="Titillium Web" panose="00000500000000000000" pitchFamily="2" charset="-18"/>
+              </a:rPr>
+              <a:t> </a:t>
+            </a:r>
+            <a:r>
+              <a:rPr lang="el-GR" sz="2000" dirty="0">
                 <a:solidFill>
                   <a:srgbClr val="FF0000"/>
                 </a:solidFill>
@@ -11502,48 +11421,36 @@
               <a:t>θ</a:t>
             </a:r>
             <a:r>
-              <a:rPr lang="en-US" sz="2000">
-                <a:latin typeface="Titillium Web" panose="00000500000000000000" pitchFamily="2" charset="-18"/>
-              </a:rPr>
-              <a:t>, </a:t>
-            </a:r>
-            <a:r>
-              <a:rPr lang="en-US" sz="2000" err="1">
-                <a:latin typeface="Titillium Web" panose="00000500000000000000" pitchFamily="2" charset="-18"/>
-              </a:rPr>
-              <a:t>ko</a:t>
-            </a:r>
-            <a:r>
-              <a:rPr lang="en-US" sz="2000">
-                <a:latin typeface="Titillium Web" panose="00000500000000000000" pitchFamily="2" charset="-18"/>
-              </a:rPr>
-              <a:t> </a:t>
-            </a:r>
-            <a:r>
-              <a:rPr lang="en-US" sz="2000" err="1">
+              <a:rPr lang="en-US" sz="2000" dirty="0">
+                <a:latin typeface="Titillium Web" panose="00000500000000000000" pitchFamily="2" charset="-18"/>
+              </a:rPr>
+              <a:t>, ko </a:t>
+            </a:r>
+            <a:r>
+              <a:rPr lang="en-US" sz="2000" dirty="0" err="1">
                 <a:latin typeface="Titillium Web" panose="00000500000000000000" pitchFamily="2" charset="-18"/>
               </a:rPr>
               <a:t>vidim</a:t>
             </a:r>
             <a:r>
-              <a:rPr lang="en-US" sz="2000">
-                <a:latin typeface="Titillium Web" panose="00000500000000000000" pitchFamily="2" charset="-18"/>
-              </a:rPr>
-              <a:t> </a:t>
-            </a:r>
-            <a:r>
-              <a:rPr lang="en-US" sz="2000" err="1">
+              <a:rPr lang="en-US" sz="2000" dirty="0">
+                <a:latin typeface="Titillium Web" panose="00000500000000000000" pitchFamily="2" charset="-18"/>
+              </a:rPr>
+              <a:t> </a:t>
+            </a:r>
+            <a:r>
+              <a:rPr lang="en-US" sz="2000" dirty="0" err="1">
                 <a:latin typeface="Titillium Web" panose="00000500000000000000" pitchFamily="2" charset="-18"/>
               </a:rPr>
               <a:t>podatke</a:t>
             </a:r>
             <a:r>
-              <a:rPr lang="en-US" sz="2000">
+              <a:rPr lang="en-US" sz="2000" dirty="0">
                 <a:latin typeface="Titillium Web" panose="00000500000000000000" pitchFamily="2" charset="-18"/>
               </a:rPr>
               <a:t>?</a:t>
             </a:r>
-            <a:endParaRPr lang="sl-SI" sz="2000">
+            <a:endParaRPr lang="sl-SI" sz="2000" dirty="0">
               <a:latin typeface="Titillium Web" panose="00000500000000000000" pitchFamily="2" charset="-18"/>
             </a:endParaRPr>
           </a:p>
@@ -12407,145 +12314,145 @@
               </a:spcAft>
             </a:pPr>
             <a:r>
-              <a:rPr lang="en-US" sz="2000" err="1">
+              <a:rPr lang="en-US" sz="2000" dirty="0" err="1">
                 <a:latin typeface="Titillium Web" panose="00000500000000000000" pitchFamily="2" charset="-18"/>
               </a:rPr>
               <a:t>Pri</a:t>
             </a:r>
             <a:r>
-              <a:rPr lang="en-US" sz="2000">
-                <a:latin typeface="Titillium Web" panose="00000500000000000000" pitchFamily="2" charset="-18"/>
-              </a:rPr>
-              <a:t> </a:t>
-            </a:r>
-            <a:r>
-              <a:rPr lang="en-US" sz="2000" err="1">
+              <a:rPr lang="en-US" sz="2000" dirty="0">
+                <a:latin typeface="Titillium Web" panose="00000500000000000000" pitchFamily="2" charset="-18"/>
+              </a:rPr>
+              <a:t> </a:t>
+            </a:r>
+            <a:r>
+              <a:rPr lang="en-US" sz="2000" dirty="0" err="1">
                 <a:latin typeface="Titillium Web" panose="00000500000000000000" pitchFamily="2" charset="-18"/>
               </a:rPr>
               <a:t>vseh</a:t>
             </a:r>
             <a:r>
-              <a:rPr lang="en-US" sz="2000">
-                <a:latin typeface="Titillium Web" panose="00000500000000000000" pitchFamily="2" charset="-18"/>
-              </a:rPr>
-              <a:t> the </a:t>
-            </a:r>
-            <a:r>
-              <a:rPr lang="en-US" sz="2000" err="1">
+              <a:rPr lang="en-US" sz="2000" dirty="0">
+                <a:latin typeface="Titillium Web" panose="00000500000000000000" pitchFamily="2" charset="-18"/>
+              </a:rPr>
+              <a:t> </a:t>
+            </a:r>
+            <a:r>
+              <a:rPr lang="en-US" sz="2000" dirty="0" err="1">
+                <a:latin typeface="Titillium Web" panose="00000500000000000000" pitchFamily="2" charset="-18"/>
+              </a:rPr>
+              <a:t>teh</a:t>
+            </a:r>
+            <a:r>
+              <a:rPr lang="en-US" sz="2000" dirty="0">
+                <a:latin typeface="Titillium Web" panose="00000500000000000000" pitchFamily="2" charset="-18"/>
+              </a:rPr>
+              <a:t> </a:t>
+            </a:r>
+            <a:r>
+              <a:rPr lang="en-US" sz="2000" dirty="0" err="1">
                 <a:latin typeface="Titillium Web" panose="00000500000000000000" pitchFamily="2" charset="-18"/>
               </a:rPr>
               <a:t>predpostavkah</a:t>
             </a:r>
             <a:r>
-              <a:rPr lang="en-US" sz="2000">
+              <a:rPr lang="en-US" sz="2000" dirty="0">
                 <a:latin typeface="Titillium Web" panose="00000500000000000000" pitchFamily="2" charset="-18"/>
               </a:rPr>
               <a:t> in </a:t>
             </a:r>
             <a:r>
-              <a:rPr lang="en-US" sz="2000" err="1">
+              <a:rPr lang="en-US" sz="2000" dirty="0" err="1">
                 <a:latin typeface="Titillium Web" panose="00000500000000000000" pitchFamily="2" charset="-18"/>
               </a:rPr>
               <a:t>upoštevajoč</a:t>
             </a:r>
             <a:r>
-              <a:rPr lang="en-US" sz="2000">
-                <a:latin typeface="Titillium Web" panose="00000500000000000000" pitchFamily="2" charset="-18"/>
-              </a:rPr>
-              <a:t> </a:t>
-            </a:r>
-            <a:r>
-              <a:rPr lang="en-US" sz="2000" err="1">
+              <a:rPr lang="en-US" sz="2000" dirty="0">
+                <a:latin typeface="Titillium Web" panose="00000500000000000000" pitchFamily="2" charset="-18"/>
+              </a:rPr>
+              <a:t> </a:t>
+            </a:r>
+            <a:r>
+              <a:rPr lang="en-US" sz="2000" dirty="0" err="1">
                 <a:latin typeface="Titillium Web" panose="00000500000000000000" pitchFamily="2" charset="-18"/>
               </a:rPr>
               <a:t>zakone</a:t>
             </a:r>
             <a:r>
-              <a:rPr lang="en-US" sz="2000">
-                <a:latin typeface="Titillium Web" panose="00000500000000000000" pitchFamily="2" charset="-18"/>
-              </a:rPr>
-              <a:t> </a:t>
-            </a:r>
-            <a:r>
-              <a:rPr lang="en-US" sz="2000" err="1">
+              <a:rPr lang="en-US" sz="2000" dirty="0">
+                <a:latin typeface="Titillium Web" panose="00000500000000000000" pitchFamily="2" charset="-18"/>
+              </a:rPr>
+              <a:t> </a:t>
+            </a:r>
+            <a:r>
+              <a:rPr lang="en-US" sz="2000" dirty="0" err="1">
                 <a:latin typeface="Titillium Web" panose="00000500000000000000" pitchFamily="2" charset="-18"/>
               </a:rPr>
               <a:t>verjetnosti</a:t>
             </a:r>
             <a:r>
-              <a:rPr lang="en-US" sz="2000">
+              <a:rPr lang="en-US" sz="2000" dirty="0">
                 <a:latin typeface="Titillium Web" panose="00000500000000000000" pitchFamily="2" charset="-18"/>
               </a:rPr>
               <a:t>, </a:t>
             </a:r>
             <a:r>
-              <a:rPr lang="en-US" sz="2000" err="1">
+              <a:rPr lang="en-US" sz="2000" dirty="0" err="1">
                 <a:latin typeface="Titillium Web" panose="00000500000000000000" pitchFamily="2" charset="-18"/>
               </a:rPr>
               <a:t>kakšno</a:t>
             </a:r>
             <a:r>
-              <a:rPr lang="en-US" sz="2000">
-                <a:latin typeface="Titillium Web" panose="00000500000000000000" pitchFamily="2" charset="-18"/>
-              </a:rPr>
-              <a:t> </a:t>
-            </a:r>
-            <a:r>
-              <a:rPr lang="en-US" sz="2000" err="1">
-                <a:latin typeface="Titillium Web" panose="00000500000000000000" pitchFamily="2" charset="-18"/>
-              </a:rPr>
-              <a:t>mora</a:t>
-            </a:r>
-            <a:r>
-              <a:rPr lang="en-US" sz="2000">
-                <a:latin typeface="Titillium Web" panose="00000500000000000000" pitchFamily="2" charset="-18"/>
-              </a:rPr>
-              <a:t> </a:t>
-            </a:r>
-            <a:r>
-              <a:rPr lang="en-US" sz="2000" err="1">
+              <a:rPr lang="en-US" sz="2000" dirty="0">
+                <a:latin typeface="Titillium Web" panose="00000500000000000000" pitchFamily="2" charset="-18"/>
+              </a:rPr>
+              <a:t> mora </a:t>
+            </a:r>
+            <a:r>
+              <a:rPr lang="en-US" sz="2000" dirty="0" err="1">
                 <a:latin typeface="Titillium Web" panose="00000500000000000000" pitchFamily="2" charset="-18"/>
               </a:rPr>
               <a:t>biti</a:t>
             </a:r>
             <a:r>
-              <a:rPr lang="en-US" sz="2000">
-                <a:latin typeface="Titillium Web" panose="00000500000000000000" pitchFamily="2" charset="-18"/>
-              </a:rPr>
-              <a:t> </a:t>
-            </a:r>
-            <a:r>
-              <a:rPr lang="en-US" sz="2000" err="1">
+              <a:rPr lang="en-US" sz="2000" dirty="0">
+                <a:latin typeface="Titillium Web" panose="00000500000000000000" pitchFamily="2" charset="-18"/>
+              </a:rPr>
+              <a:t> </a:t>
+            </a:r>
+            <a:r>
+              <a:rPr lang="en-US" sz="2000" dirty="0" err="1">
                 <a:latin typeface="Titillium Web" panose="00000500000000000000" pitchFamily="2" charset="-18"/>
               </a:rPr>
               <a:t>moje</a:t>
             </a:r>
             <a:r>
-              <a:rPr lang="en-US" sz="2000">
-                <a:latin typeface="Titillium Web" panose="00000500000000000000" pitchFamily="2" charset="-18"/>
-              </a:rPr>
-              <a:t> </a:t>
-            </a:r>
-            <a:r>
-              <a:rPr lang="en-US" sz="2000" err="1">
+              <a:rPr lang="en-US" sz="2000" dirty="0">
+                <a:latin typeface="Titillium Web" panose="00000500000000000000" pitchFamily="2" charset="-18"/>
+              </a:rPr>
+              <a:t> </a:t>
+            </a:r>
+            <a:r>
+              <a:rPr lang="en-US" sz="2000" dirty="0" err="1">
                 <a:latin typeface="Titillium Web" panose="00000500000000000000" pitchFamily="2" charset="-18"/>
               </a:rPr>
               <a:t>mnenje</a:t>
             </a:r>
             <a:r>
-              <a:rPr lang="en-US" sz="2000">
+              <a:rPr lang="en-US" sz="2000" dirty="0">
                 <a:latin typeface="Titillium Web" panose="00000500000000000000" pitchFamily="2" charset="-18"/>
               </a:rPr>
               <a:t> o</a:t>
             </a:r>
             <a:r>
-              <a:rPr lang="sl-SI" sz="2000">
-                <a:latin typeface="Titillium Web" panose="00000500000000000000" pitchFamily="2" charset="-18"/>
-              </a:rPr>
-              <a:t> </a:t>
-            </a:r>
-            <a:r>
-              <a:rPr lang="el-GR" sz="2000">
+              <a:rPr lang="sl-SI" sz="2000" dirty="0">
+                <a:latin typeface="Titillium Web" panose="00000500000000000000" pitchFamily="2" charset="-18"/>
+              </a:rPr>
+              <a:t> </a:t>
+            </a:r>
+            <a:r>
+              <a:rPr lang="el-GR" sz="2000" dirty="0">
                 <a:solidFill>
                   <a:srgbClr val="FF0000"/>
                 </a:solidFill>
@@ -12554,48 +12461,36 @@
               <a:t>θ</a:t>
             </a:r>
             <a:r>
-              <a:rPr lang="en-US" sz="2000">
-                <a:latin typeface="Titillium Web" panose="00000500000000000000" pitchFamily="2" charset="-18"/>
-              </a:rPr>
-              <a:t>, </a:t>
-            </a:r>
-            <a:r>
-              <a:rPr lang="en-US" sz="2000" err="1">
-                <a:latin typeface="Titillium Web" panose="00000500000000000000" pitchFamily="2" charset="-18"/>
-              </a:rPr>
-              <a:t>ko</a:t>
-            </a:r>
-            <a:r>
-              <a:rPr lang="en-US" sz="2000">
-                <a:latin typeface="Titillium Web" panose="00000500000000000000" pitchFamily="2" charset="-18"/>
-              </a:rPr>
-              <a:t> </a:t>
-            </a:r>
-            <a:r>
-              <a:rPr lang="en-US" sz="2000" err="1">
+              <a:rPr lang="en-US" sz="2000" dirty="0">
+                <a:latin typeface="Titillium Web" panose="00000500000000000000" pitchFamily="2" charset="-18"/>
+              </a:rPr>
+              <a:t>, ko </a:t>
+            </a:r>
+            <a:r>
+              <a:rPr lang="en-US" sz="2000" dirty="0" err="1">
                 <a:latin typeface="Titillium Web" panose="00000500000000000000" pitchFamily="2" charset="-18"/>
               </a:rPr>
               <a:t>vidim</a:t>
             </a:r>
             <a:r>
-              <a:rPr lang="en-US" sz="2000">
-                <a:latin typeface="Titillium Web" panose="00000500000000000000" pitchFamily="2" charset="-18"/>
-              </a:rPr>
-              <a:t> </a:t>
-            </a:r>
-            <a:r>
-              <a:rPr lang="en-US" sz="2000" err="1">
+              <a:rPr lang="en-US" sz="2000" dirty="0">
+                <a:latin typeface="Titillium Web" panose="00000500000000000000" pitchFamily="2" charset="-18"/>
+              </a:rPr>
+              <a:t> </a:t>
+            </a:r>
+            <a:r>
+              <a:rPr lang="en-US" sz="2000" dirty="0" err="1">
                 <a:latin typeface="Titillium Web" panose="00000500000000000000" pitchFamily="2" charset="-18"/>
               </a:rPr>
               <a:t>podatke</a:t>
             </a:r>
             <a:r>
-              <a:rPr lang="en-US" sz="2000">
+              <a:rPr lang="en-US" sz="2000" dirty="0">
                 <a:latin typeface="Titillium Web" panose="00000500000000000000" pitchFamily="2" charset="-18"/>
               </a:rPr>
               <a:t>?</a:t>
             </a:r>
-            <a:endParaRPr lang="sl-SI" sz="2000">
+            <a:endParaRPr lang="sl-SI" sz="2000" dirty="0">
               <a:latin typeface="Titillium Web" panose="00000500000000000000" pitchFamily="2" charset="-18"/>
             </a:endParaRPr>
           </a:p>
@@ -16671,7 +16566,7 @@
               <a:rPr lang="en-US" sz="1800" dirty="0">
                 <a:latin typeface="Titillium Web" panose="00000500000000000000" pitchFamily="2" charset="0"/>
               </a:rPr>
-              <a:t> v </a:t>
+              <a:t>, v </a:t>
             </a:r>
             <a:r>
               <a:rPr lang="en-US" sz="1800" dirty="0" err="1">
@@ -16945,7 +16840,7 @@
               <a:rPr lang="en-US" sz="1800" dirty="0">
                 <a:latin typeface="Titillium Web" panose="00000500000000000000" pitchFamily="2" charset="0"/>
               </a:rPr>
-              <a:t> v </a:t>
+              <a:t>, v </a:t>
             </a:r>
             <a:r>
               <a:rPr lang="en-US" sz="1800" dirty="0" err="1">
@@ -18983,7 +18878,7 @@
               <a:rPr lang="en-US" sz="1400" dirty="0" err="1">
                 <a:latin typeface="Titillium Web" panose="00000500000000000000" pitchFamily="2" charset="0"/>
               </a:rPr>
-              <a:t>števila</a:t>
+              <a:t>števil</a:t>
             </a:r>
             <a:r>
               <a:rPr lang="en-US" sz="1400" dirty="0">
@@ -19039,7 +18934,7 @@
               <a:rPr lang="en-US" sz="1400" dirty="0" err="1">
                 <a:latin typeface="Titillium Web" panose="00000500000000000000" pitchFamily="2" charset="0"/>
               </a:rPr>
-              <a:t>porazdelive</a:t>
+              <a:t>porazdelitve</a:t>
             </a:r>
             <a:endParaRPr lang="en-US" sz="1400" b="1" dirty="0">
               <a:latin typeface="Titillium Web" panose="00000500000000000000" pitchFamily="2" charset="0"/>
@@ -19105,7 +19000,7 @@
               <a:rPr lang="en-US" sz="1400" dirty="0" err="1">
                 <a:latin typeface="Titillium Web" panose="00000500000000000000" pitchFamily="2" charset="0"/>
               </a:rPr>
-              <a:t>števila</a:t>
+              <a:t>števil</a:t>
             </a:r>
             <a:endParaRPr lang="en-US" sz="1400" dirty="0">
               <a:latin typeface="Titillium Web" panose="00000500000000000000" pitchFamily="2" charset="0"/>
@@ -19219,7 +19114,7 @@
               <a:rPr lang="en-US" sz="1800" dirty="0" err="1">
                 <a:latin typeface="Titillium Web" panose="00000500000000000000" pitchFamily="2" charset="0"/>
               </a:rPr>
-              <a:t>vnanašnje</a:t>
+              <a:t>vnašanje</a:t>
             </a:r>
             <a:r>
               <a:rPr lang="en-US" sz="1800" dirty="0">
@@ -20137,7 +20032,7 @@
               <a:rPr lang="en-US" sz="1500" i="1" dirty="0" err="1">
                 <a:latin typeface="Titillium Web" panose="00000500000000000000" pitchFamily="2" charset="0"/>
               </a:rPr>
-              <a:t>kdo</a:t>
+              <a:t>Kdo</a:t>
             </a:r>
             <a:r>
               <a:rPr lang="en-US" sz="1500" i="1" dirty="0">
@@ -20155,7 +20050,7 @@
               <a:rPr lang="en-US" sz="1500" i="1" dirty="0">
                 <a:latin typeface="Titillium Web" panose="00000500000000000000" pitchFamily="2" charset="0"/>
               </a:rPr>
-              <a:t>,</a:t>
+              <a:t>?</a:t>
             </a:r>
           </a:p>
           <a:p>
@@ -20164,7 +20059,7 @@
               <a:rPr lang="en-US" sz="1500" i="1" dirty="0" err="1">
                 <a:latin typeface="Titillium Web" panose="00000500000000000000" pitchFamily="2" charset="0"/>
               </a:rPr>
-              <a:t>kako</a:t>
+              <a:t>Kako</a:t>
             </a:r>
             <a:r>
               <a:rPr lang="en-US" sz="1500" i="1" dirty="0">
@@ -20206,7 +20101,7 @@
               <a:rPr lang="en-US" sz="1500" i="1" dirty="0">
                 <a:latin typeface="Titillium Web" panose="00000500000000000000" pitchFamily="2" charset="0"/>
               </a:rPr>
-              <a:t>,</a:t>
+              <a:t>?</a:t>
             </a:r>
           </a:p>
           <a:p>
@@ -20215,7 +20110,7 @@
               <a:rPr lang="en-US" sz="1500" i="1" dirty="0" err="1">
                 <a:latin typeface="Titillium Web" panose="00000500000000000000" pitchFamily="2" charset="0"/>
               </a:rPr>
-              <a:t>kolikšna</a:t>
+              <a:t>Kolikšna</a:t>
             </a:r>
             <a:r>
               <a:rPr lang="en-US" sz="1500" i="1" dirty="0">
@@ -20383,7 +20278,7 @@
             <a:pPr marL="914400" lvl="2" indent="0">
               <a:buNone/>
             </a:pPr>
-            <a:endParaRPr lang="en-US" sz="1200">
+            <a:endParaRPr lang="en-US" sz="1200" dirty="0">
               <a:latin typeface="Titillium Web" panose="00000500000000000000" pitchFamily="2" charset="0"/>
             </a:endParaRPr>
           </a:p>
@@ -20914,7 +20809,7 @@
               <a:rPr lang="en-US" sz="1400" dirty="0" err="1">
                 <a:latin typeface="Titillium Web" panose="00000500000000000000" pitchFamily="2" charset="0"/>
               </a:rPr>
-              <a:t>nespešen</a:t>
+              <a:t>neuspešen</a:t>
             </a:r>
             <a:r>
               <a:rPr lang="en-US" sz="1400" dirty="0">
@@ -21910,7 +21805,19 @@
               <a:rPr lang="en-US" sz="1700" dirty="0">
                 <a:latin typeface="Titillium Web" panose="00000500000000000000" pitchFamily="2" charset="0"/>
               </a:rPr>
-              <a:t> temperature za </a:t>
+              <a:t> </a:t>
+            </a:r>
+            <a:r>
+              <a:rPr lang="en-US" sz="1700" dirty="0" err="1">
+                <a:latin typeface="Titillium Web" panose="00000500000000000000" pitchFamily="2" charset="0"/>
+              </a:rPr>
+              <a:t>temperaturi</a:t>
+            </a:r>
+            <a:r>
+              <a:rPr lang="en-US" sz="1700" dirty="0">
+                <a:latin typeface="Titillium Web" panose="00000500000000000000" pitchFamily="2" charset="0"/>
+              </a:rPr>
+              <a:t> za </a:t>
             </a:r>
             <a:r>
               <a:rPr lang="en-US" sz="1700" dirty="0" err="1">
@@ -21979,7 +21886,7 @@
               <a:rPr lang="en-US" sz="1700" dirty="0">
                 <a:latin typeface="Titillium Web" panose="00000500000000000000" pitchFamily="2" charset="0"/>
               </a:rPr>
-              <a:t> </a:t>
+              <a:t>, </a:t>
             </a:r>
             <a:r>
               <a:rPr lang="en-US" sz="1700" dirty="0" err="1">
@@ -22003,12 +21910,24 @@
               <a:rPr lang="en-US" sz="1700" dirty="0">
                 <a:latin typeface="Titillium Web" panose="00000500000000000000" pitchFamily="2" charset="0"/>
               </a:rPr>
-              <a:t> temperature </a:t>
+              <a:t> </a:t>
             </a:r>
             <a:r>
               <a:rPr lang="en-US" sz="1700" dirty="0" err="1">
                 <a:latin typeface="Titillium Web" panose="00000500000000000000" pitchFamily="2" charset="0"/>
               </a:rPr>
+              <a:t>temperatura</a:t>
+            </a:r>
+            <a:r>
+              <a:rPr lang="en-US" sz="1700" dirty="0">
+                <a:latin typeface="Titillium Web" panose="00000500000000000000" pitchFamily="2" charset="0"/>
+              </a:rPr>
+              <a:t> </a:t>
+            </a:r>
+            <a:r>
+              <a:rPr lang="en-US" sz="1700" dirty="0" err="1">
+                <a:latin typeface="Titillium Web" panose="00000500000000000000" pitchFamily="2" charset="0"/>
+              </a:rPr>
               <a:t>julija</a:t>
             </a:r>
             <a:r>
@@ -22051,55 +21970,31 @@
               <a:rPr lang="en-US" sz="1700" dirty="0">
                 <a:latin typeface="Titillium Web" panose="00000500000000000000" pitchFamily="2" charset="0"/>
               </a:rPr>
-              <a:t>) med </a:t>
+              <a:t>) med 1970 in 1985 </a:t>
             </a:r>
             <a:r>
               <a:rPr lang="en-US" sz="1700" dirty="0" err="1">
                 <a:latin typeface="Titillium Web" panose="00000500000000000000" pitchFamily="2" charset="0"/>
               </a:rPr>
-              <a:t>leti</a:t>
+              <a:t>nižja</a:t>
             </a:r>
             <a:r>
               <a:rPr lang="en-US" sz="1700" dirty="0">
                 <a:latin typeface="Titillium Web" panose="00000500000000000000" pitchFamily="2" charset="0"/>
               </a:rPr>
-              <a:t> 1970-1985 </a:t>
+              <a:t> </a:t>
             </a:r>
             <a:r>
               <a:rPr lang="en-US" sz="1700" dirty="0" err="1">
                 <a:latin typeface="Titillium Web" panose="00000500000000000000" pitchFamily="2" charset="0"/>
               </a:rPr>
-              <a:t>nižja</a:t>
+              <a:t>kot</a:t>
             </a:r>
             <a:r>
               <a:rPr lang="en-US" sz="1700" dirty="0">
                 <a:latin typeface="Titillium Web" panose="00000500000000000000" pitchFamily="2" charset="0"/>
               </a:rPr>
-              <a:t> </a:t>
-            </a:r>
-            <a:r>
-              <a:rPr lang="en-US" sz="1700" dirty="0" err="1">
-                <a:latin typeface="Titillium Web" panose="00000500000000000000" pitchFamily="2" charset="0"/>
-              </a:rPr>
-              <a:t>kot</a:t>
-            </a:r>
-            <a:r>
-              <a:rPr lang="en-US" sz="1700" dirty="0">
-                <a:latin typeface="Titillium Web" panose="00000500000000000000" pitchFamily="2" charset="0"/>
-              </a:rPr>
-              <a:t> med </a:t>
-            </a:r>
-            <a:r>
-              <a:rPr lang="en-US" sz="1700" dirty="0" err="1">
-                <a:latin typeface="Titillium Web" panose="00000500000000000000" pitchFamily="2" charset="0"/>
-              </a:rPr>
-              <a:t>leti</a:t>
-            </a:r>
-            <a:r>
-              <a:rPr lang="en-US" sz="1700" dirty="0">
-                <a:latin typeface="Titillium Web" panose="00000500000000000000" pitchFamily="2" charset="0"/>
-              </a:rPr>
-              <a:t> 2000 in 2015?</a:t>
+              <a:t> med 2000 in 2015?</a:t>
             </a:r>
           </a:p>
           <a:p>
@@ -22183,7 +22078,19 @@
               <a:rPr lang="en-US" sz="1500" i="1" dirty="0">
                 <a:latin typeface="Titillium Web" panose="00000500000000000000" pitchFamily="2" charset="0"/>
               </a:rPr>
-              <a:t> temperature </a:t>
+              <a:t> </a:t>
+            </a:r>
+            <a:r>
+              <a:rPr lang="en-US" sz="1500" i="1" dirty="0" err="1">
+                <a:latin typeface="Titillium Web" panose="00000500000000000000" pitchFamily="2" charset="0"/>
+              </a:rPr>
+              <a:t>temperatura</a:t>
+            </a:r>
+            <a:r>
+              <a:rPr lang="en-US" sz="1500" i="1" dirty="0">
+                <a:latin typeface="Titillium Web" panose="00000500000000000000" pitchFamily="2" charset="0"/>
+              </a:rPr>
+              <a:t> </a:t>
             </a:r>
             <a:r>
               <a:rPr lang="en-US" sz="1500" i="1" dirty="0" err="1">
@@ -23026,7 +22933,7 @@
               <a:rPr lang="en-US" sz="1600" dirty="0" err="1">
                 <a:latin typeface="Titillium Web" panose="00000500000000000000" pitchFamily="2" charset="0"/>
               </a:rPr>
-              <a:t>temperaturla</a:t>
+              <a:t>temperatura</a:t>
             </a:r>
             <a:r>
               <a:rPr lang="en-US" sz="1600" dirty="0">
@@ -23104,7 +23011,7 @@
               <a:rPr lang="en-US" sz="1600" dirty="0">
                 <a:latin typeface="Titillium Web" panose="00000500000000000000" pitchFamily="2" charset="0"/>
               </a:rPr>
-              <a:t> 2019 </a:t>
+              <a:t> 2019, </a:t>
             </a:r>
             <a:r>
               <a:rPr lang="en-US" sz="1600" dirty="0" err="1">
@@ -23116,7 +23023,7 @@
               <a:rPr lang="en-US" sz="1600" dirty="0">
                 <a:latin typeface="Titillium Web" panose="00000500000000000000" pitchFamily="2" charset="0"/>
               </a:rPr>
-              <a:t> 2070 </a:t>
+              <a:t> 2070, </a:t>
             </a:r>
             <a:r>
               <a:rPr lang="en-US" sz="1600" dirty="0" err="1">
@@ -24991,13 +24898,13 @@
               <a:rPr lang="en-US" sz="1700" dirty="0">
                 <a:latin typeface="Titillium Web" panose="00000500000000000000" pitchFamily="2" charset="0"/>
               </a:rPr>
-              <a:t> ne, </a:t>
+              <a:t> ne. Na </a:t>
             </a:r>
             <a:r>
               <a:rPr lang="en-US" sz="1700" dirty="0" err="1">
                 <a:latin typeface="Titillium Web" panose="00000500000000000000" pitchFamily="2" charset="0"/>
               </a:rPr>
-              <a:t>na</a:t>
+              <a:t>podlagi</a:t>
             </a:r>
             <a:r>
               <a:rPr lang="en-US" sz="1700" dirty="0">
@@ -25009,7 +24916,7 @@
               <a:rPr lang="en-US" sz="1700" dirty="0" err="1">
                 <a:latin typeface="Titillium Web" panose="00000500000000000000" pitchFamily="2" charset="0"/>
               </a:rPr>
-              <a:t>podlagi</a:t>
+              <a:t>zadnje</a:t>
             </a:r>
             <a:r>
               <a:rPr lang="en-US" sz="1700" dirty="0">
@@ -25021,7 +24928,7 @@
               <a:rPr lang="en-US" sz="1700" dirty="0" err="1">
                 <a:latin typeface="Titillium Web" panose="00000500000000000000" pitchFamily="2" charset="0"/>
               </a:rPr>
-              <a:t>zadnje</a:t>
+              <a:t>javnomnenjske</a:t>
             </a:r>
             <a:r>
               <a:rPr lang="en-US" sz="1700" dirty="0">
@@ -25033,19 +24940,37 @@
               <a:rPr lang="en-US" sz="1700" dirty="0" err="1">
                 <a:latin typeface="Titillium Web" panose="00000500000000000000" pitchFamily="2" charset="0"/>
               </a:rPr>
-              <a:t>javno</a:t>
+              <a:t>raziskave</a:t>
             </a:r>
             <a:r>
               <a:rPr lang="en-US" sz="1700" dirty="0">
                 <a:latin typeface="Titillium Web" panose="00000500000000000000" pitchFamily="2" charset="0"/>
               </a:rPr>
-              <a:t> </a:t>
+              <a:t> (</a:t>
+            </a:r>
+            <a:r>
+              <a:rPr lang="en-US" sz="1700" b="1" dirty="0" err="1">
+                <a:latin typeface="Titillium Web" panose="00000500000000000000" pitchFamily="2" charset="0"/>
+              </a:rPr>
+              <a:t>elections.csv</a:t>
+            </a:r>
+            <a:r>
+              <a:rPr lang="en-US" sz="1700" b="1" dirty="0">
+                <a:latin typeface="Titillium Web" panose="00000500000000000000" pitchFamily="2" charset="0"/>
+              </a:rPr>
+              <a:t> </a:t>
+            </a:r>
+            <a:r>
+              <a:rPr lang="en-US" sz="1700" dirty="0">
+                <a:latin typeface="Titillium Web" panose="00000500000000000000" pitchFamily="2" charset="0"/>
+              </a:rPr>
+              <a:t>) </a:t>
             </a:r>
             <a:r>
               <a:rPr lang="en-US" sz="1700" dirty="0" err="1">
                 <a:latin typeface="Titillium Web" panose="00000500000000000000" pitchFamily="2" charset="0"/>
               </a:rPr>
-              <a:t>mnenjske</a:t>
+              <a:t>jim</a:t>
             </a:r>
             <a:r>
               <a:rPr lang="en-US" sz="1700" dirty="0">
@@ -25057,49 +24982,7 @@
               <a:rPr lang="en-US" sz="1700" dirty="0" err="1">
                 <a:latin typeface="Titillium Web" panose="00000500000000000000" pitchFamily="2" charset="0"/>
               </a:rPr>
-              <a:t>raziskave</a:t>
-            </a:r>
-            <a:r>
-              <a:rPr lang="en-US" sz="1700" dirty="0">
-                <a:latin typeface="Titillium Web" panose="00000500000000000000" pitchFamily="2" charset="0"/>
-              </a:rPr>
-              <a:t> (</a:t>
-            </a:r>
-            <a:r>
-              <a:rPr lang="en-US" sz="1700" b="1" dirty="0" err="1">
-                <a:latin typeface="Titillium Web" panose="00000500000000000000" pitchFamily="2" charset="0"/>
-              </a:rPr>
-              <a:t>elections.csv</a:t>
-            </a:r>
-            <a:r>
-              <a:rPr lang="en-US" sz="1700" b="1" dirty="0">
-                <a:latin typeface="Titillium Web" panose="00000500000000000000" pitchFamily="2" charset="0"/>
-              </a:rPr>
-              <a:t> </a:t>
-            </a:r>
-            <a:r>
-              <a:rPr lang="en-US" sz="1700" dirty="0">
-                <a:latin typeface="Titillium Web" panose="00000500000000000000" pitchFamily="2" charset="0"/>
-              </a:rPr>
-              <a:t>) </a:t>
-            </a:r>
-            <a:r>
-              <a:rPr lang="en-US" sz="1700" dirty="0" err="1">
-                <a:latin typeface="Titillium Web" panose="00000500000000000000" pitchFamily="2" charset="0"/>
-              </a:rPr>
-              <a:t>jim</a:t>
-            </a:r>
-            <a:r>
-              <a:rPr lang="en-US" sz="1700" dirty="0">
-                <a:latin typeface="Titillium Web" panose="00000500000000000000" pitchFamily="2" charset="0"/>
-              </a:rPr>
-              <a:t> </a:t>
-            </a:r>
-            <a:r>
-              <a:rPr lang="en-US" sz="1700" dirty="0" err="1">
-                <a:latin typeface="Titillium Web" panose="00000500000000000000" pitchFamily="2" charset="0"/>
-              </a:rPr>
-              <a:t>pomagja</a:t>
+              <a:t>pomagaj</a:t>
             </a:r>
             <a:r>
               <a:rPr lang="en-US" sz="1700" dirty="0">
@@ -25571,7 +25454,7 @@
               <a:rPr lang="en-US" sz="1700" dirty="0" err="1">
                 <a:latin typeface="Titillium Web" panose="00000500000000000000" pitchFamily="2" charset="0"/>
               </a:rPr>
-              <a:t>trenotna</a:t>
+              <a:t>trenutna</a:t>
             </a:r>
             <a:r>
               <a:rPr lang="en-US" sz="1700" dirty="0">

</xml_diff>

<commit_message>
Minor change in slides.
</commit_message>
<xml_diff>
--- a/slides/prezentacija.pptx
+++ b/slides/prezentacija.pptx
@@ -301,7 +301,7 @@
           <a:p>
             <a:fld id="{6B41F776-2985-48C1-9143-45E81A31457D}" type="datetimeFigureOut">
               <a:rPr lang="sl-SI" smtClean="0"/>
-              <a:t>30. 05. 2019</a:t>
+              <a:t>30. 05. 19</a:t>
             </a:fld>
             <a:endParaRPr lang="sl-SI"/>
           </a:p>
@@ -469,7 +469,7 @@
           <a:p>
             <a:fld id="{6B41F776-2985-48C1-9143-45E81A31457D}" type="datetimeFigureOut">
               <a:rPr lang="sl-SI" smtClean="0"/>
-              <a:t>30. 05. 2019</a:t>
+              <a:t>30. 05. 19</a:t>
             </a:fld>
             <a:endParaRPr lang="sl-SI"/>
           </a:p>
@@ -647,7 +647,7 @@
           <a:p>
             <a:fld id="{6B41F776-2985-48C1-9143-45E81A31457D}" type="datetimeFigureOut">
               <a:rPr lang="sl-SI" smtClean="0"/>
-              <a:t>30. 05. 2019</a:t>
+              <a:t>30. 05. 19</a:t>
             </a:fld>
             <a:endParaRPr lang="sl-SI"/>
           </a:p>
@@ -922,7 +922,7 @@
           <a:p>
             <a:fld id="{6B41F776-2985-48C1-9143-45E81A31457D}" type="datetimeFigureOut">
               <a:rPr lang="sl-SI" smtClean="0"/>
-              <a:t>30. 05. 2019</a:t>
+              <a:t>30. 05. 19</a:t>
             </a:fld>
             <a:endParaRPr lang="sl-SI"/>
           </a:p>
@@ -1151,7 +1151,7 @@
           <a:p>
             <a:fld id="{6B41F776-2985-48C1-9143-45E81A31457D}" type="datetimeFigureOut">
               <a:rPr lang="sl-SI" smtClean="0"/>
-              <a:t>30. 05. 2019</a:t>
+              <a:t>30. 05. 19</a:t>
             </a:fld>
             <a:endParaRPr lang="sl-SI"/>
           </a:p>
@@ -1515,7 +1515,7 @@
           <a:p>
             <a:fld id="{6B41F776-2985-48C1-9143-45E81A31457D}" type="datetimeFigureOut">
               <a:rPr lang="sl-SI" smtClean="0"/>
-              <a:t>30. 05. 2019</a:t>
+              <a:t>30. 05. 19</a:t>
             </a:fld>
             <a:endParaRPr lang="sl-SI"/>
           </a:p>
@@ -1632,7 +1632,7 @@
           <a:p>
             <a:fld id="{6B41F776-2985-48C1-9143-45E81A31457D}" type="datetimeFigureOut">
               <a:rPr lang="sl-SI" smtClean="0"/>
-              <a:t>30. 05. 2019</a:t>
+              <a:t>30. 05. 19</a:t>
             </a:fld>
             <a:endParaRPr lang="sl-SI"/>
           </a:p>
@@ -1727,7 +1727,7 @@
           <a:p>
             <a:fld id="{6B41F776-2985-48C1-9143-45E81A31457D}" type="datetimeFigureOut">
               <a:rPr lang="sl-SI" smtClean="0"/>
-              <a:t>30. 05. 2019</a:t>
+              <a:t>30. 05. 19</a:t>
             </a:fld>
             <a:endParaRPr lang="sl-SI"/>
           </a:p>
@@ -2002,7 +2002,7 @@
           <a:p>
             <a:fld id="{6B41F776-2985-48C1-9143-45E81A31457D}" type="datetimeFigureOut">
               <a:rPr lang="sl-SI" smtClean="0"/>
-              <a:t>30. 05. 2019</a:t>
+              <a:t>30. 05. 19</a:t>
             </a:fld>
             <a:endParaRPr lang="sl-SI"/>
           </a:p>
@@ -2254,7 +2254,7 @@
           <a:p>
             <a:fld id="{6B41F776-2985-48C1-9143-45E81A31457D}" type="datetimeFigureOut">
               <a:rPr lang="sl-SI" smtClean="0"/>
-              <a:t>30. 05. 2019</a:t>
+              <a:t>30. 05. 19</a:t>
             </a:fld>
             <a:endParaRPr lang="sl-SI"/>
           </a:p>
@@ -2465,7 +2465,7 @@
           <a:p>
             <a:fld id="{6B41F776-2985-48C1-9143-45E81A31457D}" type="datetimeFigureOut">
               <a:rPr lang="sl-SI" smtClean="0"/>
-              <a:t>30. 05. 2019</a:t>
+              <a:t>30. 05. 19</a:t>
             </a:fld>
             <a:endParaRPr lang="sl-SI"/>
           </a:p>
@@ -15589,7 +15589,7 @@
               </a:spcAft>
             </a:pPr>
             <a:r>
-              <a:rPr lang="sl-SI" b="1" i="1" u="sng" dirty="0" err="1">
+              <a:rPr lang="sl-SI" sz="2800" b="1" i="1" u="sng" dirty="0" err="1">
                 <a:hlinkClick r:id="rId2">
                   <a:extLst>
                     <a:ext uri="{A12FA001-AC4F-418D-AE19-62706E023703}">
@@ -15601,7 +15601,7 @@
               <a:t>https</a:t>
             </a:r>
             <a:r>
-              <a:rPr lang="sl-SI" b="1" i="1" u="sng" dirty="0">
+              <a:rPr lang="sl-SI" sz="2800" b="1" i="1" u="sng" dirty="0">
                 <a:hlinkClick r:id="rId2">
                   <a:extLst>
                     <a:ext uri="{A12FA001-AC4F-418D-AE19-62706E023703}">
@@ -15613,7 +15613,7 @@
               <a:t>://</a:t>
             </a:r>
             <a:r>
-              <a:rPr lang="sl-SI" b="1" i="1" u="sng" dirty="0" err="1">
+              <a:rPr lang="sl-SI" sz="2800" b="1" i="1" u="sng" dirty="0" err="1">
                 <a:hlinkClick r:id="rId2">
                   <a:extLst>
                     <a:ext uri="{A12FA001-AC4F-418D-AE19-62706E023703}">
@@ -15625,7 +15625,7 @@
               <a:t>github.com</a:t>
             </a:r>
             <a:r>
-              <a:rPr lang="sl-SI" b="1" i="1" u="sng" dirty="0">
+              <a:rPr lang="sl-SI" sz="2800" b="1" i="1" u="sng" dirty="0">
                 <a:hlinkClick r:id="rId2">
                   <a:extLst>
                     <a:ext uri="{A12FA001-AC4F-418D-AE19-62706E023703}">
@@ -15637,7 +15637,7 @@
               <a:t>/</a:t>
             </a:r>
             <a:r>
-              <a:rPr lang="sl-SI" b="1" i="1" u="sng" dirty="0" err="1">
+              <a:rPr lang="sl-SI" sz="2800" b="1" i="1" u="sng" dirty="0" err="1">
                 <a:hlinkClick r:id="rId2">
                   <a:extLst>
                     <a:ext uri="{A12FA001-AC4F-418D-AE19-62706E023703}">
@@ -15649,7 +15649,7 @@
               <a:t>bstatcomp</a:t>
             </a:r>
             <a:r>
-              <a:rPr lang="sl-SI" b="1" i="1" u="sng" dirty="0">
+              <a:rPr lang="sl-SI" sz="2800" b="1" i="1" u="sng" dirty="0">
                 <a:hlinkClick r:id="rId2">
                   <a:extLst>
                     <a:ext uri="{A12FA001-AC4F-418D-AE19-62706E023703}">
@@ -15661,7 +15661,7 @@
               <a:t>/Stan-</a:t>
             </a:r>
             <a:r>
-              <a:rPr lang="sl-SI" b="1" i="1" u="sng" dirty="0" err="1">
+              <a:rPr lang="sl-SI" sz="2800" b="1" i="1" u="sng" dirty="0" err="1">
                 <a:hlinkClick r:id="rId2">
                   <a:extLst>
                     <a:ext uri="{A12FA001-AC4F-418D-AE19-62706E023703}">
@@ -15673,7 +15673,7 @@
               <a:t>Intro</a:t>
             </a:r>
             <a:r>
-              <a:rPr lang="sl-SI" b="1" i="1" u="sng" dirty="0">
+              <a:rPr lang="sl-SI" sz="2800" b="1" i="1" u="sng" dirty="0">
                 <a:hlinkClick r:id="rId2">
                   <a:extLst>
                     <a:ext uri="{A12FA001-AC4F-418D-AE19-62706E023703}">
@@ -15685,7 +15685,7 @@
               <a:t>-</a:t>
             </a:r>
             <a:r>
-              <a:rPr lang="sl-SI" b="1" i="1" u="sng" dirty="0" err="1">
+              <a:rPr lang="sl-SI" sz="2800" b="1" i="1" u="sng" dirty="0" err="1">
                 <a:hlinkClick r:id="rId2">
                   <a:extLst>
                     <a:ext uri="{A12FA001-AC4F-418D-AE19-62706E023703}">
@@ -15696,7 +15696,7 @@
               </a:rPr>
               <a:t>Workshop</a:t>
             </a:r>
-            <a:endParaRPr lang="sl-SI" dirty="0">
+            <a:endParaRPr lang="sl-SI" sz="2800" dirty="0">
               <a:latin typeface="Titillium Web" panose="00000500000000000000" pitchFamily="2" charset="-18"/>
             </a:endParaRPr>
           </a:p>
@@ -18298,11 +18298,18 @@
               <a:buNone/>
             </a:pPr>
             <a:r>
+              <a:rPr lang="en-US" sz="1400" dirty="0" err="1">
+                <a:latin typeface="Courier New" panose="02070309020205020404" pitchFamily="49" charset="0"/>
+                <a:cs typeface="Courier New" panose="02070309020205020404" pitchFamily="49" charset="0"/>
+              </a:rPr>
+              <a:t>int</a:t>
+            </a:r>
+            <a:r>
               <a:rPr lang="en-US" sz="1400" dirty="0">
                 <a:latin typeface="Courier New" panose="02070309020205020404" pitchFamily="49" charset="0"/>
                 <a:cs typeface="Courier New" panose="02070309020205020404" pitchFamily="49" charset="0"/>
               </a:rPr>
-              <a:t>int a;</a:t>
+              <a:t> n;</a:t>
             </a:r>
           </a:p>
           <a:p>
@@ -18323,7 +18330,7 @@
                 <a:latin typeface="Courier New" panose="02070309020205020404" pitchFamily="49" charset="0"/>
                 <a:cs typeface="Courier New" panose="02070309020205020404" pitchFamily="49" charset="0"/>
               </a:rPr>
-              <a:t>real b</a:t>
+              <a:t>real r</a:t>
             </a:r>
             <a:r>
               <a:rPr lang="en-GB" sz="1400" dirty="0">

</xml_diff>